<commit_message>
Fix composition-aggregation confusion in diagrams
</commit_message>
<xml_diff>
--- a/doc/Diagrams.pptx
+++ b/doc/Diagrams.pptx
@@ -290,7 +290,7 @@
           <a:p>
             <a:fld id="{78C97017-6FC3-485B-9764-EAC9E56C1D49}" type="datetimeFigureOut">
               <a:rPr lang="en-US" smtClean="0"/>
-              <a:t>8/25/2016</a:t>
+              <a:t>8/27/2016</a:t>
             </a:fld>
             <a:endParaRPr lang="en-US"/>
           </a:p>
@@ -460,7 +460,7 @@
           <a:p>
             <a:fld id="{78C97017-6FC3-485B-9764-EAC9E56C1D49}" type="datetimeFigureOut">
               <a:rPr lang="en-US" smtClean="0"/>
-              <a:t>8/25/2016</a:t>
+              <a:t>8/27/2016</a:t>
             </a:fld>
             <a:endParaRPr lang="en-US"/>
           </a:p>
@@ -640,7 +640,7 @@
           <a:p>
             <a:fld id="{78C97017-6FC3-485B-9764-EAC9E56C1D49}" type="datetimeFigureOut">
               <a:rPr lang="en-US" smtClean="0"/>
-              <a:t>8/25/2016</a:t>
+              <a:t>8/27/2016</a:t>
             </a:fld>
             <a:endParaRPr lang="en-US"/>
           </a:p>
@@ -810,7 +810,7 @@
           <a:p>
             <a:fld id="{78C97017-6FC3-485B-9764-EAC9E56C1D49}" type="datetimeFigureOut">
               <a:rPr lang="en-US" smtClean="0"/>
-              <a:t>8/25/2016</a:t>
+              <a:t>8/27/2016</a:t>
             </a:fld>
             <a:endParaRPr lang="en-US"/>
           </a:p>
@@ -1056,7 +1056,7 @@
           <a:p>
             <a:fld id="{78C97017-6FC3-485B-9764-EAC9E56C1D49}" type="datetimeFigureOut">
               <a:rPr lang="en-US" smtClean="0"/>
-              <a:t>8/25/2016</a:t>
+              <a:t>8/27/2016</a:t>
             </a:fld>
             <a:endParaRPr lang="en-US"/>
           </a:p>
@@ -1344,7 +1344,7 @@
           <a:p>
             <a:fld id="{78C97017-6FC3-485B-9764-EAC9E56C1D49}" type="datetimeFigureOut">
               <a:rPr lang="en-US" smtClean="0"/>
-              <a:t>8/25/2016</a:t>
+              <a:t>8/27/2016</a:t>
             </a:fld>
             <a:endParaRPr lang="en-US"/>
           </a:p>
@@ -1766,7 +1766,7 @@
           <a:p>
             <a:fld id="{78C97017-6FC3-485B-9764-EAC9E56C1D49}" type="datetimeFigureOut">
               <a:rPr lang="en-US" smtClean="0"/>
-              <a:t>8/25/2016</a:t>
+              <a:t>8/27/2016</a:t>
             </a:fld>
             <a:endParaRPr lang="en-US"/>
           </a:p>
@@ -1884,7 +1884,7 @@
           <a:p>
             <a:fld id="{78C97017-6FC3-485B-9764-EAC9E56C1D49}" type="datetimeFigureOut">
               <a:rPr lang="en-US" smtClean="0"/>
-              <a:t>8/25/2016</a:t>
+              <a:t>8/27/2016</a:t>
             </a:fld>
             <a:endParaRPr lang="en-US"/>
           </a:p>
@@ -1979,7 +1979,7 @@
           <a:p>
             <a:fld id="{78C97017-6FC3-485B-9764-EAC9E56C1D49}" type="datetimeFigureOut">
               <a:rPr lang="en-US" smtClean="0"/>
-              <a:t>8/25/2016</a:t>
+              <a:t>8/27/2016</a:t>
             </a:fld>
             <a:endParaRPr lang="en-US"/>
           </a:p>
@@ -2256,7 +2256,7 @@
           <a:p>
             <a:fld id="{78C97017-6FC3-485B-9764-EAC9E56C1D49}" type="datetimeFigureOut">
               <a:rPr lang="en-US" smtClean="0"/>
-              <a:t>8/25/2016</a:t>
+              <a:t>8/27/2016</a:t>
             </a:fld>
             <a:endParaRPr lang="en-US"/>
           </a:p>
@@ -2509,7 +2509,7 @@
           <a:p>
             <a:fld id="{78C97017-6FC3-485B-9764-EAC9E56C1D49}" type="datetimeFigureOut">
               <a:rPr lang="en-US" smtClean="0"/>
-              <a:t>8/25/2016</a:t>
+              <a:t>8/27/2016</a:t>
             </a:fld>
             <a:endParaRPr lang="en-US"/>
           </a:p>
@@ -2722,7 +2722,7 @@
           <a:p>
             <a:fld id="{78C97017-6FC3-485B-9764-EAC9E56C1D49}" type="datetimeFigureOut">
               <a:rPr lang="en-US" smtClean="0"/>
-              <a:t>8/25/2016</a:t>
+              <a:t>8/27/2016</a:t>
             </a:fld>
             <a:endParaRPr lang="en-US"/>
           </a:p>
@@ -4295,6 +4295,9 @@
           <a:prstGeom prst="flowChartDecision">
             <a:avLst/>
           </a:prstGeom>
+          <a:solidFill>
+            <a:schemeClr val="accent6"/>
+          </a:solidFill>
           <a:ln w="19050"/>
           <a:effectLst/>
         </p:spPr>
@@ -4339,6 +4342,7 @@
           <a:prstGeom prst="flowChartDecision">
             <a:avLst/>
           </a:prstGeom>
+          <a:noFill/>
           <a:ln w="19050"/>
           <a:effectLst/>
         </p:spPr>
@@ -4379,6 +4383,7 @@
           <a:prstGeom prst="flowChartDecision">
             <a:avLst/>
           </a:prstGeom>
+          <a:noFill/>
           <a:ln w="19050"/>
           <a:effectLst/>
         </p:spPr>
@@ -4419,6 +4424,9 @@
           <a:prstGeom prst="flowChartDecision">
             <a:avLst/>
           </a:prstGeom>
+          <a:solidFill>
+            <a:schemeClr val="accent6"/>
+          </a:solidFill>
           <a:ln w="19050"/>
           <a:effectLst/>
         </p:spPr>
@@ -4633,6 +4641,9 @@
             </a:avLst>
           </a:prstGeom>
           <a:ln w="19050">
+            <a:solidFill>
+              <a:srgbClr val="C00000"/>
+            </a:solidFill>
             <a:prstDash val="dash"/>
             <a:headEnd type="none" w="med" len="med"/>
             <a:tailEnd type="arrow" w="med" len="med"/>
@@ -4641,13 +4652,13 @@
         </p:spPr>
         <p:style>
           <a:lnRef idx="1">
-            <a:schemeClr val="accent6"/>
-          </a:lnRef>
-          <a:fillRef idx="2">
-            <a:schemeClr val="accent6"/>
-          </a:fillRef>
-          <a:effectRef idx="1">
-            <a:schemeClr val="accent6"/>
+            <a:schemeClr val="accent2"/>
+          </a:lnRef>
+          <a:fillRef idx="2">
+            <a:schemeClr val="accent2"/>
+          </a:fillRef>
+          <a:effectRef idx="1">
+            <a:schemeClr val="accent2"/>
           </a:effectRef>
           <a:fontRef idx="minor">
             <a:schemeClr val="dk1"/>
@@ -5107,8 +5118,8 @@
           <a:p>
             <a:pPr algn="ctr"/>
             <a:r>
-              <a:rPr lang="en-US" sz="1050" dirty="0"/>
-              <a:t>…</a:t>
+              <a:rPr lang="en-US" sz="1050" dirty="0" smtClean="0"/>
+              <a:t>…Command</a:t>
             </a:r>
             <a:endParaRPr lang="en-SG" sz="1050" dirty="0"/>
           </a:p>
@@ -6110,6 +6121,9 @@
           <a:prstGeom prst="flowChartDecision">
             <a:avLst/>
           </a:prstGeom>
+          <a:solidFill>
+            <a:schemeClr val="accent4"/>
+          </a:solidFill>
           <a:ln w="19050"/>
           <a:effectLst/>
         </p:spPr>

</xml_diff>

<commit_message>
Remove Contact class from class diagram
</commit_message>
<xml_diff>
--- a/doc/Diagrams.pptx
+++ b/doc/Diagrams.pptx
@@ -290,7 +290,7 @@
           <a:p>
             <a:fld id="{78C97017-6FC3-485B-9764-EAC9E56C1D49}" type="datetimeFigureOut">
               <a:rPr lang="en-US" smtClean="0"/>
-              <a:t>8/27/2016</a:t>
+              <a:t>8/28/2016</a:t>
             </a:fld>
             <a:endParaRPr lang="en-US"/>
           </a:p>
@@ -460,7 +460,7 @@
           <a:p>
             <a:fld id="{78C97017-6FC3-485B-9764-EAC9E56C1D49}" type="datetimeFigureOut">
               <a:rPr lang="en-US" smtClean="0"/>
-              <a:t>8/27/2016</a:t>
+              <a:t>8/28/2016</a:t>
             </a:fld>
             <a:endParaRPr lang="en-US"/>
           </a:p>
@@ -640,7 +640,7 @@
           <a:p>
             <a:fld id="{78C97017-6FC3-485B-9764-EAC9E56C1D49}" type="datetimeFigureOut">
               <a:rPr lang="en-US" smtClean="0"/>
-              <a:t>8/27/2016</a:t>
+              <a:t>8/28/2016</a:t>
             </a:fld>
             <a:endParaRPr lang="en-US"/>
           </a:p>
@@ -810,7 +810,7 @@
           <a:p>
             <a:fld id="{78C97017-6FC3-485B-9764-EAC9E56C1D49}" type="datetimeFigureOut">
               <a:rPr lang="en-US" smtClean="0"/>
-              <a:t>8/27/2016</a:t>
+              <a:t>8/28/2016</a:t>
             </a:fld>
             <a:endParaRPr lang="en-US"/>
           </a:p>
@@ -1056,7 +1056,7 @@
           <a:p>
             <a:fld id="{78C97017-6FC3-485B-9764-EAC9E56C1D49}" type="datetimeFigureOut">
               <a:rPr lang="en-US" smtClean="0"/>
-              <a:t>8/27/2016</a:t>
+              <a:t>8/28/2016</a:t>
             </a:fld>
             <a:endParaRPr lang="en-US"/>
           </a:p>
@@ -1344,7 +1344,7 @@
           <a:p>
             <a:fld id="{78C97017-6FC3-485B-9764-EAC9E56C1D49}" type="datetimeFigureOut">
               <a:rPr lang="en-US" smtClean="0"/>
-              <a:t>8/27/2016</a:t>
+              <a:t>8/28/2016</a:t>
             </a:fld>
             <a:endParaRPr lang="en-US"/>
           </a:p>
@@ -1766,7 +1766,7 @@
           <a:p>
             <a:fld id="{78C97017-6FC3-485B-9764-EAC9E56C1D49}" type="datetimeFigureOut">
               <a:rPr lang="en-US" smtClean="0"/>
-              <a:t>8/27/2016</a:t>
+              <a:t>8/28/2016</a:t>
             </a:fld>
             <a:endParaRPr lang="en-US"/>
           </a:p>
@@ -1884,7 +1884,7 @@
           <a:p>
             <a:fld id="{78C97017-6FC3-485B-9764-EAC9E56C1D49}" type="datetimeFigureOut">
               <a:rPr lang="en-US" smtClean="0"/>
-              <a:t>8/27/2016</a:t>
+              <a:t>8/28/2016</a:t>
             </a:fld>
             <a:endParaRPr lang="en-US"/>
           </a:p>
@@ -1979,7 +1979,7 @@
           <a:p>
             <a:fld id="{78C97017-6FC3-485B-9764-EAC9E56C1D49}" type="datetimeFigureOut">
               <a:rPr lang="en-US" smtClean="0"/>
-              <a:t>8/27/2016</a:t>
+              <a:t>8/28/2016</a:t>
             </a:fld>
             <a:endParaRPr lang="en-US"/>
           </a:p>
@@ -2256,7 +2256,7 @@
           <a:p>
             <a:fld id="{78C97017-6FC3-485B-9764-EAC9E56C1D49}" type="datetimeFigureOut">
               <a:rPr lang="en-US" smtClean="0"/>
-              <a:t>8/27/2016</a:t>
+              <a:t>8/28/2016</a:t>
             </a:fld>
             <a:endParaRPr lang="en-US"/>
           </a:p>
@@ -2509,7 +2509,7 @@
           <a:p>
             <a:fld id="{78C97017-6FC3-485B-9764-EAC9E56C1D49}" type="datetimeFigureOut">
               <a:rPr lang="en-US" smtClean="0"/>
-              <a:t>8/27/2016</a:t>
+              <a:t>8/28/2016</a:t>
             </a:fld>
             <a:endParaRPr lang="en-US"/>
           </a:p>
@@ -2722,7 +2722,7 @@
           <a:p>
             <a:fld id="{78C97017-6FC3-485B-9764-EAC9E56C1D49}" type="datetimeFigureOut">
               <a:rPr lang="en-US" smtClean="0"/>
-              <a:t>8/27/2016</a:t>
+              <a:t>8/28/2016</a:t>
             </a:fld>
             <a:endParaRPr lang="en-US"/>
           </a:p>
@@ -3179,50 +3179,6 @@
       </p:grpSpPr>
       <p:sp>
         <p:nvSpPr>
-          <p:cNvPr id="7" name="Rectangle 6"/>
-          <p:cNvSpPr/>
-          <p:nvPr/>
-        </p:nvSpPr>
-        <p:spPr>
-          <a:xfrm>
-            <a:off x="7909535" y="3476971"/>
-            <a:ext cx="929296" cy="342611"/>
-          </a:xfrm>
-          <a:prstGeom prst="rect">
-            <a:avLst/>
-          </a:prstGeom>
-          <a:ln w="19050"/>
-          <a:effectLst/>
-        </p:spPr>
-        <p:style>
-          <a:lnRef idx="1">
-            <a:schemeClr val="accent4"/>
-          </a:lnRef>
-          <a:fillRef idx="2">
-            <a:schemeClr val="accent4"/>
-          </a:fillRef>
-          <a:effectRef idx="1">
-            <a:schemeClr val="accent4"/>
-          </a:effectRef>
-          <a:fontRef idx="minor">
-            <a:schemeClr val="dk1"/>
-          </a:fontRef>
-        </p:style>
-        <p:txBody>
-          <a:bodyPr rtlCol="0" anchor="ctr"/>
-          <a:lstStyle/>
-          <a:p>
-            <a:pPr algn="ctr"/>
-            <a:r>
-              <a:rPr lang="en-SG" sz="1050" dirty="0" smtClean="0"/>
-              <a:t>Contact</a:t>
-            </a:r>
-            <a:endParaRPr lang="en-SG" sz="1050" dirty="0"/>
-          </a:p>
-        </p:txBody>
-      </p:sp>
-      <p:sp>
-        <p:nvSpPr>
           <p:cNvPr id="9" name="Rectangle 8"/>
           <p:cNvSpPr/>
           <p:nvPr/>
@@ -3734,151 +3690,6 @@
           </a:p>
         </p:txBody>
       </p:sp>
-      <p:sp>
-        <p:nvSpPr>
-          <p:cNvPr id="25" name="Isosceles Triangle 24"/>
-          <p:cNvSpPr/>
-          <p:nvPr/>
-        </p:nvSpPr>
-        <p:spPr>
-          <a:xfrm>
-            <a:off x="8251312" y="3821117"/>
-            <a:ext cx="270504" cy="175523"/>
-          </a:xfrm>
-          <a:prstGeom prst="triangle">
-            <a:avLst/>
-          </a:prstGeom>
-          <a:ln w="19050"/>
-          <a:effectLst/>
-        </p:spPr>
-        <p:style>
-          <a:lnRef idx="1">
-            <a:schemeClr val="accent4"/>
-          </a:lnRef>
-          <a:fillRef idx="2">
-            <a:schemeClr val="accent4"/>
-          </a:fillRef>
-          <a:effectRef idx="1">
-            <a:schemeClr val="accent4"/>
-          </a:effectRef>
-          <a:fontRef idx="minor">
-            <a:schemeClr val="dk1"/>
-          </a:fontRef>
-        </p:style>
-        <p:txBody>
-          <a:bodyPr rtlCol="0" anchor="ctr"/>
-          <a:lstStyle/>
-          <a:p>
-            <a:pPr algn="ctr"/>
-            <a:endParaRPr lang="en-SG" sz="1050"/>
-          </a:p>
-        </p:txBody>
-      </p:sp>
-      <p:cxnSp>
-        <p:nvCxnSpPr>
-          <p:cNvPr id="26" name="Elbow Connector 25"/>
-          <p:cNvCxnSpPr>
-            <a:stCxn id="25" idx="3"/>
-            <a:endCxn id="21" idx="3"/>
-          </p:cNvCxnSpPr>
-          <p:nvPr/>
-        </p:nvCxnSpPr>
-        <p:spPr>
-          <a:xfrm rot="5400000">
-            <a:off x="7719887" y="4002503"/>
-            <a:ext cx="672540" cy="660814"/>
-          </a:xfrm>
-          <a:prstGeom prst="bentConnector2">
-            <a:avLst/>
-          </a:prstGeom>
-          <a:ln w="19050"/>
-          <a:effectLst/>
-        </p:spPr>
-        <p:style>
-          <a:lnRef idx="1">
-            <a:schemeClr val="accent4"/>
-          </a:lnRef>
-          <a:fillRef idx="2">
-            <a:schemeClr val="accent4"/>
-          </a:fillRef>
-          <a:effectRef idx="1">
-            <a:schemeClr val="accent4"/>
-          </a:effectRef>
-          <a:fontRef idx="minor">
-            <a:schemeClr val="dk1"/>
-          </a:fontRef>
-        </p:style>
-      </p:cxnSp>
-      <p:cxnSp>
-        <p:nvCxnSpPr>
-          <p:cNvPr id="27" name="Elbow Connector 26"/>
-          <p:cNvCxnSpPr>
-            <a:stCxn id="25" idx="3"/>
-            <a:endCxn id="20" idx="3"/>
-          </p:cNvCxnSpPr>
-          <p:nvPr/>
-        </p:nvCxnSpPr>
-        <p:spPr>
-          <a:xfrm rot="5400000">
-            <a:off x="7942322" y="3765414"/>
-            <a:ext cx="213017" cy="675468"/>
-          </a:xfrm>
-          <a:prstGeom prst="bentConnector2">
-            <a:avLst/>
-          </a:prstGeom>
-          <a:ln w="19050"/>
-          <a:effectLst/>
-        </p:spPr>
-        <p:style>
-          <a:lnRef idx="1">
-            <a:schemeClr val="accent4"/>
-          </a:lnRef>
-          <a:fillRef idx="2">
-            <a:schemeClr val="accent4"/>
-          </a:fillRef>
-          <a:effectRef idx="1">
-            <a:schemeClr val="accent4"/>
-          </a:effectRef>
-          <a:fontRef idx="minor">
-            <a:schemeClr val="dk1"/>
-          </a:fontRef>
-        </p:style>
-      </p:cxnSp>
-      <p:cxnSp>
-        <p:nvCxnSpPr>
-          <p:cNvPr id="30" name="Elbow Connector 29"/>
-          <p:cNvCxnSpPr>
-            <a:stCxn id="25" idx="3"/>
-            <a:endCxn id="22" idx="3"/>
-          </p:cNvCxnSpPr>
-          <p:nvPr/>
-        </p:nvCxnSpPr>
-        <p:spPr>
-          <a:xfrm rot="5400000">
-            <a:off x="7491287" y="4231103"/>
-            <a:ext cx="1129740" cy="660814"/>
-          </a:xfrm>
-          <a:prstGeom prst="bentConnector2">
-            <a:avLst/>
-          </a:prstGeom>
-          <a:ln w="19050"/>
-          <a:effectLst/>
-        </p:spPr>
-        <p:style>
-          <a:lnRef idx="1">
-            <a:schemeClr val="accent4"/>
-          </a:lnRef>
-          <a:fillRef idx="2">
-            <a:schemeClr val="accent4"/>
-          </a:fillRef>
-          <a:effectRef idx="1">
-            <a:schemeClr val="accent4"/>
-          </a:effectRef>
-          <a:fontRef idx="minor">
-            <a:schemeClr val="dk1"/>
-          </a:fontRef>
-        </p:style>
-      </p:cxnSp>
       <p:cxnSp>
         <p:nvCxnSpPr>
           <p:cNvPr id="35" name="Elbow Connector 34"/>
@@ -5419,7 +5230,7 @@
         </p:nvSpPr>
         <p:spPr>
           <a:xfrm>
-            <a:off x="6781800" y="3200400"/>
+            <a:off x="6781800" y="3539440"/>
             <a:ext cx="929296" cy="346760"/>
           </a:xfrm>
           <a:prstGeom prst="rect">
@@ -5430,13 +5241,13 @@
         </p:spPr>
         <p:style>
           <a:lnRef idx="1">
-            <a:schemeClr val="accent3"/>
-          </a:lnRef>
-          <a:fillRef idx="2">
-            <a:schemeClr val="accent3"/>
-          </a:fillRef>
-          <a:effectRef idx="1">
-            <a:schemeClr val="accent3"/>
+            <a:schemeClr val="accent4"/>
+          </a:lnRef>
+          <a:fillRef idx="2">
+            <a:schemeClr val="accent4"/>
+          </a:fillRef>
+          <a:effectRef idx="1">
+            <a:schemeClr val="accent4"/>
           </a:effectRef>
           <a:fontRef idx="minor">
             <a:schemeClr val="dk1"/>
@@ -5466,8 +5277,8 @@
         </p:nvCxnSpPr>
         <p:spPr>
           <a:xfrm flipV="1">
-            <a:off x="6384802" y="3373780"/>
-            <a:ext cx="396998" cy="1148311"/>
+            <a:off x="6384802" y="3712820"/>
+            <a:ext cx="396998" cy="809271"/>
           </a:xfrm>
           <a:prstGeom prst="bentConnector3">
             <a:avLst>
@@ -5987,7 +5798,7 @@
         </p:nvSpPr>
         <p:spPr>
           <a:xfrm>
-            <a:off x="2438400" y="3810000"/>
+            <a:off x="1009446" y="3810000"/>
             <a:ext cx="929296" cy="346760"/>
           </a:xfrm>
           <a:prstGeom prst="rect">
@@ -6031,7 +5842,7 @@
         </p:nvSpPr>
         <p:spPr>
           <a:xfrm>
-            <a:off x="4029156" y="4414289"/>
+            <a:off x="2600202" y="4414289"/>
             <a:ext cx="929296" cy="346760"/>
           </a:xfrm>
           <a:prstGeom prst="rect">
@@ -6078,7 +5889,7 @@
         </p:nvCxnSpPr>
         <p:spPr>
           <a:xfrm>
-            <a:off x="3617504" y="3983380"/>
+            <a:off x="2188550" y="3983380"/>
             <a:ext cx="411652" cy="604289"/>
           </a:xfrm>
           <a:prstGeom prst="bentConnector3">
@@ -6115,7 +5926,7 @@
         </p:nvSpPr>
         <p:spPr>
           <a:xfrm>
-            <a:off x="3381456" y="3896690"/>
+            <a:off x="1952502" y="3896690"/>
             <a:ext cx="236048" cy="173380"/>
           </a:xfrm>
           <a:prstGeom prst="flowChartDecision">
@@ -6158,7 +5969,7 @@
         </p:nvSpPr>
         <p:spPr>
           <a:xfrm>
-            <a:off x="4029156" y="4913449"/>
+            <a:off x="2600202" y="4913449"/>
             <a:ext cx="929296" cy="346760"/>
           </a:xfrm>
           <a:prstGeom prst="rect">
@@ -6202,7 +6013,7 @@
         </p:nvSpPr>
         <p:spPr>
           <a:xfrm>
-            <a:off x="4029156" y="3896690"/>
+            <a:off x="2600202" y="3896690"/>
             <a:ext cx="929296" cy="346760"/>
           </a:xfrm>
           <a:prstGeom prst="rect">
@@ -6246,7 +6057,7 @@
         </p:nvSpPr>
         <p:spPr>
           <a:xfrm>
-            <a:off x="4029156" y="3352800"/>
+            <a:off x="2600202" y="3352800"/>
             <a:ext cx="929296" cy="346760"/>
           </a:xfrm>
           <a:prstGeom prst="rect">
@@ -6293,7 +6104,7 @@
         </p:nvCxnSpPr>
         <p:spPr>
           <a:xfrm flipV="1">
-            <a:off x="3617504" y="3526180"/>
+            <a:off x="2188550" y="3526180"/>
             <a:ext cx="411652" cy="457200"/>
           </a:xfrm>
           <a:prstGeom prst="bentConnector3">
@@ -6333,7 +6144,7 @@
         </p:nvCxnSpPr>
         <p:spPr>
           <a:xfrm>
-            <a:off x="3617504" y="3983380"/>
+            <a:off x="2188550" y="3983380"/>
             <a:ext cx="411652" cy="1103449"/>
           </a:xfrm>
           <a:prstGeom prst="bentConnector3">
@@ -6373,7 +6184,7 @@
         </p:nvCxnSpPr>
         <p:spPr>
           <a:xfrm>
-            <a:off x="3617504" y="3983380"/>
+            <a:off x="2188550" y="3983380"/>
             <a:ext cx="411652" cy="86690"/>
           </a:xfrm>
           <a:prstGeom prst="bentConnector3">
@@ -6385,6 +6196,327 @@
             <a:headEnd type="none" w="med" len="med"/>
             <a:tailEnd type="arrow" w="med" len="med"/>
           </a:ln>
+          <a:effectLst/>
+        </p:spPr>
+        <p:style>
+          <a:lnRef idx="1">
+            <a:schemeClr val="accent4"/>
+          </a:lnRef>
+          <a:fillRef idx="2">
+            <a:schemeClr val="accent4"/>
+          </a:fillRef>
+          <a:effectRef idx="1">
+            <a:schemeClr val="accent4"/>
+          </a:effectRef>
+          <a:fontRef idx="minor">
+            <a:schemeClr val="dk1"/>
+          </a:fontRef>
+        </p:style>
+      </p:cxnSp>
+      <p:sp>
+        <p:nvSpPr>
+          <p:cNvPr id="13" name="Rectangle 6"/>
+          <p:cNvSpPr/>
+          <p:nvPr/>
+        </p:nvSpPr>
+        <p:spPr>
+          <a:xfrm>
+            <a:off x="6819545" y="2733628"/>
+            <a:ext cx="929296" cy="342611"/>
+          </a:xfrm>
+          <a:prstGeom prst="rect">
+            <a:avLst/>
+          </a:prstGeom>
+          <a:ln w="19050"/>
+          <a:effectLst/>
+        </p:spPr>
+        <p:style>
+          <a:lnRef idx="1">
+            <a:schemeClr val="accent4"/>
+          </a:lnRef>
+          <a:fillRef idx="2">
+            <a:schemeClr val="accent4"/>
+          </a:fillRef>
+          <a:effectRef idx="1">
+            <a:schemeClr val="accent4"/>
+          </a:effectRef>
+          <a:fontRef idx="minor">
+            <a:schemeClr val="dk1"/>
+          </a:fontRef>
+        </p:style>
+        <p:txBody>
+          <a:bodyPr rtlCol="0" anchor="ctr"/>
+          <a:lstStyle/>
+          <a:p>
+            <a:pPr algn="ctr"/>
+            <a:r>
+              <a:rPr lang="en-SG" sz="1050" dirty="0" smtClean="0"/>
+              <a:t>Contact</a:t>
+            </a:r>
+            <a:endParaRPr lang="en-SG" sz="1050" dirty="0"/>
+          </a:p>
+        </p:txBody>
+      </p:sp>
+      <p:sp>
+        <p:nvSpPr>
+          <p:cNvPr id="14" name="Rectangle 19"/>
+          <p:cNvSpPr/>
+          <p:nvPr/>
+        </p:nvSpPr>
+        <p:spPr>
+          <a:xfrm>
+            <a:off x="5691810" y="3292934"/>
+            <a:ext cx="929296" cy="346760"/>
+          </a:xfrm>
+          <a:prstGeom prst="rect">
+            <a:avLst/>
+          </a:prstGeom>
+          <a:ln w="19050"/>
+          <a:effectLst/>
+        </p:spPr>
+        <p:style>
+          <a:lnRef idx="1">
+            <a:schemeClr val="accent4"/>
+          </a:lnRef>
+          <a:fillRef idx="2">
+            <a:schemeClr val="accent4"/>
+          </a:fillRef>
+          <a:effectRef idx="1">
+            <a:schemeClr val="accent4"/>
+          </a:effectRef>
+          <a:fontRef idx="minor">
+            <a:schemeClr val="dk1"/>
+          </a:fontRef>
+        </p:style>
+        <p:txBody>
+          <a:bodyPr rtlCol="0" anchor="ctr"/>
+          <a:lstStyle/>
+          <a:p>
+            <a:pPr algn="ctr"/>
+            <a:r>
+              <a:rPr lang="en-US" sz="1050" dirty="0" smtClean="0"/>
+              <a:t>Phone</a:t>
+            </a:r>
+            <a:endParaRPr lang="en-SG" sz="1050" dirty="0"/>
+          </a:p>
+        </p:txBody>
+      </p:sp>
+      <p:sp>
+        <p:nvSpPr>
+          <p:cNvPr id="16" name="Rectangle 20"/>
+          <p:cNvSpPr/>
+          <p:nvPr/>
+        </p:nvSpPr>
+        <p:spPr>
+          <a:xfrm>
+            <a:off x="5706464" y="3752457"/>
+            <a:ext cx="929296" cy="346760"/>
+          </a:xfrm>
+          <a:prstGeom prst="rect">
+            <a:avLst/>
+          </a:prstGeom>
+          <a:ln w="19050"/>
+          <a:effectLst/>
+        </p:spPr>
+        <p:style>
+          <a:lnRef idx="1">
+            <a:schemeClr val="accent4"/>
+          </a:lnRef>
+          <a:fillRef idx="2">
+            <a:schemeClr val="accent4"/>
+          </a:fillRef>
+          <a:effectRef idx="1">
+            <a:schemeClr val="accent4"/>
+          </a:effectRef>
+          <a:fontRef idx="minor">
+            <a:schemeClr val="dk1"/>
+          </a:fontRef>
+        </p:style>
+        <p:txBody>
+          <a:bodyPr rtlCol="0" anchor="ctr"/>
+          <a:lstStyle/>
+          <a:p>
+            <a:pPr algn="ctr"/>
+            <a:r>
+              <a:rPr lang="en-US" sz="1050" dirty="0" smtClean="0"/>
+              <a:t>Email</a:t>
+            </a:r>
+            <a:endParaRPr lang="en-SG" sz="1050" dirty="0"/>
+          </a:p>
+        </p:txBody>
+      </p:sp>
+      <p:sp>
+        <p:nvSpPr>
+          <p:cNvPr id="17" name="Rectangle 21"/>
+          <p:cNvSpPr/>
+          <p:nvPr/>
+        </p:nvSpPr>
+        <p:spPr>
+          <a:xfrm>
+            <a:off x="5706464" y="4209657"/>
+            <a:ext cx="929296" cy="346760"/>
+          </a:xfrm>
+          <a:prstGeom prst="rect">
+            <a:avLst/>
+          </a:prstGeom>
+          <a:ln w="19050"/>
+          <a:effectLst/>
+        </p:spPr>
+        <p:style>
+          <a:lnRef idx="1">
+            <a:schemeClr val="accent4"/>
+          </a:lnRef>
+          <a:fillRef idx="2">
+            <a:schemeClr val="accent4"/>
+          </a:fillRef>
+          <a:effectRef idx="1">
+            <a:schemeClr val="accent4"/>
+          </a:effectRef>
+          <a:fontRef idx="minor">
+            <a:schemeClr val="dk1"/>
+          </a:fontRef>
+        </p:style>
+        <p:txBody>
+          <a:bodyPr rtlCol="0" anchor="ctr"/>
+          <a:lstStyle/>
+          <a:p>
+            <a:pPr algn="ctr"/>
+            <a:r>
+              <a:rPr lang="en-US" sz="1050" dirty="0" smtClean="0"/>
+              <a:t>Address</a:t>
+            </a:r>
+            <a:endParaRPr lang="en-SG" sz="1050" dirty="0"/>
+          </a:p>
+        </p:txBody>
+      </p:sp>
+      <p:sp>
+        <p:nvSpPr>
+          <p:cNvPr id="18" name="Isosceles Triangle 24"/>
+          <p:cNvSpPr/>
+          <p:nvPr/>
+        </p:nvSpPr>
+        <p:spPr>
+          <a:xfrm>
+            <a:off x="7161322" y="3077774"/>
+            <a:ext cx="270504" cy="175523"/>
+          </a:xfrm>
+          <a:prstGeom prst="triangle">
+            <a:avLst/>
+          </a:prstGeom>
+          <a:ln w="19050"/>
+          <a:effectLst/>
+        </p:spPr>
+        <p:style>
+          <a:lnRef idx="1">
+            <a:schemeClr val="accent4"/>
+          </a:lnRef>
+          <a:fillRef idx="2">
+            <a:schemeClr val="accent4"/>
+          </a:fillRef>
+          <a:effectRef idx="1">
+            <a:schemeClr val="accent4"/>
+          </a:effectRef>
+          <a:fontRef idx="minor">
+            <a:schemeClr val="dk1"/>
+          </a:fontRef>
+        </p:style>
+        <p:txBody>
+          <a:bodyPr rtlCol="0" anchor="ctr"/>
+          <a:lstStyle/>
+          <a:p>
+            <a:pPr algn="ctr"/>
+            <a:endParaRPr lang="en-SG" sz="1050"/>
+          </a:p>
+        </p:txBody>
+      </p:sp>
+      <p:cxnSp>
+        <p:nvCxnSpPr>
+          <p:cNvPr id="19" name="Elbow Connector 25"/>
+          <p:cNvCxnSpPr>
+            <a:stCxn id="18" idx="3"/>
+            <a:endCxn id="16" idx="3"/>
+          </p:cNvCxnSpPr>
+          <p:nvPr/>
+        </p:nvCxnSpPr>
+        <p:spPr>
+          <a:xfrm rot="5400000">
+            <a:off x="6629897" y="3259160"/>
+            <a:ext cx="672540" cy="660814"/>
+          </a:xfrm>
+          <a:prstGeom prst="bentConnector2">
+            <a:avLst/>
+          </a:prstGeom>
+          <a:ln w="19050"/>
+          <a:effectLst/>
+        </p:spPr>
+        <p:style>
+          <a:lnRef idx="1">
+            <a:schemeClr val="accent4"/>
+          </a:lnRef>
+          <a:fillRef idx="2">
+            <a:schemeClr val="accent4"/>
+          </a:fillRef>
+          <a:effectRef idx="1">
+            <a:schemeClr val="accent4"/>
+          </a:effectRef>
+          <a:fontRef idx="minor">
+            <a:schemeClr val="dk1"/>
+          </a:fontRef>
+        </p:style>
+      </p:cxnSp>
+      <p:cxnSp>
+        <p:nvCxnSpPr>
+          <p:cNvPr id="20" name="Elbow Connector 26"/>
+          <p:cNvCxnSpPr>
+            <a:stCxn id="18" idx="3"/>
+            <a:endCxn id="14" idx="3"/>
+          </p:cNvCxnSpPr>
+          <p:nvPr/>
+        </p:nvCxnSpPr>
+        <p:spPr>
+          <a:xfrm rot="5400000">
+            <a:off x="6852332" y="3022071"/>
+            <a:ext cx="213017" cy="675468"/>
+          </a:xfrm>
+          <a:prstGeom prst="bentConnector2">
+            <a:avLst/>
+          </a:prstGeom>
+          <a:ln w="19050"/>
+          <a:effectLst/>
+        </p:spPr>
+        <p:style>
+          <a:lnRef idx="1">
+            <a:schemeClr val="accent4"/>
+          </a:lnRef>
+          <a:fillRef idx="2">
+            <a:schemeClr val="accent4"/>
+          </a:fillRef>
+          <a:effectRef idx="1">
+            <a:schemeClr val="accent4"/>
+          </a:effectRef>
+          <a:fontRef idx="minor">
+            <a:schemeClr val="dk1"/>
+          </a:fontRef>
+        </p:style>
+      </p:cxnSp>
+      <p:cxnSp>
+        <p:nvCxnSpPr>
+          <p:cNvPr id="21" name="Elbow Connector 29"/>
+          <p:cNvCxnSpPr>
+            <a:stCxn id="18" idx="3"/>
+            <a:endCxn id="17" idx="3"/>
+          </p:cNvCxnSpPr>
+          <p:nvPr/>
+        </p:nvCxnSpPr>
+        <p:spPr>
+          <a:xfrm rot="5400000">
+            <a:off x="6401297" y="3487760"/>
+            <a:ext cx="1129740" cy="660814"/>
+          </a:xfrm>
+          <a:prstGeom prst="bentConnector2">
+            <a:avLst/>
+          </a:prstGeom>
+          <a:ln w="19050"/>
           <a:effectLst/>
         </p:spPr>
         <p:style>

</xml_diff>

<commit_message>
Tweak images of LO-ISP
</commit_message>
<xml_diff>
--- a/doc/Diagrams.pptx
+++ b/doc/Diagrams.pptx
@@ -6543,7 +6543,7 @@
         <p:spPr>
           <a:xfrm>
             <a:off x="6132002" y="4597467"/>
-            <a:ext cx="1868998" cy="495011"/>
+            <a:ext cx="1868998" cy="327923"/>
           </a:xfrm>
           <a:prstGeom prst="rect">
             <a:avLst/>
@@ -6958,7 +6958,7 @@
         </p:nvSpPr>
         <p:spPr>
           <a:xfrm>
-            <a:off x="6132002" y="5086829"/>
+            <a:off x="6132002" y="4925292"/>
             <a:ext cx="1868998" cy="122745"/>
           </a:xfrm>
           <a:prstGeom prst="rect">
@@ -6998,7 +6998,7 @@
         </p:nvSpPr>
         <p:spPr>
           <a:xfrm>
-            <a:off x="6132002" y="5205221"/>
+            <a:off x="6132002" y="5043684"/>
             <a:ext cx="1868998" cy="271943"/>
           </a:xfrm>
           <a:prstGeom prst="rect">

</xml_diff>

<commit_message>
Add negative example for LO-AssociationClass
</commit_message>
<xml_diff>
--- a/doc/Diagrams.pptx
+++ b/doc/Diagrams.pptx
@@ -8,6 +8,7 @@
     <p:sldId id="256" r:id="rId2"/>
     <p:sldId id="257" r:id="rId3"/>
     <p:sldId id="258" r:id="rId4"/>
+    <p:sldId id="259" r:id="rId5"/>
   </p:sldIdLst>
   <p:sldSz cx="9144000" cy="6858000" type="screen4x3"/>
   <p:notesSz cx="6858000" cy="9144000"/>
@@ -290,7 +291,7 @@
           <a:p>
             <a:fld id="{78C97017-6FC3-485B-9764-EAC9E56C1D49}" type="datetimeFigureOut">
               <a:rPr lang="en-US" smtClean="0"/>
-              <a:t>8/28/2016</a:t>
+              <a:t>9/6/2016</a:t>
             </a:fld>
             <a:endParaRPr lang="en-US"/>
           </a:p>
@@ -460,7 +461,7 @@
           <a:p>
             <a:fld id="{78C97017-6FC3-485B-9764-EAC9E56C1D49}" type="datetimeFigureOut">
               <a:rPr lang="en-US" smtClean="0"/>
-              <a:t>8/28/2016</a:t>
+              <a:t>9/6/2016</a:t>
             </a:fld>
             <a:endParaRPr lang="en-US"/>
           </a:p>
@@ -640,7 +641,7 @@
           <a:p>
             <a:fld id="{78C97017-6FC3-485B-9764-EAC9E56C1D49}" type="datetimeFigureOut">
               <a:rPr lang="en-US" smtClean="0"/>
-              <a:t>8/28/2016</a:t>
+              <a:t>9/6/2016</a:t>
             </a:fld>
             <a:endParaRPr lang="en-US"/>
           </a:p>
@@ -810,7 +811,7 @@
           <a:p>
             <a:fld id="{78C97017-6FC3-485B-9764-EAC9E56C1D49}" type="datetimeFigureOut">
               <a:rPr lang="en-US" smtClean="0"/>
-              <a:t>8/28/2016</a:t>
+              <a:t>9/6/2016</a:t>
             </a:fld>
             <a:endParaRPr lang="en-US"/>
           </a:p>
@@ -1056,7 +1057,7 @@
           <a:p>
             <a:fld id="{78C97017-6FC3-485B-9764-EAC9E56C1D49}" type="datetimeFigureOut">
               <a:rPr lang="en-US" smtClean="0"/>
-              <a:t>8/28/2016</a:t>
+              <a:t>9/6/2016</a:t>
             </a:fld>
             <a:endParaRPr lang="en-US"/>
           </a:p>
@@ -1344,7 +1345,7 @@
           <a:p>
             <a:fld id="{78C97017-6FC3-485B-9764-EAC9E56C1D49}" type="datetimeFigureOut">
               <a:rPr lang="en-US" smtClean="0"/>
-              <a:t>8/28/2016</a:t>
+              <a:t>9/6/2016</a:t>
             </a:fld>
             <a:endParaRPr lang="en-US"/>
           </a:p>
@@ -1766,7 +1767,7 @@
           <a:p>
             <a:fld id="{78C97017-6FC3-485B-9764-EAC9E56C1D49}" type="datetimeFigureOut">
               <a:rPr lang="en-US" smtClean="0"/>
-              <a:t>8/28/2016</a:t>
+              <a:t>9/6/2016</a:t>
             </a:fld>
             <a:endParaRPr lang="en-US"/>
           </a:p>
@@ -1884,7 +1885,7 @@
           <a:p>
             <a:fld id="{78C97017-6FC3-485B-9764-EAC9E56C1D49}" type="datetimeFigureOut">
               <a:rPr lang="en-US" smtClean="0"/>
-              <a:t>8/28/2016</a:t>
+              <a:t>9/6/2016</a:t>
             </a:fld>
             <a:endParaRPr lang="en-US"/>
           </a:p>
@@ -1979,7 +1980,7 @@
           <a:p>
             <a:fld id="{78C97017-6FC3-485B-9764-EAC9E56C1D49}" type="datetimeFigureOut">
               <a:rPr lang="en-US" smtClean="0"/>
-              <a:t>8/28/2016</a:t>
+              <a:t>9/6/2016</a:t>
             </a:fld>
             <a:endParaRPr lang="en-US"/>
           </a:p>
@@ -2256,7 +2257,7 @@
           <a:p>
             <a:fld id="{78C97017-6FC3-485B-9764-EAC9E56C1D49}" type="datetimeFigureOut">
               <a:rPr lang="en-US" smtClean="0"/>
-              <a:t>8/28/2016</a:t>
+              <a:t>9/6/2016</a:t>
             </a:fld>
             <a:endParaRPr lang="en-US"/>
           </a:p>
@@ -2509,7 +2510,7 @@
           <a:p>
             <a:fld id="{78C97017-6FC3-485B-9764-EAC9E56C1D49}" type="datetimeFigureOut">
               <a:rPr lang="en-US" smtClean="0"/>
-              <a:t>8/28/2016</a:t>
+              <a:t>9/6/2016</a:t>
             </a:fld>
             <a:endParaRPr lang="en-US"/>
           </a:p>
@@ -2722,7 +2723,7 @@
           <a:p>
             <a:fld id="{78C97017-6FC3-485B-9764-EAC9E56C1D49}" type="datetimeFigureOut">
               <a:rPr lang="en-US" smtClean="0"/>
-              <a:t>8/28/2016</a:t>
+              <a:t>9/6/2016</a:t>
             </a:fld>
             <a:endParaRPr lang="en-US"/>
           </a:p>
@@ -7755,10 +7756,881 @@
           </a:p>
         </p:txBody>
       </p:sp>
+      <p:sp>
+        <p:nvSpPr>
+          <p:cNvPr id="10" name="TextBox 9"/>
+          <p:cNvSpPr txBox="1"/>
+          <p:nvPr/>
+        </p:nvSpPr>
+        <p:spPr>
+          <a:xfrm>
+            <a:off x="2753969" y="1343892"/>
+            <a:ext cx="777998" cy="261610"/>
+          </a:xfrm>
+          <a:prstGeom prst="rect">
+            <a:avLst/>
+          </a:prstGeom>
+          <a:noFill/>
+        </p:spPr>
+        <p:txBody>
+          <a:bodyPr wrap="square" rtlCol="0">
+            <a:spAutoFit/>
+          </a:bodyPr>
+          <a:lstStyle/>
+          <a:p>
+            <a:r>
+              <a:rPr lang="en-US" sz="1100" dirty="0" err="1" smtClean="0">
+                <a:solidFill>
+                  <a:schemeClr val="accent6">
+                    <a:lumMod val="75000"/>
+                  </a:schemeClr>
+                </a:solidFill>
+              </a:rPr>
+              <a:t>taggings</a:t>
+            </a:r>
+            <a:endParaRPr lang="en-SG" sz="1100" dirty="0">
+              <a:solidFill>
+                <a:schemeClr val="accent6">
+                  <a:lumMod val="75000"/>
+                </a:schemeClr>
+              </a:solidFill>
+            </a:endParaRPr>
+          </a:p>
+        </p:txBody>
+      </p:sp>
     </p:spTree>
     <p:extLst>
       <p:ext uri="{BB962C8B-B14F-4D97-AF65-F5344CB8AC3E}">
         <p14:creationId xmlns:p14="http://schemas.microsoft.com/office/powerpoint/2010/main" val="2454652447"/>
+      </p:ext>
+    </p:extLst>
+  </p:cSld>
+  <p:clrMapOvr>
+    <a:masterClrMapping/>
+  </p:clrMapOvr>
+</p:sld>
+</file>
+
+<file path=ppt/slides/slide4.xml><?xml version="1.0" encoding="utf-8"?>
+<p:sld xmlns:a="http://schemas.openxmlformats.org/drawingml/2006/main" xmlns:r="http://schemas.openxmlformats.org/officeDocument/2006/relationships" xmlns:p="http://schemas.openxmlformats.org/presentationml/2006/main">
+  <p:cSld>
+    <p:spTree>
+      <p:nvGrpSpPr>
+        <p:cNvPr id="1" name=""/>
+        <p:cNvGrpSpPr/>
+        <p:nvPr/>
+      </p:nvGrpSpPr>
+      <p:grpSpPr>
+        <a:xfrm>
+          <a:off x="0" y="0"/>
+          <a:ext cx="0" cy="0"/>
+          <a:chOff x="0" y="0"/>
+          <a:chExt cx="0" cy="0"/>
+        </a:xfrm>
+      </p:grpSpPr>
+      <p:sp>
+        <p:nvSpPr>
+          <p:cNvPr id="2" name="Rectangle 12"/>
+          <p:cNvSpPr/>
+          <p:nvPr/>
+        </p:nvSpPr>
+        <p:spPr>
+          <a:xfrm>
+            <a:off x="1031322" y="1206785"/>
+            <a:ext cx="929296" cy="346760"/>
+          </a:xfrm>
+          <a:prstGeom prst="rect">
+            <a:avLst/>
+          </a:prstGeom>
+          <a:ln w="19050"/>
+          <a:effectLst/>
+        </p:spPr>
+        <p:style>
+          <a:lnRef idx="1">
+            <a:schemeClr val="accent6"/>
+          </a:lnRef>
+          <a:fillRef idx="2">
+            <a:schemeClr val="accent6"/>
+          </a:fillRef>
+          <a:effectRef idx="1">
+            <a:schemeClr val="accent6"/>
+          </a:effectRef>
+          <a:fontRef idx="minor">
+            <a:schemeClr val="dk1"/>
+          </a:fontRef>
+        </p:style>
+        <p:txBody>
+          <a:bodyPr rtlCol="0" anchor="ctr"/>
+          <a:lstStyle/>
+          <a:p>
+            <a:pPr algn="ctr"/>
+            <a:r>
+              <a:rPr lang="en-US" sz="1050" dirty="0" err="1"/>
+              <a:t>AddressBook</a:t>
+            </a:r>
+            <a:endParaRPr lang="en-SG" sz="1050" dirty="0"/>
+          </a:p>
+        </p:txBody>
+      </p:sp>
+      <p:sp>
+        <p:nvSpPr>
+          <p:cNvPr id="3" name="Rectangle 14"/>
+          <p:cNvSpPr/>
+          <p:nvPr/>
+        </p:nvSpPr>
+        <p:spPr>
+          <a:xfrm>
+            <a:off x="2647520" y="517686"/>
+            <a:ext cx="929296" cy="346760"/>
+          </a:xfrm>
+          <a:prstGeom prst="rect">
+            <a:avLst/>
+          </a:prstGeom>
+          <a:ln w="19050"/>
+          <a:effectLst/>
+        </p:spPr>
+        <p:style>
+          <a:lnRef idx="1">
+            <a:schemeClr val="accent6"/>
+          </a:lnRef>
+          <a:fillRef idx="2">
+            <a:schemeClr val="accent6"/>
+          </a:fillRef>
+          <a:effectRef idx="1">
+            <a:schemeClr val="accent6"/>
+          </a:effectRef>
+          <a:fontRef idx="minor">
+            <a:schemeClr val="dk1"/>
+          </a:fontRef>
+        </p:style>
+        <p:txBody>
+          <a:bodyPr rtlCol="0" anchor="ctr"/>
+          <a:lstStyle/>
+          <a:p>
+            <a:pPr algn="ctr"/>
+            <a:r>
+              <a:rPr lang="en-US" sz="1050" dirty="0" smtClean="0"/>
+              <a:t>Unique</a:t>
+            </a:r>
+            <a:br>
+              <a:rPr lang="en-US" sz="1050" dirty="0" smtClean="0"/>
+            </a:br>
+            <a:r>
+              <a:rPr lang="en-US" sz="1050" dirty="0" err="1" smtClean="0"/>
+              <a:t>TagList</a:t>
+            </a:r>
+            <a:endParaRPr lang="en-SG" sz="1050" dirty="0"/>
+          </a:p>
+        </p:txBody>
+      </p:sp>
+      <p:sp>
+        <p:nvSpPr>
+          <p:cNvPr id="4" name="Rectangle 15"/>
+          <p:cNvSpPr/>
+          <p:nvPr/>
+        </p:nvSpPr>
+        <p:spPr>
+          <a:xfrm>
+            <a:off x="2621143" y="1837811"/>
+            <a:ext cx="929296" cy="346760"/>
+          </a:xfrm>
+          <a:prstGeom prst="rect">
+            <a:avLst/>
+          </a:prstGeom>
+          <a:ln w="19050"/>
+          <a:effectLst/>
+        </p:spPr>
+        <p:style>
+          <a:lnRef idx="1">
+            <a:schemeClr val="accent6"/>
+          </a:lnRef>
+          <a:fillRef idx="2">
+            <a:schemeClr val="accent6"/>
+          </a:fillRef>
+          <a:effectRef idx="1">
+            <a:schemeClr val="accent6"/>
+          </a:effectRef>
+          <a:fontRef idx="minor">
+            <a:schemeClr val="dk1"/>
+          </a:fontRef>
+        </p:style>
+        <p:txBody>
+          <a:bodyPr rtlCol="0" anchor="ctr"/>
+          <a:lstStyle/>
+          <a:p>
+            <a:pPr algn="ctr"/>
+            <a:r>
+              <a:rPr lang="en-US" sz="1050" dirty="0" smtClean="0"/>
+              <a:t>Unique</a:t>
+            </a:r>
+            <a:br>
+              <a:rPr lang="en-US" sz="1050" dirty="0" smtClean="0"/>
+            </a:br>
+            <a:r>
+              <a:rPr lang="en-US" sz="1050" dirty="0" err="1" smtClean="0"/>
+              <a:t>PersonList</a:t>
+            </a:r>
+            <a:endParaRPr lang="en-SG" sz="1050" dirty="0"/>
+          </a:p>
+        </p:txBody>
+      </p:sp>
+      <p:sp>
+        <p:nvSpPr>
+          <p:cNvPr id="5" name="Rectangle 18"/>
+          <p:cNvSpPr/>
+          <p:nvPr/>
+        </p:nvSpPr>
+        <p:spPr>
+          <a:xfrm>
+            <a:off x="4190165" y="1837811"/>
+            <a:ext cx="929296" cy="346760"/>
+          </a:xfrm>
+          <a:prstGeom prst="rect">
+            <a:avLst/>
+          </a:prstGeom>
+          <a:ln w="19050"/>
+          <a:effectLst/>
+        </p:spPr>
+        <p:style>
+          <a:lnRef idx="1">
+            <a:schemeClr val="accent6"/>
+          </a:lnRef>
+          <a:fillRef idx="2">
+            <a:schemeClr val="accent6"/>
+          </a:fillRef>
+          <a:effectRef idx="1">
+            <a:schemeClr val="accent6"/>
+          </a:effectRef>
+          <a:fontRef idx="minor">
+            <a:schemeClr val="dk1"/>
+          </a:fontRef>
+        </p:style>
+        <p:txBody>
+          <a:bodyPr rtlCol="0" anchor="ctr"/>
+          <a:lstStyle/>
+          <a:p>
+            <a:pPr algn="ctr"/>
+            <a:r>
+              <a:rPr lang="en-US" sz="1050" dirty="0" smtClean="0"/>
+              <a:t>Person</a:t>
+            </a:r>
+            <a:endParaRPr lang="en-SG" sz="1050" dirty="0"/>
+          </a:p>
+        </p:txBody>
+      </p:sp>
+      <p:cxnSp>
+        <p:nvCxnSpPr>
+          <p:cNvPr id="6" name="Elbow Connector 47"/>
+          <p:cNvCxnSpPr>
+            <a:stCxn id="11" idx="3"/>
+            <a:endCxn id="3" idx="1"/>
+          </p:cNvCxnSpPr>
+          <p:nvPr/>
+        </p:nvCxnSpPr>
+        <p:spPr>
+          <a:xfrm flipV="1">
+            <a:off x="2196666" y="691066"/>
+            <a:ext cx="450854" cy="687145"/>
+          </a:xfrm>
+          <a:prstGeom prst="bentConnector3">
+            <a:avLst/>
+          </a:prstGeom>
+          <a:ln w="19050">
+            <a:headEnd type="none" w="med" len="med"/>
+            <a:tailEnd type="arrow" w="med" len="med"/>
+          </a:ln>
+          <a:effectLst/>
+        </p:spPr>
+        <p:style>
+          <a:lnRef idx="1">
+            <a:schemeClr val="accent6"/>
+          </a:lnRef>
+          <a:fillRef idx="2">
+            <a:schemeClr val="accent6"/>
+          </a:fillRef>
+          <a:effectRef idx="1">
+            <a:schemeClr val="accent6"/>
+          </a:effectRef>
+          <a:fontRef idx="minor">
+            <a:schemeClr val="dk1"/>
+          </a:fontRef>
+        </p:style>
+      </p:cxnSp>
+      <p:cxnSp>
+        <p:nvCxnSpPr>
+          <p:cNvPr id="7" name="Elbow Connector 50"/>
+          <p:cNvCxnSpPr>
+            <a:stCxn id="11" idx="3"/>
+            <a:endCxn id="4" idx="1"/>
+          </p:cNvCxnSpPr>
+          <p:nvPr/>
+        </p:nvCxnSpPr>
+        <p:spPr>
+          <a:xfrm>
+            <a:off x="2196666" y="1378211"/>
+            <a:ext cx="424477" cy="632980"/>
+          </a:xfrm>
+          <a:prstGeom prst="bentConnector3">
+            <a:avLst>
+              <a:gd name="adj1" fmla="val 50000"/>
+            </a:avLst>
+          </a:prstGeom>
+          <a:ln w="19050">
+            <a:headEnd type="none" w="med" len="med"/>
+            <a:tailEnd type="arrow" w="med" len="med"/>
+          </a:ln>
+          <a:effectLst/>
+        </p:spPr>
+        <p:style>
+          <a:lnRef idx="1">
+            <a:schemeClr val="accent6"/>
+          </a:lnRef>
+          <a:fillRef idx="2">
+            <a:schemeClr val="accent6"/>
+          </a:fillRef>
+          <a:effectRef idx="1">
+            <a:schemeClr val="accent6"/>
+          </a:effectRef>
+          <a:fontRef idx="minor">
+            <a:schemeClr val="dk1"/>
+          </a:fontRef>
+        </p:style>
+      </p:cxnSp>
+      <p:sp>
+        <p:nvSpPr>
+          <p:cNvPr id="8" name="Rectangle 78"/>
+          <p:cNvSpPr/>
+          <p:nvPr/>
+        </p:nvSpPr>
+        <p:spPr>
+          <a:xfrm>
+            <a:off x="4190165" y="517686"/>
+            <a:ext cx="929296" cy="346760"/>
+          </a:xfrm>
+          <a:prstGeom prst="rect">
+            <a:avLst/>
+          </a:prstGeom>
+          <a:ln w="19050"/>
+          <a:effectLst/>
+        </p:spPr>
+        <p:style>
+          <a:lnRef idx="1">
+            <a:schemeClr val="accent6"/>
+          </a:lnRef>
+          <a:fillRef idx="2">
+            <a:schemeClr val="accent6"/>
+          </a:fillRef>
+          <a:effectRef idx="1">
+            <a:schemeClr val="accent6"/>
+          </a:effectRef>
+          <a:fontRef idx="minor">
+            <a:schemeClr val="dk1"/>
+          </a:fontRef>
+        </p:style>
+        <p:txBody>
+          <a:bodyPr rtlCol="0" anchor="ctr"/>
+          <a:lstStyle/>
+          <a:p>
+            <a:pPr algn="ctr"/>
+            <a:r>
+              <a:rPr lang="en-US" sz="1050" dirty="0"/>
+              <a:t>Tag</a:t>
+            </a:r>
+            <a:endParaRPr lang="en-SG" sz="1050" dirty="0"/>
+          </a:p>
+        </p:txBody>
+      </p:sp>
+      <p:sp>
+        <p:nvSpPr>
+          <p:cNvPr id="9" name="Flowchart: Decision 96"/>
+          <p:cNvSpPr/>
+          <p:nvPr/>
+        </p:nvSpPr>
+        <p:spPr>
+          <a:xfrm>
+            <a:off x="3576816" y="617076"/>
+            <a:ext cx="236048" cy="173380"/>
+          </a:xfrm>
+          <a:prstGeom prst="flowChartDecision">
+            <a:avLst/>
+          </a:prstGeom>
+          <a:noFill/>
+          <a:ln w="19050"/>
+          <a:effectLst/>
+        </p:spPr>
+        <p:style>
+          <a:lnRef idx="1">
+            <a:schemeClr val="accent6"/>
+          </a:lnRef>
+          <a:fillRef idx="2">
+            <a:schemeClr val="accent6"/>
+          </a:fillRef>
+          <a:effectRef idx="1">
+            <a:schemeClr val="accent6"/>
+          </a:effectRef>
+          <a:fontRef idx="minor">
+            <a:schemeClr val="dk1"/>
+          </a:fontRef>
+        </p:style>
+        <p:txBody>
+          <a:bodyPr rtlCol="0" anchor="ctr"/>
+          <a:lstStyle/>
+          <a:p>
+            <a:pPr algn="ctr"/>
+            <a:endParaRPr lang="en-US" sz="1050"/>
+          </a:p>
+        </p:txBody>
+      </p:sp>
+      <p:sp>
+        <p:nvSpPr>
+          <p:cNvPr id="10" name="Flowchart: Decision 99"/>
+          <p:cNvSpPr/>
+          <p:nvPr/>
+        </p:nvSpPr>
+        <p:spPr>
+          <a:xfrm>
+            <a:off x="3540415" y="1924501"/>
+            <a:ext cx="236048" cy="173380"/>
+          </a:xfrm>
+          <a:prstGeom prst="flowChartDecision">
+            <a:avLst/>
+          </a:prstGeom>
+          <a:noFill/>
+          <a:ln w="19050"/>
+          <a:effectLst/>
+        </p:spPr>
+        <p:style>
+          <a:lnRef idx="1">
+            <a:schemeClr val="accent6"/>
+          </a:lnRef>
+          <a:fillRef idx="2">
+            <a:schemeClr val="accent6"/>
+          </a:fillRef>
+          <a:effectRef idx="1">
+            <a:schemeClr val="accent6"/>
+          </a:effectRef>
+          <a:fontRef idx="minor">
+            <a:schemeClr val="dk1"/>
+          </a:fontRef>
+        </p:style>
+        <p:txBody>
+          <a:bodyPr rtlCol="0" anchor="ctr"/>
+          <a:lstStyle/>
+          <a:p>
+            <a:pPr algn="ctr"/>
+            <a:endParaRPr lang="en-US" sz="1050"/>
+          </a:p>
+        </p:txBody>
+      </p:sp>
+      <p:sp>
+        <p:nvSpPr>
+          <p:cNvPr id="11" name="Flowchart: Decision 105"/>
+          <p:cNvSpPr/>
+          <p:nvPr/>
+        </p:nvSpPr>
+        <p:spPr>
+          <a:xfrm>
+            <a:off x="1960618" y="1291521"/>
+            <a:ext cx="236048" cy="173380"/>
+          </a:xfrm>
+          <a:prstGeom prst="flowChartDecision">
+            <a:avLst/>
+          </a:prstGeom>
+          <a:solidFill>
+            <a:schemeClr val="accent6"/>
+          </a:solidFill>
+          <a:ln w="19050"/>
+          <a:effectLst/>
+        </p:spPr>
+        <p:style>
+          <a:lnRef idx="1">
+            <a:schemeClr val="accent6"/>
+          </a:lnRef>
+          <a:fillRef idx="2">
+            <a:schemeClr val="accent6"/>
+          </a:fillRef>
+          <a:effectRef idx="1">
+            <a:schemeClr val="accent6"/>
+          </a:effectRef>
+          <a:fontRef idx="minor">
+            <a:schemeClr val="dk1"/>
+          </a:fontRef>
+        </p:style>
+        <p:txBody>
+          <a:bodyPr rtlCol="0" anchor="ctr"/>
+          <a:lstStyle/>
+          <a:p>
+            <a:pPr algn="ctr"/>
+            <a:endParaRPr lang="en-US" sz="1050"/>
+          </a:p>
+        </p:txBody>
+      </p:sp>
+      <p:cxnSp>
+        <p:nvCxnSpPr>
+          <p:cNvPr id="12" name="Straight Arrow Connector 113"/>
+          <p:cNvCxnSpPr>
+            <a:stCxn id="9" idx="3"/>
+            <a:endCxn id="8" idx="1"/>
+          </p:cNvCxnSpPr>
+          <p:nvPr/>
+        </p:nvCxnSpPr>
+        <p:spPr>
+          <a:xfrm flipV="1">
+            <a:off x="3812864" y="691066"/>
+            <a:ext cx="377301" cy="12700"/>
+          </a:xfrm>
+          <a:prstGeom prst="straightConnector1">
+            <a:avLst/>
+          </a:prstGeom>
+          <a:ln w="19050">
+            <a:headEnd type="none" w="med" len="med"/>
+            <a:tailEnd type="arrow" w="med" len="med"/>
+          </a:ln>
+          <a:effectLst/>
+        </p:spPr>
+        <p:style>
+          <a:lnRef idx="1">
+            <a:schemeClr val="accent6"/>
+          </a:lnRef>
+          <a:fillRef idx="2">
+            <a:schemeClr val="accent6"/>
+          </a:fillRef>
+          <a:effectRef idx="1">
+            <a:schemeClr val="accent6"/>
+          </a:effectRef>
+          <a:fontRef idx="minor">
+            <a:schemeClr val="dk1"/>
+          </a:fontRef>
+        </p:style>
+      </p:cxnSp>
+      <p:cxnSp>
+        <p:nvCxnSpPr>
+          <p:cNvPr id="13" name="Straight Arrow Connector 114"/>
+          <p:cNvCxnSpPr>
+            <a:stCxn id="10" idx="3"/>
+            <a:endCxn id="5" idx="1"/>
+          </p:cNvCxnSpPr>
+          <p:nvPr/>
+        </p:nvCxnSpPr>
+        <p:spPr>
+          <a:xfrm>
+            <a:off x="3776463" y="2011191"/>
+            <a:ext cx="413702" cy="0"/>
+          </a:xfrm>
+          <a:prstGeom prst="straightConnector1">
+            <a:avLst/>
+          </a:prstGeom>
+          <a:ln w="19050">
+            <a:headEnd type="none" w="med" len="med"/>
+            <a:tailEnd type="arrow" w="med" len="med"/>
+          </a:ln>
+          <a:effectLst/>
+        </p:spPr>
+        <p:style>
+          <a:lnRef idx="1">
+            <a:schemeClr val="accent6"/>
+          </a:lnRef>
+          <a:fillRef idx="2">
+            <a:schemeClr val="accent6"/>
+          </a:fillRef>
+          <a:effectRef idx="1">
+            <a:schemeClr val="accent6"/>
+          </a:effectRef>
+          <a:fontRef idx="minor">
+            <a:schemeClr val="dk1"/>
+          </a:fontRef>
+        </p:style>
+      </p:cxnSp>
+      <p:sp>
+        <p:nvSpPr>
+          <p:cNvPr id="14" name="Rectangle 98"/>
+          <p:cNvSpPr/>
+          <p:nvPr/>
+        </p:nvSpPr>
+        <p:spPr>
+          <a:xfrm>
+            <a:off x="3348216" y="1302849"/>
+            <a:ext cx="929296" cy="346760"/>
+          </a:xfrm>
+          <a:prstGeom prst="rect">
+            <a:avLst/>
+          </a:prstGeom>
+          <a:ln w="19050"/>
+          <a:effectLst/>
+        </p:spPr>
+        <p:style>
+          <a:lnRef idx="1">
+            <a:schemeClr val="accent6"/>
+          </a:lnRef>
+          <a:fillRef idx="2">
+            <a:schemeClr val="accent6"/>
+          </a:fillRef>
+          <a:effectRef idx="1">
+            <a:schemeClr val="accent6"/>
+          </a:effectRef>
+          <a:fontRef idx="minor">
+            <a:schemeClr val="dk1"/>
+          </a:fontRef>
+        </p:style>
+        <p:txBody>
+          <a:bodyPr rtlCol="0" anchor="ctr"/>
+          <a:lstStyle/>
+          <a:p>
+            <a:pPr algn="ctr"/>
+            <a:r>
+              <a:rPr lang="en-US" sz="1050" dirty="0" smtClean="0"/>
+              <a:t>Tagging</a:t>
+            </a:r>
+            <a:endParaRPr lang="en-SG" sz="1050" dirty="0"/>
+          </a:p>
+        </p:txBody>
+      </p:sp>
+      <p:cxnSp>
+        <p:nvCxnSpPr>
+          <p:cNvPr id="15" name="Straight Arrow Connector 48"/>
+          <p:cNvCxnSpPr>
+            <a:stCxn id="5" idx="0"/>
+            <a:endCxn id="8" idx="2"/>
+          </p:cNvCxnSpPr>
+          <p:nvPr/>
+        </p:nvCxnSpPr>
+        <p:spPr>
+          <a:xfrm flipV="1">
+            <a:off x="4654813" y="864446"/>
+            <a:ext cx="0" cy="973365"/>
+          </a:xfrm>
+          <a:prstGeom prst="straightConnector1">
+            <a:avLst/>
+          </a:prstGeom>
+          <a:ln w="19050">
+            <a:headEnd type="none" w="med" len="med"/>
+            <a:tailEnd type="arrow" w="med" len="med"/>
+          </a:ln>
+          <a:effectLst/>
+        </p:spPr>
+        <p:style>
+          <a:lnRef idx="1">
+            <a:schemeClr val="accent6"/>
+          </a:lnRef>
+          <a:fillRef idx="2">
+            <a:schemeClr val="accent6"/>
+          </a:fillRef>
+          <a:effectRef idx="1">
+            <a:schemeClr val="accent6"/>
+          </a:effectRef>
+          <a:fontRef idx="minor">
+            <a:schemeClr val="dk1"/>
+          </a:fontRef>
+        </p:style>
+      </p:cxnSp>
+      <p:cxnSp>
+        <p:nvCxnSpPr>
+          <p:cNvPr id="16" name="Straight Connector 50"/>
+          <p:cNvCxnSpPr>
+            <a:stCxn id="14" idx="3"/>
+          </p:cNvCxnSpPr>
+          <p:nvPr/>
+        </p:nvCxnSpPr>
+        <p:spPr>
+          <a:xfrm>
+            <a:off x="4277512" y="1476229"/>
+            <a:ext cx="377301" cy="0"/>
+          </a:xfrm>
+          <a:prstGeom prst="line">
+            <a:avLst/>
+          </a:prstGeom>
+          <a:ln w="19050">
+            <a:prstDash val="dash"/>
+            <a:headEnd type="none" w="med" len="med"/>
+            <a:tailEnd type="none" w="med" len="med"/>
+          </a:ln>
+          <a:effectLst/>
+        </p:spPr>
+        <p:style>
+          <a:lnRef idx="1">
+            <a:schemeClr val="accent6"/>
+          </a:lnRef>
+          <a:fillRef idx="2">
+            <a:schemeClr val="accent6"/>
+          </a:fillRef>
+          <a:effectRef idx="1">
+            <a:schemeClr val="accent6"/>
+          </a:effectRef>
+          <a:fontRef idx="minor">
+            <a:schemeClr val="dk1"/>
+          </a:fontRef>
+        </p:style>
+      </p:cxnSp>
+      <p:sp>
+        <p:nvSpPr>
+          <p:cNvPr id="18" name="TextBox 56"/>
+          <p:cNvSpPr txBox="1"/>
+          <p:nvPr/>
+        </p:nvSpPr>
+        <p:spPr>
+          <a:xfrm>
+            <a:off x="3112168" y="1174026"/>
+            <a:ext cx="88232" cy="369332"/>
+          </a:xfrm>
+          <a:prstGeom prst="rect">
+            <a:avLst/>
+          </a:prstGeom>
+          <a:noFill/>
+        </p:spPr>
+        <p:txBody>
+          <a:bodyPr wrap="square" rtlCol="0">
+            <a:spAutoFit/>
+          </a:bodyPr>
+          <a:lstStyle/>
+          <a:p>
+            <a:r>
+              <a:rPr lang="en-US" dirty="0" smtClean="0">
+                <a:solidFill>
+                  <a:schemeClr val="accent6">
+                    <a:lumMod val="75000"/>
+                  </a:schemeClr>
+                </a:solidFill>
+              </a:rPr>
+              <a:t>*</a:t>
+            </a:r>
+            <a:endParaRPr lang="en-US" dirty="0">
+              <a:solidFill>
+                <a:schemeClr val="accent6">
+                  <a:lumMod val="75000"/>
+                </a:schemeClr>
+              </a:solidFill>
+            </a:endParaRPr>
+          </a:p>
+        </p:txBody>
+      </p:sp>
+      <p:cxnSp>
+        <p:nvCxnSpPr>
+          <p:cNvPr id="20" name="Elbow Connector 47"/>
+          <p:cNvCxnSpPr>
+            <a:stCxn id="22" idx="3"/>
+            <a:endCxn id="14" idx="1"/>
+          </p:cNvCxnSpPr>
+          <p:nvPr/>
+        </p:nvCxnSpPr>
+        <p:spPr>
+          <a:xfrm rot="16200000" flipH="1" flipV="1">
+            <a:off x="3375826" y="1039191"/>
+            <a:ext cx="409428" cy="464648"/>
+          </a:xfrm>
+          <a:prstGeom prst="bentConnector4">
+            <a:avLst>
+              <a:gd name="adj1" fmla="val -7574"/>
+              <a:gd name="adj2" fmla="val 149199"/>
+            </a:avLst>
+          </a:prstGeom>
+          <a:ln w="19050">
+            <a:headEnd type="none" w="med" len="med"/>
+            <a:tailEnd type="arrow" w="med" len="med"/>
+          </a:ln>
+          <a:effectLst/>
+        </p:spPr>
+        <p:style>
+          <a:lnRef idx="1">
+            <a:schemeClr val="accent6"/>
+          </a:lnRef>
+          <a:fillRef idx="2">
+            <a:schemeClr val="accent6"/>
+          </a:fillRef>
+          <a:effectRef idx="1">
+            <a:schemeClr val="accent6"/>
+          </a:effectRef>
+          <a:fontRef idx="minor">
+            <a:schemeClr val="dk1"/>
+          </a:fontRef>
+        </p:style>
+      </p:cxnSp>
+      <p:sp>
+        <p:nvSpPr>
+          <p:cNvPr id="22" name="Flowchart: Decision 96"/>
+          <p:cNvSpPr/>
+          <p:nvPr/>
+        </p:nvSpPr>
+        <p:spPr>
+          <a:xfrm rot="16200000">
+            <a:off x="3694840" y="1098135"/>
+            <a:ext cx="236048" cy="173380"/>
+          </a:xfrm>
+          <a:prstGeom prst="flowChartDecision">
+            <a:avLst/>
+          </a:prstGeom>
+          <a:noFill/>
+          <a:ln w="19050"/>
+          <a:effectLst/>
+        </p:spPr>
+        <p:style>
+          <a:lnRef idx="1">
+            <a:schemeClr val="accent6"/>
+          </a:lnRef>
+          <a:fillRef idx="2">
+            <a:schemeClr val="accent6"/>
+          </a:fillRef>
+          <a:effectRef idx="1">
+            <a:schemeClr val="accent6"/>
+          </a:effectRef>
+          <a:fontRef idx="minor">
+            <a:schemeClr val="dk1"/>
+          </a:fontRef>
+        </p:style>
+        <p:txBody>
+          <a:bodyPr rtlCol="0" anchor="ctr"/>
+          <a:lstStyle/>
+          <a:p>
+            <a:pPr algn="ctr"/>
+            <a:endParaRPr lang="en-US" sz="1050"/>
+          </a:p>
+        </p:txBody>
+      </p:sp>
+      <p:sp>
+        <p:nvSpPr>
+          <p:cNvPr id="27" name="TextBox 9"/>
+          <p:cNvSpPr txBox="1"/>
+          <p:nvPr/>
+        </p:nvSpPr>
+        <p:spPr>
+          <a:xfrm>
+            <a:off x="2740114" y="1472518"/>
+            <a:ext cx="777998" cy="261610"/>
+          </a:xfrm>
+          <a:prstGeom prst="rect">
+            <a:avLst/>
+          </a:prstGeom>
+          <a:noFill/>
+        </p:spPr>
+        <p:txBody>
+          <a:bodyPr wrap="square" rtlCol="0">
+            <a:spAutoFit/>
+          </a:bodyPr>
+          <a:lstStyle/>
+          <a:p>
+            <a:r>
+              <a:rPr lang="en-US" sz="1100" dirty="0" err="1" smtClean="0">
+                <a:solidFill>
+                  <a:schemeClr val="accent6">
+                    <a:lumMod val="75000"/>
+                  </a:schemeClr>
+                </a:solidFill>
+              </a:rPr>
+              <a:t>taggings</a:t>
+            </a:r>
+            <a:endParaRPr lang="en-SG" sz="1100" dirty="0">
+              <a:solidFill>
+                <a:schemeClr val="accent6">
+                  <a:lumMod val="75000"/>
+                </a:schemeClr>
+              </a:solidFill>
+            </a:endParaRPr>
+          </a:p>
+        </p:txBody>
+      </p:sp>
+    </p:spTree>
+    <p:extLst>
+      <p:ext uri="{BB962C8B-B14F-4D97-AF65-F5344CB8AC3E}">
+        <p14:creationId xmlns:p14="http://schemas.microsoft.com/office/powerpoint/2010/main" val="167328400"/>
       </p:ext>
     </p:extLst>
   </p:cSld>

</xml_diff>

<commit_message>
Command class: make non-abstract
Command class is abstract.

Abstract classes are not an LO covered at level2.

Let's make Command class non-abstract so that students who haven't
learned about abstract classes are not confused by it.
</commit_message>
<xml_diff>
--- a/doc/Diagrams.pptx
+++ b/doc/Diagrams.pptx
@@ -107,6 +107,22 @@
       </a:defRPr>
     </a:lvl9pPr>
   </p:defaultTextStyle>
+  <p:extLst>
+    <p:ext uri="{EFAFB233-063F-42B5-8137-9DF3F51BA10A}">
+      <p15:sldGuideLst xmlns:p15="http://schemas.microsoft.com/office/powerpoint/2012/main">
+        <p15:guide id="1" orient="horz" pos="2160">
+          <p15:clr>
+            <a:srgbClr val="A4A3A4"/>
+          </p15:clr>
+        </p15:guide>
+        <p15:guide id="2" pos="2880">
+          <p15:clr>
+            <a:srgbClr val="A4A3A4"/>
+          </p15:clr>
+        </p15:guide>
+      </p15:sldGuideLst>
+    </p:ext>
+  </p:extLst>
 </p:presentation>
 </file>
 
@@ -291,7 +307,7 @@
           <a:p>
             <a:fld id="{78C97017-6FC3-485B-9764-EAC9E56C1D49}" type="datetimeFigureOut">
               <a:rPr lang="en-US" smtClean="0"/>
-              <a:t>9/6/2016</a:t>
+              <a:t>8/31/2017</a:t>
             </a:fld>
             <a:endParaRPr lang="en-US"/>
           </a:p>
@@ -461,7 +477,7 @@
           <a:p>
             <a:fld id="{78C97017-6FC3-485B-9764-EAC9E56C1D49}" type="datetimeFigureOut">
               <a:rPr lang="en-US" smtClean="0"/>
-              <a:t>9/6/2016</a:t>
+              <a:t>8/31/2017</a:t>
             </a:fld>
             <a:endParaRPr lang="en-US"/>
           </a:p>
@@ -641,7 +657,7 @@
           <a:p>
             <a:fld id="{78C97017-6FC3-485B-9764-EAC9E56C1D49}" type="datetimeFigureOut">
               <a:rPr lang="en-US" smtClean="0"/>
-              <a:t>9/6/2016</a:t>
+              <a:t>8/31/2017</a:t>
             </a:fld>
             <a:endParaRPr lang="en-US"/>
           </a:p>
@@ -811,7 +827,7 @@
           <a:p>
             <a:fld id="{78C97017-6FC3-485B-9764-EAC9E56C1D49}" type="datetimeFigureOut">
               <a:rPr lang="en-US" smtClean="0"/>
-              <a:t>9/6/2016</a:t>
+              <a:t>8/31/2017</a:t>
             </a:fld>
             <a:endParaRPr lang="en-US"/>
           </a:p>
@@ -1057,7 +1073,7 @@
           <a:p>
             <a:fld id="{78C97017-6FC3-485B-9764-EAC9E56C1D49}" type="datetimeFigureOut">
               <a:rPr lang="en-US" smtClean="0"/>
-              <a:t>9/6/2016</a:t>
+              <a:t>8/31/2017</a:t>
             </a:fld>
             <a:endParaRPr lang="en-US"/>
           </a:p>
@@ -1345,7 +1361,7 @@
           <a:p>
             <a:fld id="{78C97017-6FC3-485B-9764-EAC9E56C1D49}" type="datetimeFigureOut">
               <a:rPr lang="en-US" smtClean="0"/>
-              <a:t>9/6/2016</a:t>
+              <a:t>8/31/2017</a:t>
             </a:fld>
             <a:endParaRPr lang="en-US"/>
           </a:p>
@@ -1767,7 +1783,7 @@
           <a:p>
             <a:fld id="{78C97017-6FC3-485B-9764-EAC9E56C1D49}" type="datetimeFigureOut">
               <a:rPr lang="en-US" smtClean="0"/>
-              <a:t>9/6/2016</a:t>
+              <a:t>8/31/2017</a:t>
             </a:fld>
             <a:endParaRPr lang="en-US"/>
           </a:p>
@@ -1885,7 +1901,7 @@
           <a:p>
             <a:fld id="{78C97017-6FC3-485B-9764-EAC9E56C1D49}" type="datetimeFigureOut">
               <a:rPr lang="en-US" smtClean="0"/>
-              <a:t>9/6/2016</a:t>
+              <a:t>8/31/2017</a:t>
             </a:fld>
             <a:endParaRPr lang="en-US"/>
           </a:p>
@@ -1980,7 +1996,7 @@
           <a:p>
             <a:fld id="{78C97017-6FC3-485B-9764-EAC9E56C1D49}" type="datetimeFigureOut">
               <a:rPr lang="en-US" smtClean="0"/>
-              <a:t>9/6/2016</a:t>
+              <a:t>8/31/2017</a:t>
             </a:fld>
             <a:endParaRPr lang="en-US"/>
           </a:p>
@@ -2257,7 +2273,7 @@
           <a:p>
             <a:fld id="{78C97017-6FC3-485B-9764-EAC9E56C1D49}" type="datetimeFigureOut">
               <a:rPr lang="en-US" smtClean="0"/>
-              <a:t>9/6/2016</a:t>
+              <a:t>8/31/2017</a:t>
             </a:fld>
             <a:endParaRPr lang="en-US"/>
           </a:p>
@@ -2510,7 +2526,7 @@
           <a:p>
             <a:fld id="{78C97017-6FC3-485B-9764-EAC9E56C1D49}" type="datetimeFigureOut">
               <a:rPr lang="en-US" smtClean="0"/>
-              <a:t>9/6/2016</a:t>
+              <a:t>8/31/2017</a:t>
             </a:fld>
             <a:endParaRPr lang="en-US"/>
           </a:p>
@@ -2723,7 +2739,7 @@
           <a:p>
             <a:fld id="{78C97017-6FC3-485B-9764-EAC9E56C1D49}" type="datetimeFigureOut">
               <a:rPr lang="en-US" smtClean="0"/>
-              <a:t>9/6/2016</a:t>
+              <a:t>8/31/2017</a:t>
             </a:fld>
             <a:endParaRPr lang="en-US"/>
           </a:p>
@@ -4593,14 +4609,7 @@
           <a:p>
             <a:pPr algn="ctr"/>
             <a:r>
-              <a:rPr lang="en-US" sz="1050" dirty="0"/>
-              <a:t>{abstract}</a:t>
-            </a:r>
-            <a:br>
-              <a:rPr lang="en-US" sz="1050" dirty="0"/>
-            </a:br>
-            <a:r>
-              <a:rPr lang="en-US" sz="1050" dirty="0"/>
+              <a:rPr lang="en-US" sz="1050" dirty="0" smtClean="0"/>
               <a:t>Command</a:t>
             </a:r>
             <a:endParaRPr lang="en-SG" sz="1050" dirty="0"/>

</xml_diff>

<commit_message>
DeveloperGuide: update class diagram to reflect Command association
</commit_message>
<xml_diff>
--- a/doc/Diagrams.pptx
+++ b/doc/Diagrams.pptx
@@ -126,6 +126,10 @@
 </p:presentation>
 </file>
 
+<file path=ppt/revisionInfo.xml><?xml version="1.0" encoding="utf-8"?>
+<p1510:revInfo xmlns:a="http://schemas.openxmlformats.org/drawingml/2006/main" xmlns:r="http://schemas.openxmlformats.org/officeDocument/2006/relationships" xmlns:p1510="http://schemas.microsoft.com/office/powerpoint/2015/10/main"/>
+</file>
+
 <file path=ppt/slideLayouts/slideLayout1.xml><?xml version="1.0" encoding="utf-8"?>
 <p:sldLayout xmlns:a="http://schemas.openxmlformats.org/drawingml/2006/main" xmlns:r="http://schemas.openxmlformats.org/officeDocument/2006/relationships" xmlns:p="http://schemas.openxmlformats.org/presentationml/2006/main" type="title" preserve="1">
   <p:cSld name="Title Slide">
@@ -164,10 +168,9 @@
           <a:lstStyle/>
           <a:p>
             <a:r>
-              <a:rPr lang="en-US" smtClean="0"/>
+              <a:rPr lang="en-US"/>
               <a:t>Click to edit Master title style</a:t>
             </a:r>
-            <a:endParaRPr lang="en-US"/>
           </a:p>
         </p:txBody>
       </p:sp>
@@ -283,10 +286,9 @@
           </a:lstStyle>
           <a:p>
             <a:r>
-              <a:rPr lang="en-US" smtClean="0"/>
+              <a:rPr lang="en-US"/>
               <a:t>Click to edit Master subtitle style</a:t>
             </a:r>
-            <a:endParaRPr lang="en-US"/>
           </a:p>
         </p:txBody>
       </p:sp>
@@ -307,7 +309,7 @@
           <a:p>
             <a:fld id="{78C97017-6FC3-485B-9764-EAC9E56C1D49}" type="datetimeFigureOut">
               <a:rPr lang="en-US" smtClean="0"/>
-              <a:t>8/31/2017</a:t>
+              <a:t>1/28/2018</a:t>
             </a:fld>
             <a:endParaRPr lang="en-US"/>
           </a:p>
@@ -401,10 +403,9 @@
           <a:lstStyle/>
           <a:p>
             <a:r>
-              <a:rPr lang="en-US" smtClean="0"/>
+              <a:rPr lang="en-US"/>
               <a:t>Click to edit Master title style</a:t>
             </a:r>
-            <a:endParaRPr lang="en-US"/>
           </a:p>
         </p:txBody>
       </p:sp>
@@ -425,38 +426,37 @@
           <a:p>
             <a:pPr lvl="0"/>
             <a:r>
-              <a:rPr lang="en-US" smtClean="0"/>
+              <a:rPr lang="en-US"/>
               <a:t>Click to edit Master text styles</a:t>
             </a:r>
           </a:p>
           <a:p>
             <a:pPr lvl="1"/>
             <a:r>
-              <a:rPr lang="en-US" smtClean="0"/>
+              <a:rPr lang="en-US"/>
               <a:t>Second level</a:t>
             </a:r>
           </a:p>
           <a:p>
             <a:pPr lvl="2"/>
             <a:r>
-              <a:rPr lang="en-US" smtClean="0"/>
+              <a:rPr lang="en-US"/>
               <a:t>Third level</a:t>
             </a:r>
           </a:p>
           <a:p>
             <a:pPr lvl="3"/>
             <a:r>
-              <a:rPr lang="en-US" smtClean="0"/>
+              <a:rPr lang="en-US"/>
               <a:t>Fourth level</a:t>
             </a:r>
           </a:p>
           <a:p>
             <a:pPr lvl="4"/>
             <a:r>
-              <a:rPr lang="en-US" smtClean="0"/>
+              <a:rPr lang="en-US"/>
               <a:t>Fifth level</a:t>
             </a:r>
-            <a:endParaRPr lang="en-US"/>
           </a:p>
         </p:txBody>
       </p:sp>
@@ -477,7 +477,7 @@
           <a:p>
             <a:fld id="{78C97017-6FC3-485B-9764-EAC9E56C1D49}" type="datetimeFigureOut">
               <a:rPr lang="en-US" smtClean="0"/>
-              <a:t>8/31/2017</a:t>
+              <a:t>1/28/2018</a:t>
             </a:fld>
             <a:endParaRPr lang="en-US"/>
           </a:p>
@@ -576,10 +576,9 @@
           <a:lstStyle/>
           <a:p>
             <a:r>
-              <a:rPr lang="en-US" smtClean="0"/>
+              <a:rPr lang="en-US"/>
               <a:t>Click to edit Master title style</a:t>
             </a:r>
-            <a:endParaRPr lang="en-US"/>
           </a:p>
         </p:txBody>
       </p:sp>
@@ -605,38 +604,37 @@
           <a:p>
             <a:pPr lvl="0"/>
             <a:r>
-              <a:rPr lang="en-US" smtClean="0"/>
+              <a:rPr lang="en-US"/>
               <a:t>Click to edit Master text styles</a:t>
             </a:r>
           </a:p>
           <a:p>
             <a:pPr lvl="1"/>
             <a:r>
-              <a:rPr lang="en-US" smtClean="0"/>
+              <a:rPr lang="en-US"/>
               <a:t>Second level</a:t>
             </a:r>
           </a:p>
           <a:p>
             <a:pPr lvl="2"/>
             <a:r>
-              <a:rPr lang="en-US" smtClean="0"/>
+              <a:rPr lang="en-US"/>
               <a:t>Third level</a:t>
             </a:r>
           </a:p>
           <a:p>
             <a:pPr lvl="3"/>
             <a:r>
-              <a:rPr lang="en-US" smtClean="0"/>
+              <a:rPr lang="en-US"/>
               <a:t>Fourth level</a:t>
             </a:r>
           </a:p>
           <a:p>
             <a:pPr lvl="4"/>
             <a:r>
-              <a:rPr lang="en-US" smtClean="0"/>
+              <a:rPr lang="en-US"/>
               <a:t>Fifth level</a:t>
             </a:r>
-            <a:endParaRPr lang="en-US"/>
           </a:p>
         </p:txBody>
       </p:sp>
@@ -657,7 +655,7 @@
           <a:p>
             <a:fld id="{78C97017-6FC3-485B-9764-EAC9E56C1D49}" type="datetimeFigureOut">
               <a:rPr lang="en-US" smtClean="0"/>
-              <a:t>8/31/2017</a:t>
+              <a:t>1/28/2018</a:t>
             </a:fld>
             <a:endParaRPr lang="en-US"/>
           </a:p>
@@ -751,10 +749,9 @@
           <a:lstStyle/>
           <a:p>
             <a:r>
-              <a:rPr lang="en-US" smtClean="0"/>
+              <a:rPr lang="en-US"/>
               <a:t>Click to edit Master title style</a:t>
             </a:r>
-            <a:endParaRPr lang="en-US"/>
           </a:p>
         </p:txBody>
       </p:sp>
@@ -775,38 +772,37 @@
           <a:p>
             <a:pPr lvl="0"/>
             <a:r>
-              <a:rPr lang="en-US" smtClean="0"/>
+              <a:rPr lang="en-US"/>
               <a:t>Click to edit Master text styles</a:t>
             </a:r>
           </a:p>
           <a:p>
             <a:pPr lvl="1"/>
             <a:r>
-              <a:rPr lang="en-US" smtClean="0"/>
+              <a:rPr lang="en-US"/>
               <a:t>Second level</a:t>
             </a:r>
           </a:p>
           <a:p>
             <a:pPr lvl="2"/>
             <a:r>
-              <a:rPr lang="en-US" smtClean="0"/>
+              <a:rPr lang="en-US"/>
               <a:t>Third level</a:t>
             </a:r>
           </a:p>
           <a:p>
             <a:pPr lvl="3"/>
             <a:r>
-              <a:rPr lang="en-US" smtClean="0"/>
+              <a:rPr lang="en-US"/>
               <a:t>Fourth level</a:t>
             </a:r>
           </a:p>
           <a:p>
             <a:pPr lvl="4"/>
             <a:r>
-              <a:rPr lang="en-US" smtClean="0"/>
+              <a:rPr lang="en-US"/>
               <a:t>Fifth level</a:t>
             </a:r>
-            <a:endParaRPr lang="en-US"/>
           </a:p>
         </p:txBody>
       </p:sp>
@@ -827,7 +823,7 @@
           <a:p>
             <a:fld id="{78C97017-6FC3-485B-9764-EAC9E56C1D49}" type="datetimeFigureOut">
               <a:rPr lang="en-US" smtClean="0"/>
-              <a:t>8/31/2017</a:t>
+              <a:t>1/28/2018</a:t>
             </a:fld>
             <a:endParaRPr lang="en-US"/>
           </a:p>
@@ -930,10 +926,9 @@
           </a:lstStyle>
           <a:p>
             <a:r>
-              <a:rPr lang="en-US" smtClean="0"/>
+              <a:rPr lang="en-US"/>
               <a:t>Click to edit Master title style</a:t>
             </a:r>
-            <a:endParaRPr lang="en-US"/>
           </a:p>
         </p:txBody>
       </p:sp>
@@ -1050,7 +1045,7 @@
           <a:p>
             <a:pPr lvl="0"/>
             <a:r>
-              <a:rPr lang="en-US" smtClean="0"/>
+              <a:rPr lang="en-US"/>
               <a:t>Click to edit Master text styles</a:t>
             </a:r>
           </a:p>
@@ -1073,7 +1068,7 @@
           <a:p>
             <a:fld id="{78C97017-6FC3-485B-9764-EAC9E56C1D49}" type="datetimeFigureOut">
               <a:rPr lang="en-US" smtClean="0"/>
-              <a:t>8/31/2017</a:t>
+              <a:t>1/28/2018</a:t>
             </a:fld>
             <a:endParaRPr lang="en-US"/>
           </a:p>
@@ -1167,10 +1162,9 @@
           <a:lstStyle/>
           <a:p>
             <a:r>
-              <a:rPr lang="en-US" smtClean="0"/>
+              <a:rPr lang="en-US"/>
               <a:t>Click to edit Master title style</a:t>
             </a:r>
-            <a:endParaRPr lang="en-US"/>
           </a:p>
         </p:txBody>
       </p:sp>
@@ -1224,38 +1218,37 @@
           <a:p>
             <a:pPr lvl="0"/>
             <a:r>
-              <a:rPr lang="en-US" smtClean="0"/>
+              <a:rPr lang="en-US"/>
               <a:t>Click to edit Master text styles</a:t>
             </a:r>
           </a:p>
           <a:p>
             <a:pPr lvl="1"/>
             <a:r>
-              <a:rPr lang="en-US" smtClean="0"/>
+              <a:rPr lang="en-US"/>
               <a:t>Second level</a:t>
             </a:r>
           </a:p>
           <a:p>
             <a:pPr lvl="2"/>
             <a:r>
-              <a:rPr lang="en-US" smtClean="0"/>
+              <a:rPr lang="en-US"/>
               <a:t>Third level</a:t>
             </a:r>
           </a:p>
           <a:p>
             <a:pPr lvl="3"/>
             <a:r>
-              <a:rPr lang="en-US" smtClean="0"/>
+              <a:rPr lang="en-US"/>
               <a:t>Fourth level</a:t>
             </a:r>
           </a:p>
           <a:p>
             <a:pPr lvl="4"/>
             <a:r>
-              <a:rPr lang="en-US" smtClean="0"/>
+              <a:rPr lang="en-US"/>
               <a:t>Fifth level</a:t>
             </a:r>
-            <a:endParaRPr lang="en-US"/>
           </a:p>
         </p:txBody>
       </p:sp>
@@ -1309,38 +1302,37 @@
           <a:p>
             <a:pPr lvl="0"/>
             <a:r>
-              <a:rPr lang="en-US" smtClean="0"/>
+              <a:rPr lang="en-US"/>
               <a:t>Click to edit Master text styles</a:t>
             </a:r>
           </a:p>
           <a:p>
             <a:pPr lvl="1"/>
             <a:r>
-              <a:rPr lang="en-US" smtClean="0"/>
+              <a:rPr lang="en-US"/>
               <a:t>Second level</a:t>
             </a:r>
           </a:p>
           <a:p>
             <a:pPr lvl="2"/>
             <a:r>
-              <a:rPr lang="en-US" smtClean="0"/>
+              <a:rPr lang="en-US"/>
               <a:t>Third level</a:t>
             </a:r>
           </a:p>
           <a:p>
             <a:pPr lvl="3"/>
             <a:r>
-              <a:rPr lang="en-US" smtClean="0"/>
+              <a:rPr lang="en-US"/>
               <a:t>Fourth level</a:t>
             </a:r>
           </a:p>
           <a:p>
             <a:pPr lvl="4"/>
             <a:r>
-              <a:rPr lang="en-US" smtClean="0"/>
+              <a:rPr lang="en-US"/>
               <a:t>Fifth level</a:t>
             </a:r>
-            <a:endParaRPr lang="en-US"/>
           </a:p>
         </p:txBody>
       </p:sp>
@@ -1361,7 +1353,7 @@
           <a:p>
             <a:fld id="{78C97017-6FC3-485B-9764-EAC9E56C1D49}" type="datetimeFigureOut">
               <a:rPr lang="en-US" smtClean="0"/>
-              <a:t>8/31/2017</a:t>
+              <a:t>1/28/2018</a:t>
             </a:fld>
             <a:endParaRPr lang="en-US"/>
           </a:p>
@@ -1459,10 +1451,9 @@
           </a:lstStyle>
           <a:p>
             <a:r>
-              <a:rPr lang="en-US" smtClean="0"/>
+              <a:rPr lang="en-US"/>
               <a:t>Click to edit Master title style</a:t>
             </a:r>
-            <a:endParaRPr lang="en-US"/>
           </a:p>
         </p:txBody>
       </p:sp>
@@ -1525,7 +1516,7 @@
           <a:p>
             <a:pPr lvl="0"/>
             <a:r>
-              <a:rPr lang="en-US" smtClean="0"/>
+              <a:rPr lang="en-US"/>
               <a:t>Click to edit Master text styles</a:t>
             </a:r>
           </a:p>
@@ -1581,38 +1572,37 @@
           <a:p>
             <a:pPr lvl="0"/>
             <a:r>
-              <a:rPr lang="en-US" smtClean="0"/>
+              <a:rPr lang="en-US"/>
               <a:t>Click to edit Master text styles</a:t>
             </a:r>
           </a:p>
           <a:p>
             <a:pPr lvl="1"/>
             <a:r>
-              <a:rPr lang="en-US" smtClean="0"/>
+              <a:rPr lang="en-US"/>
               <a:t>Second level</a:t>
             </a:r>
           </a:p>
           <a:p>
             <a:pPr lvl="2"/>
             <a:r>
-              <a:rPr lang="en-US" smtClean="0"/>
+              <a:rPr lang="en-US"/>
               <a:t>Third level</a:t>
             </a:r>
           </a:p>
           <a:p>
             <a:pPr lvl="3"/>
             <a:r>
-              <a:rPr lang="en-US" smtClean="0"/>
+              <a:rPr lang="en-US"/>
               <a:t>Fourth level</a:t>
             </a:r>
           </a:p>
           <a:p>
             <a:pPr lvl="4"/>
             <a:r>
-              <a:rPr lang="en-US" smtClean="0"/>
+              <a:rPr lang="en-US"/>
               <a:t>Fifth level</a:t>
             </a:r>
-            <a:endParaRPr lang="en-US"/>
           </a:p>
         </p:txBody>
       </p:sp>
@@ -1675,7 +1665,7 @@
           <a:p>
             <a:pPr lvl="0"/>
             <a:r>
-              <a:rPr lang="en-US" smtClean="0"/>
+              <a:rPr lang="en-US"/>
               <a:t>Click to edit Master text styles</a:t>
             </a:r>
           </a:p>
@@ -1731,38 +1721,37 @@
           <a:p>
             <a:pPr lvl="0"/>
             <a:r>
-              <a:rPr lang="en-US" smtClean="0"/>
+              <a:rPr lang="en-US"/>
               <a:t>Click to edit Master text styles</a:t>
             </a:r>
           </a:p>
           <a:p>
             <a:pPr lvl="1"/>
             <a:r>
-              <a:rPr lang="en-US" smtClean="0"/>
+              <a:rPr lang="en-US"/>
               <a:t>Second level</a:t>
             </a:r>
           </a:p>
           <a:p>
             <a:pPr lvl="2"/>
             <a:r>
-              <a:rPr lang="en-US" smtClean="0"/>
+              <a:rPr lang="en-US"/>
               <a:t>Third level</a:t>
             </a:r>
           </a:p>
           <a:p>
             <a:pPr lvl="3"/>
             <a:r>
-              <a:rPr lang="en-US" smtClean="0"/>
+              <a:rPr lang="en-US"/>
               <a:t>Fourth level</a:t>
             </a:r>
           </a:p>
           <a:p>
             <a:pPr lvl="4"/>
             <a:r>
-              <a:rPr lang="en-US" smtClean="0"/>
+              <a:rPr lang="en-US"/>
               <a:t>Fifth level</a:t>
             </a:r>
-            <a:endParaRPr lang="en-US"/>
           </a:p>
         </p:txBody>
       </p:sp>
@@ -1783,7 +1772,7 @@
           <a:p>
             <a:fld id="{78C97017-6FC3-485B-9764-EAC9E56C1D49}" type="datetimeFigureOut">
               <a:rPr lang="en-US" smtClean="0"/>
-              <a:t>8/31/2017</a:t>
+              <a:t>1/28/2018</a:t>
             </a:fld>
             <a:endParaRPr lang="en-US"/>
           </a:p>
@@ -1877,10 +1866,9 @@
           <a:lstStyle/>
           <a:p>
             <a:r>
-              <a:rPr lang="en-US" smtClean="0"/>
+              <a:rPr lang="en-US"/>
               <a:t>Click to edit Master title style</a:t>
             </a:r>
-            <a:endParaRPr lang="en-US"/>
           </a:p>
         </p:txBody>
       </p:sp>
@@ -1901,7 +1889,7 @@
           <a:p>
             <a:fld id="{78C97017-6FC3-485B-9764-EAC9E56C1D49}" type="datetimeFigureOut">
               <a:rPr lang="en-US" smtClean="0"/>
-              <a:t>8/31/2017</a:t>
+              <a:t>1/28/2018</a:t>
             </a:fld>
             <a:endParaRPr lang="en-US"/>
           </a:p>
@@ -1996,7 +1984,7 @@
           <a:p>
             <a:fld id="{78C97017-6FC3-485B-9764-EAC9E56C1D49}" type="datetimeFigureOut">
               <a:rPr lang="en-US" smtClean="0"/>
-              <a:t>8/31/2017</a:t>
+              <a:t>1/28/2018</a:t>
             </a:fld>
             <a:endParaRPr lang="en-US"/>
           </a:p>
@@ -2099,10 +2087,9 @@
           </a:lstStyle>
           <a:p>
             <a:r>
-              <a:rPr lang="en-US" smtClean="0"/>
+              <a:rPr lang="en-US"/>
               <a:t>Click to edit Master title style</a:t>
             </a:r>
-            <a:endParaRPr lang="en-US"/>
           </a:p>
         </p:txBody>
       </p:sp>
@@ -2156,38 +2143,37 @@
           <a:p>
             <a:pPr lvl="0"/>
             <a:r>
-              <a:rPr lang="en-US" smtClean="0"/>
+              <a:rPr lang="en-US"/>
               <a:t>Click to edit Master text styles</a:t>
             </a:r>
           </a:p>
           <a:p>
             <a:pPr lvl="1"/>
             <a:r>
-              <a:rPr lang="en-US" smtClean="0"/>
+              <a:rPr lang="en-US"/>
               <a:t>Second level</a:t>
             </a:r>
           </a:p>
           <a:p>
             <a:pPr lvl="2"/>
             <a:r>
-              <a:rPr lang="en-US" smtClean="0"/>
+              <a:rPr lang="en-US"/>
               <a:t>Third level</a:t>
             </a:r>
           </a:p>
           <a:p>
             <a:pPr lvl="3"/>
             <a:r>
-              <a:rPr lang="en-US" smtClean="0"/>
+              <a:rPr lang="en-US"/>
               <a:t>Fourth level</a:t>
             </a:r>
           </a:p>
           <a:p>
             <a:pPr lvl="4"/>
             <a:r>
-              <a:rPr lang="en-US" smtClean="0"/>
+              <a:rPr lang="en-US"/>
               <a:t>Fifth level</a:t>
             </a:r>
-            <a:endParaRPr lang="en-US"/>
           </a:p>
         </p:txBody>
       </p:sp>
@@ -2250,7 +2236,7 @@
           <a:p>
             <a:pPr lvl="0"/>
             <a:r>
-              <a:rPr lang="en-US" smtClean="0"/>
+              <a:rPr lang="en-US"/>
               <a:t>Click to edit Master text styles</a:t>
             </a:r>
           </a:p>
@@ -2273,7 +2259,7 @@
           <a:p>
             <a:fld id="{78C97017-6FC3-485B-9764-EAC9E56C1D49}" type="datetimeFigureOut">
               <a:rPr lang="en-US" smtClean="0"/>
-              <a:t>8/31/2017</a:t>
+              <a:t>1/28/2018</a:t>
             </a:fld>
             <a:endParaRPr lang="en-US"/>
           </a:p>
@@ -2376,10 +2362,9 @@
           </a:lstStyle>
           <a:p>
             <a:r>
-              <a:rPr lang="en-US" smtClean="0"/>
+              <a:rPr lang="en-US"/>
               <a:t>Click to edit Master title style</a:t>
             </a:r>
-            <a:endParaRPr lang="en-US"/>
           </a:p>
         </p:txBody>
       </p:sp>
@@ -2503,7 +2488,7 @@
           <a:p>
             <a:pPr lvl="0"/>
             <a:r>
-              <a:rPr lang="en-US" smtClean="0"/>
+              <a:rPr lang="en-US"/>
               <a:t>Click to edit Master text styles</a:t>
             </a:r>
           </a:p>
@@ -2526,7 +2511,7 @@
           <a:p>
             <a:fld id="{78C97017-6FC3-485B-9764-EAC9E56C1D49}" type="datetimeFigureOut">
               <a:rPr lang="en-US" smtClean="0"/>
-              <a:t>8/31/2017</a:t>
+              <a:t>1/28/2018</a:t>
             </a:fld>
             <a:endParaRPr lang="en-US"/>
           </a:p>
@@ -2635,10 +2620,9 @@
           <a:lstStyle/>
           <a:p>
             <a:r>
-              <a:rPr lang="en-US" smtClean="0"/>
+              <a:rPr lang="en-US"/>
               <a:t>Click to edit Master title style</a:t>
             </a:r>
-            <a:endParaRPr lang="en-US"/>
           </a:p>
         </p:txBody>
       </p:sp>
@@ -2669,38 +2653,37 @@
           <a:p>
             <a:pPr lvl="0"/>
             <a:r>
-              <a:rPr lang="en-US" smtClean="0"/>
+              <a:rPr lang="en-US"/>
               <a:t>Click to edit Master text styles</a:t>
             </a:r>
           </a:p>
           <a:p>
             <a:pPr lvl="1"/>
             <a:r>
-              <a:rPr lang="en-US" smtClean="0"/>
+              <a:rPr lang="en-US"/>
               <a:t>Second level</a:t>
             </a:r>
           </a:p>
           <a:p>
             <a:pPr lvl="2"/>
             <a:r>
-              <a:rPr lang="en-US" smtClean="0"/>
+              <a:rPr lang="en-US"/>
               <a:t>Third level</a:t>
             </a:r>
           </a:p>
           <a:p>
             <a:pPr lvl="3"/>
             <a:r>
-              <a:rPr lang="en-US" smtClean="0"/>
+              <a:rPr lang="en-US"/>
               <a:t>Fourth level</a:t>
             </a:r>
           </a:p>
           <a:p>
             <a:pPr lvl="4"/>
             <a:r>
-              <a:rPr lang="en-US" smtClean="0"/>
+              <a:rPr lang="en-US"/>
               <a:t>Fifth level</a:t>
             </a:r>
-            <a:endParaRPr lang="en-US"/>
           </a:p>
         </p:txBody>
       </p:sp>
@@ -2739,7 +2722,7 @@
           <a:p>
             <a:fld id="{78C97017-6FC3-485B-9764-EAC9E56C1D49}" type="datetimeFigureOut">
               <a:rPr lang="en-US" smtClean="0"/>
-              <a:t>8/31/2017</a:t>
+              <a:t>1/28/2018</a:t>
             </a:fld>
             <a:endParaRPr lang="en-US"/>
           </a:p>
@@ -3130,14 +3113,13 @@
           <a:lstStyle/>
           <a:p>
             <a:r>
-              <a:rPr lang="en-US" dirty="0" err="1" smtClean="0"/>
+              <a:rPr lang="en-US" dirty="0" err="1"/>
               <a:t>AddressBook</a:t>
             </a:r>
             <a:r>
-              <a:rPr lang="en-US" dirty="0" smtClean="0"/>
+              <a:rPr lang="en-US" dirty="0"/>
               <a:t> – Level 2</a:t>
             </a:r>
-            <a:endParaRPr lang="en-US" dirty="0"/>
           </a:p>
         </p:txBody>
       </p:sp>
@@ -3157,10 +3139,9 @@
           <a:lstStyle/>
           <a:p>
             <a:r>
-              <a:rPr lang="en-US" dirty="0" smtClean="0"/>
+              <a:rPr lang="en-US" dirty="0"/>
               <a:t>Diagrams</a:t>
             </a:r>
-            <a:endParaRPr lang="en-US" dirty="0"/>
           </a:p>
         </p:txBody>
       </p:sp>
@@ -3231,7 +3212,7 @@
           <a:p>
             <a:pPr algn="ctr"/>
             <a:r>
-              <a:rPr lang="en-US" sz="1050" dirty="0" err="1" smtClean="0"/>
+              <a:rPr lang="en-US" sz="1050" dirty="0" err="1"/>
               <a:t>TextUi</a:t>
             </a:r>
             <a:endParaRPr lang="en-SG" sz="1050" dirty="0"/>
@@ -3282,7 +3263,7 @@
           <a:p>
             <a:pPr algn="ctr"/>
             <a:r>
-              <a:rPr lang="en-US" sz="1050" dirty="0" smtClean="0">
+              <a:rPr lang="en-US" sz="1050" dirty="0">
                 <a:solidFill>
                   <a:schemeClr val="bg1"/>
                 </a:solidFill>
@@ -3378,7 +3359,7 @@
           <a:p>
             <a:pPr algn="ctr"/>
             <a:r>
-              <a:rPr lang="en-US" sz="1050" dirty="0" smtClean="0"/>
+              <a:rPr lang="en-US" sz="1050" dirty="0"/>
               <a:t>Parser</a:t>
             </a:r>
             <a:endParaRPr lang="en-SG" sz="1050" dirty="0"/>
@@ -3422,14 +3403,14 @@
           <a:p>
             <a:pPr algn="ctr"/>
             <a:r>
-              <a:rPr lang="en-US" sz="1050" dirty="0" smtClean="0"/>
+              <a:rPr lang="en-US" sz="1050" dirty="0"/>
               <a:t>Unique</a:t>
             </a:r>
             <a:br>
-              <a:rPr lang="en-US" sz="1050" dirty="0" smtClean="0"/>
+              <a:rPr lang="en-US" sz="1050" dirty="0"/>
             </a:br>
             <a:r>
-              <a:rPr lang="en-US" sz="1050" dirty="0" err="1" smtClean="0"/>
+              <a:rPr lang="en-US" sz="1050" dirty="0" err="1"/>
               <a:t>TagList</a:t>
             </a:r>
             <a:endParaRPr lang="en-SG" sz="1050" dirty="0"/>
@@ -3473,14 +3454,14 @@
           <a:p>
             <a:pPr algn="ctr"/>
             <a:r>
-              <a:rPr lang="en-US" sz="1050" dirty="0" smtClean="0"/>
+              <a:rPr lang="en-US" sz="1050" dirty="0"/>
               <a:t>Unique</a:t>
             </a:r>
             <a:br>
-              <a:rPr lang="en-US" sz="1050" dirty="0" smtClean="0"/>
+              <a:rPr lang="en-US" sz="1050" dirty="0"/>
             </a:br>
             <a:r>
-              <a:rPr lang="en-US" sz="1050" dirty="0" err="1" smtClean="0"/>
+              <a:rPr lang="en-US" sz="1050" dirty="0" err="1"/>
               <a:t>PersonList</a:t>
             </a:r>
             <a:endParaRPr lang="en-SG" sz="1050" dirty="0"/>
@@ -3524,7 +3505,7 @@
           <a:p>
             <a:pPr algn="ctr"/>
             <a:r>
-              <a:rPr lang="en-US" sz="1050" dirty="0" smtClean="0"/>
+              <a:rPr lang="en-US" sz="1050" dirty="0"/>
               <a:t>Person</a:t>
             </a:r>
             <a:endParaRPr lang="en-SG" sz="1050" dirty="0"/>
@@ -3568,7 +3549,7 @@
           <a:p>
             <a:pPr algn="ctr"/>
             <a:r>
-              <a:rPr lang="en-US" sz="1050" dirty="0" smtClean="0"/>
+              <a:rPr lang="en-US" sz="1050" dirty="0"/>
               <a:t>Phone</a:t>
             </a:r>
             <a:endParaRPr lang="en-SG" sz="1050" dirty="0"/>
@@ -3612,7 +3593,7 @@
           <a:p>
             <a:pPr algn="ctr"/>
             <a:r>
-              <a:rPr lang="en-US" sz="1050" dirty="0" smtClean="0"/>
+              <a:rPr lang="en-US" sz="1050" dirty="0"/>
               <a:t>Email</a:t>
             </a:r>
             <a:endParaRPr lang="en-SG" sz="1050" dirty="0"/>
@@ -3656,7 +3637,7 @@
           <a:p>
             <a:pPr algn="ctr"/>
             <a:r>
-              <a:rPr lang="en-US" sz="1050" dirty="0" smtClean="0"/>
+              <a:rPr lang="en-US" sz="1050" dirty="0"/>
               <a:t>Address</a:t>
             </a:r>
             <a:endParaRPr lang="en-SG" sz="1050" dirty="0"/>
@@ -3700,7 +3681,7 @@
           <a:p>
             <a:pPr algn="ctr"/>
             <a:r>
-              <a:rPr lang="en-US" sz="1050" dirty="0" err="1" smtClean="0"/>
+              <a:rPr lang="en-US" sz="1050" dirty="0" err="1"/>
               <a:t>StorageFile</a:t>
             </a:r>
             <a:endParaRPr lang="en-SG" sz="1050" dirty="0"/>
@@ -4435,14 +4416,14 @@
           <a:p>
             <a:pPr algn="ctr"/>
             <a:r>
-              <a:rPr lang="en-US" sz="1050" dirty="0" smtClean="0"/>
+              <a:rPr lang="en-US" sz="1050" dirty="0"/>
               <a:t>&lt;&lt;interface&gt;&gt;</a:t>
             </a:r>
           </a:p>
           <a:p>
             <a:pPr algn="ctr"/>
             <a:r>
-              <a:rPr lang="en-US" sz="1050" dirty="0" err="1" smtClean="0"/>
+              <a:rPr lang="en-US" sz="1050" dirty="0" err="1"/>
               <a:t>ReadOnlyPerson</a:t>
             </a:r>
             <a:endParaRPr lang="en-SG" sz="1050" dirty="0"/>
@@ -4609,7 +4590,7 @@
           <a:p>
             <a:pPr algn="ctr"/>
             <a:r>
-              <a:rPr lang="en-US" sz="1050" dirty="0" smtClean="0"/>
+              <a:rPr lang="en-US" sz="1050" dirty="0"/>
               <a:t>Command</a:t>
             </a:r>
             <a:endParaRPr lang="en-SG" sz="1050" dirty="0"/>
@@ -4750,160 +4731,6 @@
       </p:sp>
       <p:sp>
         <p:nvSpPr>
-          <p:cNvPr id="54" name="Isosceles Triangle 53"/>
-          <p:cNvSpPr/>
-          <p:nvPr/>
-        </p:nvSpPr>
-        <p:spPr>
-          <a:xfrm rot="16200000">
-            <a:off x="4131203" y="1571491"/>
-            <a:ext cx="270504" cy="175523"/>
-          </a:xfrm>
-          <a:prstGeom prst="triangle">
-            <a:avLst/>
-          </a:prstGeom>
-          <a:ln w="19050"/>
-          <a:effectLst/>
-        </p:spPr>
-        <p:style>
-          <a:lnRef idx="1">
-            <a:schemeClr val="accent5"/>
-          </a:lnRef>
-          <a:fillRef idx="2">
-            <a:schemeClr val="accent5"/>
-          </a:fillRef>
-          <a:effectRef idx="1">
-            <a:schemeClr val="accent5"/>
-          </a:effectRef>
-          <a:fontRef idx="minor">
-            <a:schemeClr val="dk1"/>
-          </a:fontRef>
-        </p:style>
-        <p:txBody>
-          <a:bodyPr rtlCol="0" anchor="ctr"/>
-          <a:lstStyle/>
-          <a:p>
-            <a:pPr algn="ctr"/>
-            <a:endParaRPr lang="en-SG" sz="1050"/>
-          </a:p>
-        </p:txBody>
-      </p:sp>
-      <p:cxnSp>
-        <p:nvCxnSpPr>
-          <p:cNvPr id="55" name="Elbow Connector 54"/>
-          <p:cNvCxnSpPr>
-            <a:stCxn id="54" idx="3"/>
-            <a:endCxn id="52" idx="3"/>
-          </p:cNvCxnSpPr>
-          <p:nvPr/>
-        </p:nvCxnSpPr>
-        <p:spPr>
-          <a:xfrm flipV="1">
-            <a:off x="4354217" y="1627447"/>
-            <a:ext cx="370183" cy="31806"/>
-          </a:xfrm>
-          <a:prstGeom prst="bentConnector3">
-            <a:avLst>
-              <a:gd name="adj1" fmla="val 50000"/>
-            </a:avLst>
-          </a:prstGeom>
-          <a:noFill/>
-          <a:ln w="19050"/>
-          <a:effectLst/>
-        </p:spPr>
-        <p:style>
-          <a:lnRef idx="1">
-            <a:schemeClr val="accent5"/>
-          </a:lnRef>
-          <a:fillRef idx="2">
-            <a:schemeClr val="accent5"/>
-          </a:fillRef>
-          <a:effectRef idx="1">
-            <a:schemeClr val="accent5"/>
-          </a:effectRef>
-          <a:fontRef idx="minor">
-            <a:schemeClr val="dk1"/>
-          </a:fontRef>
-        </p:style>
-      </p:cxnSp>
-      <p:cxnSp>
-        <p:nvCxnSpPr>
-          <p:cNvPr id="56" name="Elbow Connector 55"/>
-          <p:cNvCxnSpPr>
-            <a:stCxn id="54" idx="3"/>
-            <a:endCxn id="50" idx="3"/>
-          </p:cNvCxnSpPr>
-          <p:nvPr/>
-        </p:nvCxnSpPr>
-        <p:spPr>
-          <a:xfrm flipV="1">
-            <a:off x="4354217" y="1232460"/>
-            <a:ext cx="370183" cy="426793"/>
-          </a:xfrm>
-          <a:prstGeom prst="bentConnector3">
-            <a:avLst>
-              <a:gd name="adj1" fmla="val 50000"/>
-            </a:avLst>
-          </a:prstGeom>
-          <a:noFill/>
-          <a:ln w="19050"/>
-          <a:effectLst/>
-        </p:spPr>
-        <p:style>
-          <a:lnRef idx="1">
-            <a:schemeClr val="accent5"/>
-          </a:lnRef>
-          <a:fillRef idx="2">
-            <a:schemeClr val="accent5"/>
-          </a:fillRef>
-          <a:effectRef idx="1">
-            <a:schemeClr val="accent5"/>
-          </a:effectRef>
-          <a:fontRef idx="minor">
-            <a:schemeClr val="dk1"/>
-          </a:fontRef>
-        </p:style>
-      </p:cxnSp>
-      <p:cxnSp>
-        <p:nvCxnSpPr>
-          <p:cNvPr id="57" name="Elbow Connector 56"/>
-          <p:cNvCxnSpPr>
-            <a:stCxn id="54" idx="3"/>
-            <a:endCxn id="53" idx="3"/>
-          </p:cNvCxnSpPr>
-          <p:nvPr/>
-        </p:nvCxnSpPr>
-        <p:spPr>
-          <a:xfrm>
-            <a:off x="4354217" y="1659253"/>
-            <a:ext cx="370183" cy="363181"/>
-          </a:xfrm>
-          <a:prstGeom prst="bentConnector3">
-            <a:avLst>
-              <a:gd name="adj1" fmla="val 50000"/>
-            </a:avLst>
-          </a:prstGeom>
-          <a:noFill/>
-          <a:ln w="19050"/>
-          <a:effectLst/>
-        </p:spPr>
-        <p:style>
-          <a:lnRef idx="1">
-            <a:schemeClr val="accent5"/>
-          </a:lnRef>
-          <a:fillRef idx="2">
-            <a:schemeClr val="accent5"/>
-          </a:fillRef>
-          <a:effectRef idx="1">
-            <a:schemeClr val="accent5"/>
-          </a:effectRef>
-          <a:fontRef idx="minor">
-            <a:schemeClr val="dk1"/>
-          </a:fontRef>
-        </p:style>
-      </p:cxnSp>
-      <p:sp>
-        <p:nvSpPr>
           <p:cNvPr id="59" name="Rectangle 58"/>
           <p:cNvSpPr/>
           <p:nvPr/>
@@ -4939,51 +4766,13 @@
           <a:p>
             <a:pPr algn="ctr"/>
             <a:r>
-              <a:rPr lang="en-US" sz="1050" dirty="0" smtClean="0"/>
+              <a:rPr lang="en-US" sz="1050" dirty="0"/>
               <a:t>…Command</a:t>
             </a:r>
             <a:endParaRPr lang="en-SG" sz="1050" dirty="0"/>
           </a:p>
         </p:txBody>
       </p:sp>
-      <p:cxnSp>
-        <p:nvCxnSpPr>
-          <p:cNvPr id="60" name="Elbow Connector 59"/>
-          <p:cNvCxnSpPr>
-            <a:stCxn id="54" idx="3"/>
-            <a:endCxn id="59" idx="3"/>
-          </p:cNvCxnSpPr>
-          <p:nvPr/>
-        </p:nvCxnSpPr>
-        <p:spPr>
-          <a:xfrm>
-            <a:off x="4354217" y="1659253"/>
-            <a:ext cx="370183" cy="758167"/>
-          </a:xfrm>
-          <a:prstGeom prst="bentConnector3">
-            <a:avLst>
-              <a:gd name="adj1" fmla="val 50000"/>
-            </a:avLst>
-          </a:prstGeom>
-          <a:noFill/>
-          <a:ln w="19050"/>
-          <a:effectLst/>
-        </p:spPr>
-        <p:style>
-          <a:lnRef idx="1">
-            <a:schemeClr val="accent5"/>
-          </a:lnRef>
-          <a:fillRef idx="2">
-            <a:schemeClr val="accent5"/>
-          </a:fillRef>
-          <a:effectRef idx="1">
-            <a:schemeClr val="accent5"/>
-          </a:effectRef>
-          <a:fontRef idx="minor">
-            <a:schemeClr val="dk1"/>
-          </a:fontRef>
-        </p:style>
-      </p:cxnSp>
       <p:cxnSp>
         <p:nvCxnSpPr>
           <p:cNvPr id="67" name="Elbow Connector 66"/>
@@ -5082,7 +4871,7 @@
           </a:prstGeom>
           <a:ln w="19050">
             <a:solidFill>
-              <a:schemeClr val="accent5"/>
+              <a:srgbClr val="A2D4E1"/>
             </a:solidFill>
             <a:prstDash val="dash"/>
             <a:headEnd type="none" w="med" len="med"/>
@@ -5353,7 +5142,7 @@
           <a:p>
             <a:pPr algn="ctr"/>
             <a:r>
-              <a:rPr lang="en-US" sz="1050" dirty="0" smtClean="0"/>
+              <a:rPr lang="en-US" sz="1050" dirty="0"/>
               <a:t>Messages</a:t>
             </a:r>
             <a:endParaRPr lang="en-SG" sz="1050" dirty="0"/>
@@ -5397,7 +5186,7 @@
           <a:p>
             <a:pPr algn="ctr"/>
             <a:r>
-              <a:rPr lang="en-US" sz="1050" dirty="0" err="1" smtClean="0"/>
+              <a:rPr lang="en-US" sz="1050" dirty="0" err="1"/>
               <a:t>Utils</a:t>
             </a:r>
             <a:endParaRPr lang="en-SG" sz="1050" dirty="0"/>
@@ -5485,7 +5274,7 @@
           <a:p>
             <a:pPr algn="ctr"/>
             <a:r>
-              <a:rPr lang="en-US" sz="1050" dirty="0" smtClean="0"/>
+              <a:rPr lang="en-US" sz="1050" dirty="0"/>
               <a:t>Adapted…</a:t>
             </a:r>
             <a:endParaRPr lang="en-SG" sz="1050" dirty="0"/>
@@ -5767,6 +5556,198 @@
           </a:effectRef>
           <a:fontRef idx="minor">
             <a:schemeClr val="dk1"/>
+          </a:fontRef>
+        </p:style>
+      </p:cxnSp>
+      <p:cxnSp>
+        <p:nvCxnSpPr>
+          <p:cNvPr id="5" name="Connector: Elbow 4">
+            <a:extLst>
+              <a:ext uri="{FF2B5EF4-FFF2-40B4-BE49-F238E27FC236}">
+                <a16:creationId xmlns:a16="http://schemas.microsoft.com/office/drawing/2014/main" id="{0A66D941-77E7-415A-86CF-FA3678A6F41E}"/>
+              </a:ext>
+            </a:extLst>
+          </p:cNvPr>
+          <p:cNvCxnSpPr>
+            <a:cxnSpLocks/>
+            <a:stCxn id="46" idx="3"/>
+            <a:endCxn id="50" idx="3"/>
+          </p:cNvCxnSpPr>
+          <p:nvPr/>
+        </p:nvCxnSpPr>
+        <p:spPr>
+          <a:xfrm flipV="1">
+            <a:off x="4178695" y="1232460"/>
+            <a:ext cx="545705" cy="346048"/>
+          </a:xfrm>
+          <a:prstGeom prst="bentConnector3">
+            <a:avLst>
+              <a:gd name="adj1" fmla="val 50000"/>
+            </a:avLst>
+          </a:prstGeom>
+          <a:ln w="19050">
+            <a:solidFill>
+              <a:srgbClr val="46AAC5"/>
+            </a:solidFill>
+            <a:tailEnd type="triangle"/>
+          </a:ln>
+        </p:spPr>
+        <p:style>
+          <a:lnRef idx="1">
+            <a:schemeClr val="accent1"/>
+          </a:lnRef>
+          <a:fillRef idx="0">
+            <a:schemeClr val="accent1"/>
+          </a:fillRef>
+          <a:effectRef idx="0">
+            <a:schemeClr val="accent1"/>
+          </a:effectRef>
+          <a:fontRef idx="minor">
+            <a:schemeClr val="tx1"/>
+          </a:fontRef>
+        </p:style>
+      </p:cxnSp>
+      <p:cxnSp>
+        <p:nvCxnSpPr>
+          <p:cNvPr id="69" name="Connector: Elbow 68">
+            <a:extLst>
+              <a:ext uri="{FF2B5EF4-FFF2-40B4-BE49-F238E27FC236}">
+                <a16:creationId xmlns:a16="http://schemas.microsoft.com/office/drawing/2014/main" id="{2D4FDDA7-DA8C-4B41-B4F3-ECB532A0199C}"/>
+              </a:ext>
+            </a:extLst>
+          </p:cNvPr>
+          <p:cNvCxnSpPr>
+            <a:cxnSpLocks/>
+            <a:stCxn id="46" idx="3"/>
+            <a:endCxn id="52" idx="3"/>
+          </p:cNvCxnSpPr>
+          <p:nvPr/>
+        </p:nvCxnSpPr>
+        <p:spPr>
+          <a:xfrm>
+            <a:off x="4178695" y="1578508"/>
+            <a:ext cx="545705" cy="48939"/>
+          </a:xfrm>
+          <a:prstGeom prst="bentConnector3">
+            <a:avLst>
+              <a:gd name="adj1" fmla="val 50000"/>
+            </a:avLst>
+          </a:prstGeom>
+          <a:ln w="19050">
+            <a:solidFill>
+              <a:srgbClr val="46AAC5"/>
+            </a:solidFill>
+            <a:tailEnd type="triangle"/>
+          </a:ln>
+        </p:spPr>
+        <p:style>
+          <a:lnRef idx="1">
+            <a:schemeClr val="accent1"/>
+          </a:lnRef>
+          <a:fillRef idx="0">
+            <a:schemeClr val="accent1"/>
+          </a:fillRef>
+          <a:effectRef idx="0">
+            <a:schemeClr val="accent1"/>
+          </a:effectRef>
+          <a:fontRef idx="minor">
+            <a:schemeClr val="tx1"/>
+          </a:fontRef>
+        </p:style>
+      </p:cxnSp>
+      <p:cxnSp>
+        <p:nvCxnSpPr>
+          <p:cNvPr id="72" name="Connector: Elbow 71">
+            <a:extLst>
+              <a:ext uri="{FF2B5EF4-FFF2-40B4-BE49-F238E27FC236}">
+                <a16:creationId xmlns:a16="http://schemas.microsoft.com/office/drawing/2014/main" id="{AFA4519F-4ACC-441E-B3D8-7DFE67FA8F93}"/>
+              </a:ext>
+            </a:extLst>
+          </p:cNvPr>
+          <p:cNvCxnSpPr>
+            <a:cxnSpLocks/>
+            <a:stCxn id="46" idx="3"/>
+            <a:endCxn id="53" idx="3"/>
+          </p:cNvCxnSpPr>
+          <p:nvPr/>
+        </p:nvCxnSpPr>
+        <p:spPr>
+          <a:xfrm>
+            <a:off x="4178695" y="1578508"/>
+            <a:ext cx="545705" cy="443926"/>
+          </a:xfrm>
+          <a:prstGeom prst="bentConnector3">
+            <a:avLst>
+              <a:gd name="adj1" fmla="val 50000"/>
+            </a:avLst>
+          </a:prstGeom>
+          <a:ln w="19050">
+            <a:solidFill>
+              <a:srgbClr val="46AAC5"/>
+            </a:solidFill>
+            <a:tailEnd type="triangle"/>
+          </a:ln>
+        </p:spPr>
+        <p:style>
+          <a:lnRef idx="1">
+            <a:schemeClr val="accent1"/>
+          </a:lnRef>
+          <a:fillRef idx="0">
+            <a:schemeClr val="accent1"/>
+          </a:fillRef>
+          <a:effectRef idx="0">
+            <a:schemeClr val="accent1"/>
+          </a:effectRef>
+          <a:fontRef idx="minor">
+            <a:schemeClr val="tx1"/>
+          </a:fontRef>
+        </p:style>
+      </p:cxnSp>
+      <p:cxnSp>
+        <p:nvCxnSpPr>
+          <p:cNvPr id="75" name="Connector: Elbow 74">
+            <a:extLst>
+              <a:ext uri="{FF2B5EF4-FFF2-40B4-BE49-F238E27FC236}">
+                <a16:creationId xmlns:a16="http://schemas.microsoft.com/office/drawing/2014/main" id="{E22A381B-E58E-4C62-B071-EEE2F6B1B546}"/>
+              </a:ext>
+            </a:extLst>
+          </p:cNvPr>
+          <p:cNvCxnSpPr>
+            <a:cxnSpLocks/>
+            <a:stCxn id="46" idx="3"/>
+            <a:endCxn id="59" idx="3"/>
+          </p:cNvCxnSpPr>
+          <p:nvPr/>
+        </p:nvCxnSpPr>
+        <p:spPr>
+          <a:xfrm>
+            <a:off x="4178695" y="1578508"/>
+            <a:ext cx="545705" cy="838912"/>
+          </a:xfrm>
+          <a:prstGeom prst="bentConnector3">
+            <a:avLst>
+              <a:gd name="adj1" fmla="val 50000"/>
+            </a:avLst>
+          </a:prstGeom>
+          <a:ln w="19050">
+            <a:solidFill>
+              <a:srgbClr val="46AAC5"/>
+            </a:solidFill>
+            <a:tailEnd type="triangle"/>
+          </a:ln>
+        </p:spPr>
+        <p:style>
+          <a:lnRef idx="1">
+            <a:schemeClr val="accent1"/>
+          </a:lnRef>
+          <a:fillRef idx="0">
+            <a:schemeClr val="accent1"/>
+          </a:fillRef>
+          <a:effectRef idx="0">
+            <a:schemeClr val="accent1"/>
+          </a:effectRef>
+          <a:fontRef idx="minor">
+            <a:schemeClr val="tx1"/>
           </a:fontRef>
         </p:style>
       </p:cxnSp>
@@ -5837,7 +5818,7 @@
           <a:p>
             <a:pPr algn="ctr"/>
             <a:r>
-              <a:rPr lang="en-US" sz="1050" dirty="0" smtClean="0"/>
+              <a:rPr lang="en-US" sz="1050" dirty="0"/>
               <a:t>Address</a:t>
             </a:r>
             <a:endParaRPr lang="en-SG" sz="1050" dirty="0"/>
@@ -5881,7 +5862,7 @@
           <a:p>
             <a:pPr algn="ctr"/>
             <a:r>
-              <a:rPr lang="en-US" sz="1050" dirty="0" smtClean="0"/>
+              <a:rPr lang="en-US" sz="1050" dirty="0"/>
               <a:t>Unit</a:t>
             </a:r>
             <a:endParaRPr lang="en-SG" sz="1050" dirty="0"/>
@@ -6008,7 +5989,7 @@
           <a:p>
             <a:pPr algn="ctr"/>
             <a:r>
-              <a:rPr lang="en-US" sz="1050" dirty="0" smtClean="0"/>
+              <a:rPr lang="en-US" sz="1050" dirty="0"/>
               <a:t>Postal code</a:t>
             </a:r>
             <a:endParaRPr lang="en-SG" sz="1050" dirty="0"/>
@@ -6052,7 +6033,7 @@
           <a:p>
             <a:pPr algn="ctr"/>
             <a:r>
-              <a:rPr lang="en-US" sz="1050" dirty="0" smtClean="0"/>
+              <a:rPr lang="en-US" sz="1050" dirty="0"/>
               <a:t>Street</a:t>
             </a:r>
             <a:endParaRPr lang="en-SG" sz="1050" dirty="0"/>
@@ -6096,7 +6077,7 @@
           <a:p>
             <a:pPr algn="ctr"/>
             <a:r>
-              <a:rPr lang="en-US" sz="1050" dirty="0" smtClean="0"/>
+              <a:rPr lang="en-US" sz="1050" dirty="0"/>
               <a:t>Block</a:t>
             </a:r>
             <a:endParaRPr lang="en-SG" sz="1050" dirty="0"/>
@@ -6260,10 +6241,9 @@
           <a:p>
             <a:pPr algn="ctr"/>
             <a:r>
-              <a:rPr lang="en-SG" sz="1050" dirty="0" smtClean="0"/>
+              <a:rPr lang="en-SG" sz="1050" dirty="0"/>
               <a:t>Contact</a:t>
             </a:r>
-            <a:endParaRPr lang="en-SG" sz="1050" dirty="0"/>
           </a:p>
         </p:txBody>
       </p:sp>
@@ -6304,7 +6284,7 @@
           <a:p>
             <a:pPr algn="ctr"/>
             <a:r>
-              <a:rPr lang="en-US" sz="1050" dirty="0" smtClean="0"/>
+              <a:rPr lang="en-US" sz="1050" dirty="0"/>
               <a:t>Phone</a:t>
             </a:r>
             <a:endParaRPr lang="en-SG" sz="1050" dirty="0"/>
@@ -6348,7 +6328,7 @@
           <a:p>
             <a:pPr algn="ctr"/>
             <a:r>
-              <a:rPr lang="en-US" sz="1050" dirty="0" smtClean="0"/>
+              <a:rPr lang="en-US" sz="1050" dirty="0"/>
               <a:t>Email</a:t>
             </a:r>
             <a:endParaRPr lang="en-SG" sz="1050" dirty="0"/>
@@ -6392,7 +6372,7 @@
           <a:p>
             <a:pPr algn="ctr"/>
             <a:r>
-              <a:rPr lang="en-US" sz="1050" dirty="0" smtClean="0"/>
+              <a:rPr lang="en-US" sz="1050" dirty="0"/>
               <a:t>Address</a:t>
             </a:r>
             <a:endParaRPr lang="en-SG" sz="1050" dirty="0"/>
@@ -6581,10 +6561,9 @@
           <a:p>
             <a:pPr algn="ctr"/>
             <a:r>
-              <a:rPr lang="en-SG" sz="1050" dirty="0" smtClean="0"/>
+              <a:rPr lang="en-SG" sz="1050" dirty="0"/>
               <a:t>&lt;&lt;interface&gt;&gt; Printable</a:t>
             </a:r>
-            <a:endParaRPr lang="en-SG" sz="1050" dirty="0"/>
           </a:p>
         </p:txBody>
       </p:sp>
@@ -6625,7 +6604,7 @@
           <a:p>
             <a:pPr algn="ctr"/>
             <a:r>
-              <a:rPr lang="en-US" sz="1050" dirty="0" smtClean="0"/>
+              <a:rPr lang="en-US" sz="1050" dirty="0"/>
               <a:t>Phone</a:t>
             </a:r>
             <a:endParaRPr lang="en-SG" sz="1050" dirty="0"/>
@@ -6669,7 +6648,7 @@
           <a:p>
             <a:pPr algn="ctr"/>
             <a:r>
-              <a:rPr lang="en-US" sz="1050" dirty="0" smtClean="0"/>
+              <a:rPr lang="en-US" sz="1050" dirty="0"/>
               <a:t>Email</a:t>
             </a:r>
             <a:endParaRPr lang="en-SG" sz="1050" dirty="0"/>
@@ -6713,7 +6692,7 @@
           <a:p>
             <a:pPr algn="ctr"/>
             <a:r>
-              <a:rPr lang="en-US" sz="1050" dirty="0" smtClean="0"/>
+              <a:rPr lang="en-US" sz="1050" dirty="0"/>
               <a:t>Address</a:t>
             </a:r>
             <a:endParaRPr lang="en-SG" sz="1050" dirty="0"/>
@@ -6914,7 +6893,7 @@
           <a:p>
             <a:pPr algn="ctr"/>
             <a:r>
-              <a:rPr lang="en-US" sz="1050" dirty="0" smtClean="0"/>
+              <a:rPr lang="en-US" sz="1050" dirty="0"/>
               <a:t>Name</a:t>
             </a:r>
             <a:endParaRPr lang="en-SG" sz="1050" dirty="0"/>
@@ -7037,15 +7016,15 @@
           <a:p>
             <a:pPr algn="ctr"/>
             <a:r>
-              <a:rPr lang="en-US" sz="1050" dirty="0" smtClean="0"/>
+              <a:rPr lang="en-US" sz="1050" dirty="0"/>
               <a:t>+ </a:t>
             </a:r>
             <a:r>
-              <a:rPr lang="en-US" sz="1050" dirty="0" err="1" smtClean="0"/>
+              <a:rPr lang="en-US" sz="1050" dirty="0" err="1"/>
               <a:t>getPrintableString</a:t>
             </a:r>
             <a:r>
-              <a:rPr lang="en-US" sz="1050" dirty="0" smtClean="0"/>
+              <a:rPr lang="en-US" sz="1050" dirty="0"/>
               <a:t>(): String</a:t>
             </a:r>
             <a:endParaRPr lang="en-SG" sz="1050" dirty="0"/>
@@ -7133,14 +7112,14 @@
           <a:p>
             <a:pPr algn="ctr"/>
             <a:r>
-              <a:rPr lang="en-US" sz="1050" dirty="0" smtClean="0"/>
+              <a:rPr lang="en-US" sz="1050" dirty="0"/>
               <a:t>Unique</a:t>
             </a:r>
             <a:br>
-              <a:rPr lang="en-US" sz="1050" dirty="0" smtClean="0"/>
+              <a:rPr lang="en-US" sz="1050" dirty="0"/>
             </a:br>
             <a:r>
-              <a:rPr lang="en-US" sz="1050" dirty="0" err="1" smtClean="0"/>
+              <a:rPr lang="en-US" sz="1050" dirty="0" err="1"/>
               <a:t>TagList</a:t>
             </a:r>
             <a:endParaRPr lang="en-SG" sz="1050" dirty="0"/>
@@ -7184,14 +7163,14 @@
           <a:p>
             <a:pPr algn="ctr"/>
             <a:r>
-              <a:rPr lang="en-US" sz="1050" dirty="0" smtClean="0"/>
+              <a:rPr lang="en-US" sz="1050" dirty="0"/>
               <a:t>Unique</a:t>
             </a:r>
             <a:br>
-              <a:rPr lang="en-US" sz="1050" dirty="0" smtClean="0"/>
+              <a:rPr lang="en-US" sz="1050" dirty="0"/>
             </a:br>
             <a:r>
-              <a:rPr lang="en-US" sz="1050" dirty="0" err="1" smtClean="0"/>
+              <a:rPr lang="en-US" sz="1050" dirty="0" err="1"/>
               <a:t>PersonList</a:t>
             </a:r>
             <a:endParaRPr lang="en-SG" sz="1050" dirty="0"/>
@@ -7235,7 +7214,7 @@
           <a:p>
             <a:pPr algn="ctr"/>
             <a:r>
-              <a:rPr lang="en-US" sz="1050" dirty="0" smtClean="0"/>
+              <a:rPr lang="en-US" sz="1050" dirty="0"/>
               <a:t>Person</a:t>
             </a:r>
             <a:endParaRPr lang="en-SG" sz="1050" dirty="0"/>
@@ -7602,7 +7581,7 @@
           <a:p>
             <a:pPr algn="ctr"/>
             <a:r>
-              <a:rPr lang="en-US" sz="1050" dirty="0" smtClean="0"/>
+              <a:rPr lang="en-US" sz="1050" dirty="0"/>
               <a:t>Tagging</a:t>
             </a:r>
             <a:endParaRPr lang="en-SG" sz="1050" dirty="0"/>
@@ -7746,7 +7725,7 @@
           <a:lstStyle/>
           <a:p>
             <a:r>
-              <a:rPr lang="en-US" dirty="0" smtClean="0">
+              <a:rPr lang="en-US" dirty="0">
                 <a:solidFill>
                   <a:schemeClr val="accent6">
                     <a:lumMod val="75000"/>
@@ -7755,13 +7734,6 @@
               </a:rPr>
               <a:t>*</a:t>
             </a:r>
-            <a:endParaRPr lang="en-US" dirty="0">
-              <a:solidFill>
-                <a:schemeClr val="accent6">
-                  <a:lumMod val="75000"/>
-                </a:schemeClr>
-              </a:solidFill>
-            </a:endParaRPr>
           </a:p>
         </p:txBody>
       </p:sp>
@@ -7788,7 +7760,7 @@
           <a:lstStyle/>
           <a:p>
             <a:r>
-              <a:rPr lang="en-US" sz="1100" dirty="0" err="1" smtClean="0">
+              <a:rPr lang="en-US" sz="1100" dirty="0" err="1">
                 <a:solidFill>
                   <a:schemeClr val="accent6">
                     <a:lumMod val="75000"/>
@@ -7918,14 +7890,14 @@
           <a:p>
             <a:pPr algn="ctr"/>
             <a:r>
-              <a:rPr lang="en-US" sz="1050" dirty="0" smtClean="0"/>
+              <a:rPr lang="en-US" sz="1050" dirty="0"/>
               <a:t>Unique</a:t>
             </a:r>
             <a:br>
-              <a:rPr lang="en-US" sz="1050" dirty="0" smtClean="0"/>
+              <a:rPr lang="en-US" sz="1050" dirty="0"/>
             </a:br>
             <a:r>
-              <a:rPr lang="en-US" sz="1050" dirty="0" err="1" smtClean="0"/>
+              <a:rPr lang="en-US" sz="1050" dirty="0" err="1"/>
               <a:t>TagList</a:t>
             </a:r>
             <a:endParaRPr lang="en-SG" sz="1050" dirty="0"/>
@@ -7969,14 +7941,14 @@
           <a:p>
             <a:pPr algn="ctr"/>
             <a:r>
-              <a:rPr lang="en-US" sz="1050" dirty="0" smtClean="0"/>
+              <a:rPr lang="en-US" sz="1050" dirty="0"/>
               <a:t>Unique</a:t>
             </a:r>
             <a:br>
-              <a:rPr lang="en-US" sz="1050" dirty="0" smtClean="0"/>
+              <a:rPr lang="en-US" sz="1050" dirty="0"/>
             </a:br>
             <a:r>
-              <a:rPr lang="en-US" sz="1050" dirty="0" err="1" smtClean="0"/>
+              <a:rPr lang="en-US" sz="1050" dirty="0" err="1"/>
               <a:t>PersonList</a:t>
             </a:r>
             <a:endParaRPr lang="en-SG" sz="1050" dirty="0"/>
@@ -8020,7 +7992,7 @@
           <a:p>
             <a:pPr algn="ctr"/>
             <a:r>
-              <a:rPr lang="en-US" sz="1050" dirty="0" smtClean="0"/>
+              <a:rPr lang="en-US" sz="1050" dirty="0"/>
               <a:t>Person</a:t>
             </a:r>
             <a:endParaRPr lang="en-SG" sz="1050" dirty="0"/>
@@ -8387,7 +8359,7 @@
           <a:p>
             <a:pPr algn="ctr"/>
             <a:r>
-              <a:rPr lang="en-US" sz="1050" dirty="0" smtClean="0"/>
+              <a:rPr lang="en-US" sz="1050" dirty="0"/>
               <a:t>Tagging</a:t>
             </a:r>
             <a:endParaRPr lang="en-SG" sz="1050" dirty="0"/>
@@ -8493,7 +8465,7 @@
           <a:lstStyle/>
           <a:p>
             <a:r>
-              <a:rPr lang="en-US" dirty="0" smtClean="0">
+              <a:rPr lang="en-US" dirty="0">
                 <a:solidFill>
                   <a:schemeClr val="accent6">
                     <a:lumMod val="75000"/>
@@ -8502,13 +8474,6 @@
               </a:rPr>
               <a:t>*</a:t>
             </a:r>
-            <a:endParaRPr lang="en-US" dirty="0">
-              <a:solidFill>
-                <a:schemeClr val="accent6">
-                  <a:lumMod val="75000"/>
-                </a:schemeClr>
-              </a:solidFill>
-            </a:endParaRPr>
           </a:p>
         </p:txBody>
       </p:sp>
@@ -8617,7 +8582,7 @@
           <a:lstStyle/>
           <a:p>
             <a:r>
-              <a:rPr lang="en-US" sz="1100" dirty="0" err="1" smtClean="0">
+              <a:rPr lang="en-US" sz="1100" dirty="0" err="1">
                 <a:solidFill>
                   <a:schemeClr val="accent6">
                     <a:lumMod val="75000"/>

</xml_diff>

<commit_message>
Interdiff between v1 and v2
</commit_message>
<xml_diff>
--- a/doc/Diagrams.pptx
+++ b/doc/Diagrams.pptx
@@ -309,7 +309,7 @@
           <a:p>
             <a:fld id="{78C97017-6FC3-485B-9764-EAC9E56C1D49}" type="datetimeFigureOut">
               <a:rPr lang="en-US" smtClean="0"/>
-              <a:t>1/28/2018</a:t>
+              <a:t>1/30/2018</a:t>
             </a:fld>
             <a:endParaRPr lang="en-US"/>
           </a:p>
@@ -477,7 +477,7 @@
           <a:p>
             <a:fld id="{78C97017-6FC3-485B-9764-EAC9E56C1D49}" type="datetimeFigureOut">
               <a:rPr lang="en-US" smtClean="0"/>
-              <a:t>1/28/2018</a:t>
+              <a:t>1/30/2018</a:t>
             </a:fld>
             <a:endParaRPr lang="en-US"/>
           </a:p>
@@ -655,7 +655,7 @@
           <a:p>
             <a:fld id="{78C97017-6FC3-485B-9764-EAC9E56C1D49}" type="datetimeFigureOut">
               <a:rPr lang="en-US" smtClean="0"/>
-              <a:t>1/28/2018</a:t>
+              <a:t>1/30/2018</a:t>
             </a:fld>
             <a:endParaRPr lang="en-US"/>
           </a:p>
@@ -823,7 +823,7 @@
           <a:p>
             <a:fld id="{78C97017-6FC3-485B-9764-EAC9E56C1D49}" type="datetimeFigureOut">
               <a:rPr lang="en-US" smtClean="0"/>
-              <a:t>1/28/2018</a:t>
+              <a:t>1/30/2018</a:t>
             </a:fld>
             <a:endParaRPr lang="en-US"/>
           </a:p>
@@ -1068,7 +1068,7 @@
           <a:p>
             <a:fld id="{78C97017-6FC3-485B-9764-EAC9E56C1D49}" type="datetimeFigureOut">
               <a:rPr lang="en-US" smtClean="0"/>
-              <a:t>1/28/2018</a:t>
+              <a:t>1/30/2018</a:t>
             </a:fld>
             <a:endParaRPr lang="en-US"/>
           </a:p>
@@ -1353,7 +1353,7 @@
           <a:p>
             <a:fld id="{78C97017-6FC3-485B-9764-EAC9E56C1D49}" type="datetimeFigureOut">
               <a:rPr lang="en-US" smtClean="0"/>
-              <a:t>1/28/2018</a:t>
+              <a:t>1/30/2018</a:t>
             </a:fld>
             <a:endParaRPr lang="en-US"/>
           </a:p>
@@ -1772,7 +1772,7 @@
           <a:p>
             <a:fld id="{78C97017-6FC3-485B-9764-EAC9E56C1D49}" type="datetimeFigureOut">
               <a:rPr lang="en-US" smtClean="0"/>
-              <a:t>1/28/2018</a:t>
+              <a:t>1/30/2018</a:t>
             </a:fld>
             <a:endParaRPr lang="en-US"/>
           </a:p>
@@ -1889,7 +1889,7 @@
           <a:p>
             <a:fld id="{78C97017-6FC3-485B-9764-EAC9E56C1D49}" type="datetimeFigureOut">
               <a:rPr lang="en-US" smtClean="0"/>
-              <a:t>1/28/2018</a:t>
+              <a:t>1/30/2018</a:t>
             </a:fld>
             <a:endParaRPr lang="en-US"/>
           </a:p>
@@ -1984,7 +1984,7 @@
           <a:p>
             <a:fld id="{78C97017-6FC3-485B-9764-EAC9E56C1D49}" type="datetimeFigureOut">
               <a:rPr lang="en-US" smtClean="0"/>
-              <a:t>1/28/2018</a:t>
+              <a:t>1/30/2018</a:t>
             </a:fld>
             <a:endParaRPr lang="en-US"/>
           </a:p>
@@ -2259,7 +2259,7 @@
           <a:p>
             <a:fld id="{78C97017-6FC3-485B-9764-EAC9E56C1D49}" type="datetimeFigureOut">
               <a:rPr lang="en-US" smtClean="0"/>
-              <a:t>1/28/2018</a:t>
+              <a:t>1/30/2018</a:t>
             </a:fld>
             <a:endParaRPr lang="en-US"/>
           </a:p>
@@ -2511,7 +2511,7 @@
           <a:p>
             <a:fld id="{78C97017-6FC3-485B-9764-EAC9E56C1D49}" type="datetimeFigureOut">
               <a:rPr lang="en-US" smtClean="0"/>
-              <a:t>1/28/2018</a:t>
+              <a:t>1/30/2018</a:t>
             </a:fld>
             <a:endParaRPr lang="en-US"/>
           </a:p>
@@ -2722,7 +2722,7 @@
           <a:p>
             <a:fld id="{78C97017-6FC3-485B-9764-EAC9E56C1D49}" type="datetimeFigureOut">
               <a:rPr lang="en-US" smtClean="0"/>
-              <a:t>1/28/2018</a:t>
+              <a:t>1/30/2018</a:t>
             </a:fld>
             <a:endParaRPr lang="en-US"/>
           </a:p>
@@ -4561,7 +4561,7 @@
         </p:nvSpPr>
         <p:spPr>
           <a:xfrm>
-            <a:off x="2566828" y="1356188"/>
+            <a:off x="6797964" y="1620559"/>
             <a:ext cx="1611867" cy="444640"/>
           </a:xfrm>
           <a:prstGeom prst="rect">
@@ -4729,6 +4729,123 @@
           </a:p>
         </p:txBody>
       </p:sp>
+      <p:cxnSp>
+        <p:nvCxnSpPr>
+          <p:cNvPr id="55" name="Elbow Connector 54"/>
+          <p:cNvCxnSpPr>
+            <a:cxnSpLocks/>
+            <a:stCxn id="59" idx="1"/>
+            <a:endCxn id="46" idx="1"/>
+          </p:cNvCxnSpPr>
+          <p:nvPr/>
+        </p:nvCxnSpPr>
+        <p:spPr>
+          <a:xfrm flipV="1">
+            <a:off x="6128509" y="1842879"/>
+            <a:ext cx="669455" cy="574541"/>
+          </a:xfrm>
+          <a:prstGeom prst="bentConnector3">
+            <a:avLst>
+              <a:gd name="adj1" fmla="val 50000"/>
+            </a:avLst>
+          </a:prstGeom>
+          <a:noFill/>
+          <a:ln w="19050"/>
+          <a:effectLst/>
+        </p:spPr>
+        <p:style>
+          <a:lnRef idx="1">
+            <a:schemeClr val="accent5"/>
+          </a:lnRef>
+          <a:fillRef idx="2">
+            <a:schemeClr val="accent5"/>
+          </a:fillRef>
+          <a:effectRef idx="1">
+            <a:schemeClr val="accent5"/>
+          </a:effectRef>
+          <a:fontRef idx="minor">
+            <a:schemeClr val="dk1"/>
+          </a:fontRef>
+        </p:style>
+      </p:cxnSp>
+      <p:cxnSp>
+        <p:nvCxnSpPr>
+          <p:cNvPr id="56" name="Elbow Connector 55"/>
+          <p:cNvCxnSpPr>
+            <a:cxnSpLocks/>
+            <a:stCxn id="46" idx="1"/>
+            <a:endCxn id="50" idx="1"/>
+          </p:cNvCxnSpPr>
+          <p:nvPr/>
+        </p:nvCxnSpPr>
+        <p:spPr>
+          <a:xfrm rot="10800000">
+            <a:off x="6128510" y="1232461"/>
+            <a:ext cx="669455" cy="610419"/>
+          </a:xfrm>
+          <a:prstGeom prst="bentConnector3">
+            <a:avLst>
+              <a:gd name="adj1" fmla="val 50000"/>
+            </a:avLst>
+          </a:prstGeom>
+          <a:noFill/>
+          <a:ln w="19050"/>
+          <a:effectLst/>
+        </p:spPr>
+        <p:style>
+          <a:lnRef idx="1">
+            <a:schemeClr val="accent5"/>
+          </a:lnRef>
+          <a:fillRef idx="2">
+            <a:schemeClr val="accent5"/>
+          </a:fillRef>
+          <a:effectRef idx="1">
+            <a:schemeClr val="accent5"/>
+          </a:effectRef>
+          <a:fontRef idx="minor">
+            <a:schemeClr val="dk1"/>
+          </a:fontRef>
+        </p:style>
+      </p:cxnSp>
+      <p:cxnSp>
+        <p:nvCxnSpPr>
+          <p:cNvPr id="57" name="Elbow Connector 56"/>
+          <p:cNvCxnSpPr>
+            <a:cxnSpLocks/>
+            <a:stCxn id="53" idx="1"/>
+            <a:endCxn id="46" idx="1"/>
+          </p:cNvCxnSpPr>
+          <p:nvPr/>
+        </p:nvCxnSpPr>
+        <p:spPr>
+          <a:xfrm flipV="1">
+            <a:off x="6128509" y="1842879"/>
+            <a:ext cx="669455" cy="179555"/>
+          </a:xfrm>
+          <a:prstGeom prst="bentConnector3">
+            <a:avLst>
+              <a:gd name="adj1" fmla="val 50000"/>
+            </a:avLst>
+          </a:prstGeom>
+          <a:noFill/>
+          <a:ln w="19050"/>
+          <a:effectLst/>
+        </p:spPr>
+        <p:style>
+          <a:lnRef idx="1">
+            <a:schemeClr val="accent5"/>
+          </a:lnRef>
+          <a:fillRef idx="2">
+            <a:schemeClr val="accent5"/>
+          </a:fillRef>
+          <a:effectRef idx="1">
+            <a:schemeClr val="accent5"/>
+          </a:effectRef>
+          <a:fontRef idx="minor">
+            <a:schemeClr val="dk1"/>
+          </a:fontRef>
+        </p:style>
+      </p:cxnSp>
       <p:sp>
         <p:nvSpPr>
           <p:cNvPr id="59" name="Rectangle 58"/>
@@ -4773,19 +4890,59 @@
           </a:p>
         </p:txBody>
       </p:sp>
+      <p:cxnSp>
+        <p:nvCxnSpPr>
+          <p:cNvPr id="60" name="Elbow Connector 59"/>
+          <p:cNvCxnSpPr>
+            <a:cxnSpLocks/>
+            <a:stCxn id="52" idx="1"/>
+            <a:endCxn id="46" idx="1"/>
+          </p:cNvCxnSpPr>
+          <p:nvPr/>
+        </p:nvCxnSpPr>
+        <p:spPr>
+          <a:xfrm>
+            <a:off x="6128509" y="1627447"/>
+            <a:ext cx="669455" cy="215432"/>
+          </a:xfrm>
+          <a:prstGeom prst="bentConnector3">
+            <a:avLst>
+              <a:gd name="adj1" fmla="val 50000"/>
+            </a:avLst>
+          </a:prstGeom>
+          <a:noFill/>
+          <a:ln w="19050"/>
+          <a:effectLst/>
+        </p:spPr>
+        <p:style>
+          <a:lnRef idx="1">
+            <a:schemeClr val="accent5"/>
+          </a:lnRef>
+          <a:fillRef idx="2">
+            <a:schemeClr val="accent5"/>
+          </a:fillRef>
+          <a:effectRef idx="1">
+            <a:schemeClr val="accent5"/>
+          </a:effectRef>
+          <a:fontRef idx="minor">
+            <a:schemeClr val="dk1"/>
+          </a:fontRef>
+        </p:style>
+      </p:cxnSp>
       <p:cxnSp>
         <p:nvCxnSpPr>
           <p:cNvPr id="67" name="Elbow Connector 66"/>
           <p:cNvCxnSpPr>
+            <a:cxnSpLocks/>
             <a:stCxn id="14" idx="0"/>
-            <a:endCxn id="46" idx="1"/>
+            <a:endCxn id="80" idx="1"/>
           </p:cNvCxnSpPr>
           <p:nvPr/>
         </p:nvCxnSpPr>
         <p:spPr>
           <a:xfrm rot="5400000" flipH="1" flipV="1">
-            <a:off x="1452229" y="1891441"/>
-            <a:ext cx="1427532" cy="801666"/>
+            <a:off x="1541310" y="2072906"/>
+            <a:ext cx="1156986" cy="709282"/>
           </a:xfrm>
           <a:prstGeom prst="bentConnector2">
             <a:avLst/>
@@ -4815,18 +4972,19 @@
       <p:cxnSp>
         <p:nvCxnSpPr>
           <p:cNvPr id="70" name="Elbow Connector 69"/>
-          <p:cNvCxnSpPr/>
+          <p:cNvCxnSpPr>
+            <a:cxnSpLocks/>
+            <a:endCxn id="80" idx="1"/>
+          </p:cNvCxnSpPr>
           <p:nvPr/>
         </p:nvCxnSpPr>
         <p:spPr>
           <a:xfrm rot="5400000" flipH="1" flipV="1">
-            <a:off x="632132" y="1812364"/>
-            <a:ext cx="2293164" cy="1576229"/>
-          </a:xfrm>
-          <a:prstGeom prst="bentConnector3">
-            <a:avLst>
-              <a:gd name="adj1" fmla="val 100051"/>
-            </a:avLst>
+            <a:off x="820572" y="2056625"/>
+            <a:ext cx="1861443" cy="1446302"/>
+          </a:xfrm>
+          <a:prstGeom prst="bentConnector2">
+            <a:avLst/>
           </a:prstGeom>
           <a:ln w="19050">
             <a:solidFill>
@@ -4856,104 +5014,22 @@
       <p:cxnSp>
         <p:nvCxnSpPr>
           <p:cNvPr id="73" name="Elbow Connector 72"/>
-          <p:cNvCxnSpPr/>
+          <p:cNvCxnSpPr>
+            <a:cxnSpLocks/>
+            <a:stCxn id="80" idx="2"/>
+            <a:endCxn id="13" idx="0"/>
+          </p:cNvCxnSpPr>
           <p:nvPr/>
         </p:nvCxnSpPr>
         <p:spPr>
           <a:xfrm rot="5400000">
-            <a:off x="1795164" y="2790743"/>
-            <a:ext cx="1889726" cy="6348"/>
+            <a:off x="2067094" y="2533776"/>
+            <a:ext cx="1675686" cy="750882"/>
           </a:xfrm>
           <a:prstGeom prst="bentConnector3">
             <a:avLst>
               <a:gd name="adj1" fmla="val 50000"/>
             </a:avLst>
-          </a:prstGeom>
-          <a:ln w="19050">
-            <a:solidFill>
-              <a:srgbClr val="A2D4E1"/>
-            </a:solidFill>
-            <a:prstDash val="dash"/>
-            <a:headEnd type="none" w="med" len="med"/>
-            <a:tailEnd type="arrow" w="med" len="med"/>
-          </a:ln>
-          <a:effectLst/>
-        </p:spPr>
-        <p:style>
-          <a:lnRef idx="1">
-            <a:schemeClr val="accent2"/>
-          </a:lnRef>
-          <a:fillRef idx="2">
-            <a:schemeClr val="accent2"/>
-          </a:fillRef>
-          <a:effectRef idx="1">
-            <a:schemeClr val="accent2"/>
-          </a:effectRef>
-          <a:fontRef idx="minor">
-            <a:schemeClr val="dk1"/>
-          </a:fontRef>
-        </p:style>
-      </p:cxnSp>
-      <p:sp>
-        <p:nvSpPr>
-          <p:cNvPr id="81" name="Rectangle 80"/>
-          <p:cNvSpPr/>
-          <p:nvPr/>
-        </p:nvSpPr>
-        <p:spPr>
-          <a:xfrm flipH="1">
-            <a:off x="1219200" y="720040"/>
-            <a:ext cx="1404109" cy="346760"/>
-          </a:xfrm>
-          <a:prstGeom prst="rect">
-            <a:avLst/>
-          </a:prstGeom>
-          <a:ln w="19050"/>
-          <a:effectLst/>
-        </p:spPr>
-        <p:style>
-          <a:lnRef idx="1">
-            <a:schemeClr val="accent5"/>
-          </a:lnRef>
-          <a:fillRef idx="2">
-            <a:schemeClr val="accent5"/>
-          </a:fillRef>
-          <a:effectRef idx="1">
-            <a:schemeClr val="accent5"/>
-          </a:effectRef>
-          <a:fontRef idx="minor">
-            <a:schemeClr val="dk1"/>
-          </a:fontRef>
-        </p:style>
-        <p:txBody>
-          <a:bodyPr rtlCol="0" anchor="ctr"/>
-          <a:lstStyle/>
-          <a:p>
-            <a:pPr algn="ctr"/>
-            <a:r>
-              <a:rPr lang="en-US" sz="1050" dirty="0" err="1"/>
-              <a:t>CommandResult</a:t>
-            </a:r>
-            <a:endParaRPr lang="en-SG" sz="1050" dirty="0"/>
-          </a:p>
-        </p:txBody>
-      </p:sp>
-      <p:cxnSp>
-        <p:nvCxnSpPr>
-          <p:cNvPr id="82" name="Elbow Connector 81"/>
-          <p:cNvCxnSpPr>
-            <a:stCxn id="46" idx="0"/>
-            <a:endCxn id="81" idx="1"/>
-          </p:cNvCxnSpPr>
-          <p:nvPr/>
-        </p:nvCxnSpPr>
-        <p:spPr>
-          <a:xfrm rot="16200000" flipV="1">
-            <a:off x="2766652" y="750077"/>
-            <a:ext cx="462768" cy="749453"/>
-          </a:xfrm>
-          <a:prstGeom prst="bentConnector2">
-            <a:avLst/>
           </a:prstGeom>
           <a:ln w="19050">
             <a:solidFill>
@@ -4980,6 +5056,50 @@
           </a:fontRef>
         </p:style>
       </p:cxnSp>
+      <p:sp>
+        <p:nvSpPr>
+          <p:cNvPr id="81" name="Rectangle 80"/>
+          <p:cNvSpPr/>
+          <p:nvPr/>
+        </p:nvSpPr>
+        <p:spPr>
+          <a:xfrm flipH="1">
+            <a:off x="1219200" y="720040"/>
+            <a:ext cx="1404109" cy="346760"/>
+          </a:xfrm>
+          <a:prstGeom prst="rect">
+            <a:avLst/>
+          </a:prstGeom>
+          <a:ln w="19050"/>
+          <a:effectLst/>
+        </p:spPr>
+        <p:style>
+          <a:lnRef idx="1">
+            <a:schemeClr val="accent5"/>
+          </a:lnRef>
+          <a:fillRef idx="2">
+            <a:schemeClr val="accent5"/>
+          </a:fillRef>
+          <a:effectRef idx="1">
+            <a:schemeClr val="accent5"/>
+          </a:effectRef>
+          <a:fontRef idx="minor">
+            <a:schemeClr val="dk1"/>
+          </a:fontRef>
+        </p:style>
+        <p:txBody>
+          <a:bodyPr rtlCol="0" anchor="ctr"/>
+          <a:lstStyle/>
+          <a:p>
+            <a:pPr algn="ctr"/>
+            <a:r>
+              <a:rPr lang="en-US" sz="1050" dirty="0" err="1"/>
+              <a:t>CommandResult</a:t>
+            </a:r>
+            <a:endParaRPr lang="en-SG" sz="1050" dirty="0"/>
+          </a:p>
+        </p:txBody>
+      </p:sp>
       <p:cxnSp>
         <p:nvCxnSpPr>
           <p:cNvPr id="84" name="Elbow Connector 83"/>
@@ -5113,7 +5233,7 @@
         </p:nvSpPr>
         <p:spPr>
           <a:xfrm>
-            <a:off x="6384802" y="874142"/>
+            <a:off x="6384801" y="717653"/>
             <a:ext cx="929296" cy="346760"/>
           </a:xfrm>
           <a:prstGeom prst="rect">
@@ -5157,7 +5277,7 @@
         </p:nvSpPr>
         <p:spPr>
           <a:xfrm>
-            <a:off x="7592520" y="874142"/>
+            <a:off x="7592519" y="717653"/>
             <a:ext cx="929296" cy="346760"/>
           </a:xfrm>
           <a:prstGeom prst="rect">
@@ -5333,7 +5453,7 @@
         </p:nvCxnSpPr>
         <p:spPr>
           <a:xfrm flipV="1">
-            <a:off x="6689603" y="1199445"/>
+            <a:off x="6689602" y="1042956"/>
             <a:ext cx="0" cy="304800"/>
           </a:xfrm>
           <a:prstGeom prst="straightConnector1">
@@ -5372,7 +5492,7 @@
         </p:nvCxnSpPr>
         <p:spPr>
           <a:xfrm flipV="1">
-            <a:off x="6842003" y="1199445"/>
+            <a:off x="6842002" y="1042956"/>
             <a:ext cx="0" cy="304800"/>
           </a:xfrm>
           <a:prstGeom prst="straightConnector1">
@@ -5411,7 +5531,7 @@
         </p:nvCxnSpPr>
         <p:spPr>
           <a:xfrm flipV="1">
-            <a:off x="6994403" y="1199445"/>
+            <a:off x="6994402" y="1042956"/>
             <a:ext cx="0" cy="304800"/>
           </a:xfrm>
           <a:prstGeom prst="straightConnector1">
@@ -5450,7 +5570,7 @@
         </p:nvCxnSpPr>
         <p:spPr>
           <a:xfrm flipV="1">
-            <a:off x="7864446" y="1199445"/>
+            <a:off x="7864445" y="1042956"/>
             <a:ext cx="0" cy="304800"/>
           </a:xfrm>
           <a:prstGeom prst="straightConnector1">
@@ -5489,7 +5609,7 @@
         </p:nvCxnSpPr>
         <p:spPr>
           <a:xfrm flipV="1">
-            <a:off x="8016846" y="1199445"/>
+            <a:off x="8016845" y="1042956"/>
             <a:ext cx="0" cy="304800"/>
           </a:xfrm>
           <a:prstGeom prst="straightConnector1">
@@ -5528,7 +5648,7 @@
         </p:nvCxnSpPr>
         <p:spPr>
           <a:xfrm flipV="1">
-            <a:off x="8169246" y="1199445"/>
+            <a:off x="8169245" y="1042956"/>
             <a:ext cx="0" cy="304800"/>
           </a:xfrm>
           <a:prstGeom prst="straightConnector1">
@@ -5559,195 +5679,387 @@
           </a:fontRef>
         </p:style>
       </p:cxnSp>
+      <p:sp>
+        <p:nvSpPr>
+          <p:cNvPr id="54" name="Isosceles Triangle 53"/>
+          <p:cNvSpPr/>
+          <p:nvPr/>
+        </p:nvSpPr>
+        <p:spPr>
+          <a:xfrm rot="5400000">
+            <a:off x="6564806" y="1762377"/>
+            <a:ext cx="270504" cy="175523"/>
+          </a:xfrm>
+          <a:prstGeom prst="triangle">
+            <a:avLst/>
+          </a:prstGeom>
+          <a:ln w="19050"/>
+          <a:effectLst/>
+        </p:spPr>
+        <p:style>
+          <a:lnRef idx="1">
+            <a:schemeClr val="accent5"/>
+          </a:lnRef>
+          <a:fillRef idx="2">
+            <a:schemeClr val="accent5"/>
+          </a:fillRef>
+          <a:effectRef idx="1">
+            <a:schemeClr val="accent5"/>
+          </a:effectRef>
+          <a:fontRef idx="minor">
+            <a:schemeClr val="dk1"/>
+          </a:fontRef>
+        </p:style>
+        <p:txBody>
+          <a:bodyPr rtlCol="0" anchor="ctr"/>
+          <a:lstStyle/>
+          <a:p>
+            <a:pPr algn="ctr"/>
+            <a:endParaRPr lang="en-SG" sz="1050"/>
+          </a:p>
+        </p:txBody>
+      </p:sp>
+      <p:sp>
+        <p:nvSpPr>
+          <p:cNvPr id="80" name="Rectangle 79">
+            <a:extLst>
+              <a:ext uri="{FF2B5EF4-FFF2-40B4-BE49-F238E27FC236}">
+                <a16:creationId xmlns:a16="http://schemas.microsoft.com/office/drawing/2014/main" id="{FC882BB2-6C59-4B26-AAFB-255F91F2E51C}"/>
+              </a:ext>
+            </a:extLst>
+          </p:cNvPr>
+          <p:cNvSpPr/>
+          <p:nvPr/>
+        </p:nvSpPr>
+        <p:spPr>
+          <a:xfrm>
+            <a:off x="2474444" y="1626734"/>
+            <a:ext cx="1611867" cy="444640"/>
+          </a:xfrm>
+          <a:prstGeom prst="rect">
+            <a:avLst/>
+          </a:prstGeom>
+          <a:ln w="19050"/>
+          <a:effectLst/>
+        </p:spPr>
+        <p:style>
+          <a:lnRef idx="1">
+            <a:schemeClr val="accent5"/>
+          </a:lnRef>
+          <a:fillRef idx="2">
+            <a:schemeClr val="accent5"/>
+          </a:fillRef>
+          <a:effectRef idx="1">
+            <a:schemeClr val="accent5"/>
+          </a:effectRef>
+          <a:fontRef idx="minor">
+            <a:schemeClr val="dk1"/>
+          </a:fontRef>
+        </p:style>
+        <p:txBody>
+          <a:bodyPr rtlCol="0" anchor="ctr"/>
+          <a:lstStyle/>
+          <a:p>
+            <a:pPr algn="ctr"/>
+            <a:r>
+              <a:rPr lang="en-US" sz="1050" dirty="0" err="1"/>
+              <a:t>AggregateCommand</a:t>
+            </a:r>
+            <a:endParaRPr lang="en-SG" sz="1050" dirty="0"/>
+          </a:p>
+        </p:txBody>
+      </p:sp>
       <p:cxnSp>
         <p:nvCxnSpPr>
-          <p:cNvPr id="5" name="Connector: Elbow 4">
+          <p:cNvPr id="85" name="Elbow Connector 72">
             <a:extLst>
               <a:ext uri="{FF2B5EF4-FFF2-40B4-BE49-F238E27FC236}">
-                <a16:creationId xmlns:a16="http://schemas.microsoft.com/office/drawing/2014/main" id="{0A66D941-77E7-415A-86CF-FA3678A6F41E}"/>
+                <a16:creationId xmlns:a16="http://schemas.microsoft.com/office/drawing/2014/main" id="{9AAFAFD1-1C5C-485E-B2F7-1FCE56076B96}"/>
               </a:ext>
             </a:extLst>
           </p:cNvPr>
           <p:cNvCxnSpPr>
             <a:cxnSpLocks/>
-            <a:stCxn id="46" idx="3"/>
-            <a:endCxn id="50" idx="3"/>
+            <a:stCxn id="80" idx="0"/>
+            <a:endCxn id="81" idx="1"/>
           </p:cNvCxnSpPr>
           <p:nvPr/>
         </p:nvCxnSpPr>
         <p:spPr>
-          <a:xfrm flipV="1">
-            <a:off x="4178695" y="1232460"/>
-            <a:ext cx="545705" cy="346048"/>
-          </a:xfrm>
-          <a:prstGeom prst="bentConnector3">
-            <a:avLst>
-              <a:gd name="adj1" fmla="val 50000"/>
-            </a:avLst>
-          </a:prstGeom>
+          <a:xfrm rot="16200000" flipV="1">
+            <a:off x="2585187" y="931542"/>
+            <a:ext cx="733314" cy="657069"/>
+          </a:xfrm>
+          <a:prstGeom prst="bentConnector2">
+            <a:avLst/>
+          </a:prstGeom>
+          <a:ln w="19050">
+            <a:solidFill>
+              <a:schemeClr val="accent5"/>
+            </a:solidFill>
+            <a:prstDash val="dash"/>
+            <a:headEnd type="none" w="med" len="med"/>
+            <a:tailEnd type="arrow" w="med" len="med"/>
+          </a:ln>
+          <a:effectLst/>
+        </p:spPr>
+        <p:style>
+          <a:lnRef idx="1">
+            <a:schemeClr val="accent2"/>
+          </a:lnRef>
+          <a:fillRef idx="2">
+            <a:schemeClr val="accent2"/>
+          </a:fillRef>
+          <a:effectRef idx="1">
+            <a:schemeClr val="accent2"/>
+          </a:effectRef>
+          <a:fontRef idx="minor">
+            <a:schemeClr val="dk1"/>
+          </a:fontRef>
+        </p:style>
+      </p:cxnSp>
+      <p:sp>
+        <p:nvSpPr>
+          <p:cNvPr id="95" name="Flowchart: Decision 94">
+            <a:extLst>
+              <a:ext uri="{FF2B5EF4-FFF2-40B4-BE49-F238E27FC236}">
+                <a16:creationId xmlns:a16="http://schemas.microsoft.com/office/drawing/2014/main" id="{5C78FDD6-881F-4A93-87FF-E28FA800139B}"/>
+              </a:ext>
+            </a:extLst>
+          </p:cNvPr>
+          <p:cNvSpPr/>
+          <p:nvPr/>
+        </p:nvSpPr>
+        <p:spPr>
+          <a:xfrm>
+            <a:off x="4086311" y="1762364"/>
+            <a:ext cx="236048" cy="173380"/>
+          </a:xfrm>
+          <a:prstGeom prst="flowChartDecision">
+            <a:avLst/>
+          </a:prstGeom>
+          <a:solidFill>
+            <a:srgbClr val="46AAC5"/>
+          </a:solidFill>
           <a:ln w="19050">
             <a:solidFill>
               <a:srgbClr val="46AAC5"/>
             </a:solidFill>
-            <a:tailEnd type="triangle"/>
           </a:ln>
-        </p:spPr>
-        <p:style>
-          <a:lnRef idx="1">
-            <a:schemeClr val="accent1"/>
-          </a:lnRef>
-          <a:fillRef idx="0">
-            <a:schemeClr val="accent1"/>
-          </a:fillRef>
-          <a:effectRef idx="0">
-            <a:schemeClr val="accent1"/>
-          </a:effectRef>
-          <a:fontRef idx="minor">
-            <a:schemeClr val="tx1"/>
-          </a:fontRef>
-        </p:style>
-      </p:cxnSp>
+          <a:effectLst/>
+        </p:spPr>
+        <p:style>
+          <a:lnRef idx="1">
+            <a:schemeClr val="accent6"/>
+          </a:lnRef>
+          <a:fillRef idx="2">
+            <a:schemeClr val="accent6"/>
+          </a:fillRef>
+          <a:effectRef idx="1">
+            <a:schemeClr val="accent6"/>
+          </a:effectRef>
+          <a:fontRef idx="minor">
+            <a:schemeClr val="dk1"/>
+          </a:fontRef>
+        </p:style>
+        <p:txBody>
+          <a:bodyPr rtlCol="0" anchor="ctr"/>
+          <a:lstStyle/>
+          <a:p>
+            <a:pPr algn="ctr"/>
+            <a:endParaRPr lang="en-US" sz="1050">
+              <a:solidFill>
+                <a:srgbClr val="46AAC5"/>
+              </a:solidFill>
+            </a:endParaRPr>
+          </a:p>
+        </p:txBody>
+      </p:sp>
       <p:cxnSp>
         <p:nvCxnSpPr>
-          <p:cNvPr id="69" name="Connector: Elbow 68">
+          <p:cNvPr id="103" name="Elbow Connector 55">
             <a:extLst>
               <a:ext uri="{FF2B5EF4-FFF2-40B4-BE49-F238E27FC236}">
-                <a16:creationId xmlns:a16="http://schemas.microsoft.com/office/drawing/2014/main" id="{2D4FDDA7-DA8C-4B41-B4F3-ECB532A0199C}"/>
+                <a16:creationId xmlns:a16="http://schemas.microsoft.com/office/drawing/2014/main" id="{8C426CEE-A3D5-4F5D-BF2B-D21B45BFB6A3}"/>
               </a:ext>
             </a:extLst>
           </p:cNvPr>
           <p:cNvCxnSpPr>
             <a:cxnSpLocks/>
-            <a:stCxn id="46" idx="3"/>
-            <a:endCxn id="52" idx="3"/>
+            <a:stCxn id="50" idx="3"/>
+            <a:endCxn id="95" idx="3"/>
           </p:cNvCxnSpPr>
           <p:nvPr/>
         </p:nvCxnSpPr>
         <p:spPr>
-          <a:xfrm>
-            <a:off x="4178695" y="1578508"/>
-            <a:ext cx="545705" cy="48939"/>
+          <a:xfrm rot="10800000" flipV="1">
+            <a:off x="4322360" y="1232460"/>
+            <a:ext cx="402041" cy="616594"/>
           </a:xfrm>
           <a:prstGeom prst="bentConnector3">
             <a:avLst>
               <a:gd name="adj1" fmla="val 50000"/>
             </a:avLst>
           </a:prstGeom>
+          <a:noFill/>
           <a:ln w="19050">
-            <a:solidFill>
-              <a:srgbClr val="46AAC5"/>
-            </a:solidFill>
-            <a:tailEnd type="triangle"/>
+            <a:headEnd type="arrow"/>
           </a:ln>
-        </p:spPr>
-        <p:style>
-          <a:lnRef idx="1">
-            <a:schemeClr val="accent1"/>
-          </a:lnRef>
-          <a:fillRef idx="0">
-            <a:schemeClr val="accent1"/>
-          </a:fillRef>
-          <a:effectRef idx="0">
-            <a:schemeClr val="accent1"/>
-          </a:effectRef>
-          <a:fontRef idx="minor">
-            <a:schemeClr val="tx1"/>
+          <a:effectLst/>
+        </p:spPr>
+        <p:style>
+          <a:lnRef idx="1">
+            <a:schemeClr val="accent5"/>
+          </a:lnRef>
+          <a:fillRef idx="2">
+            <a:schemeClr val="accent5"/>
+          </a:fillRef>
+          <a:effectRef idx="1">
+            <a:schemeClr val="accent5"/>
+          </a:effectRef>
+          <a:fontRef idx="minor">
+            <a:schemeClr val="dk1"/>
           </a:fontRef>
         </p:style>
       </p:cxnSp>
       <p:cxnSp>
         <p:nvCxnSpPr>
-          <p:cNvPr id="72" name="Connector: Elbow 71">
+          <p:cNvPr id="104" name="Elbow Connector 55">
             <a:extLst>
               <a:ext uri="{FF2B5EF4-FFF2-40B4-BE49-F238E27FC236}">
-                <a16:creationId xmlns:a16="http://schemas.microsoft.com/office/drawing/2014/main" id="{AFA4519F-4ACC-441E-B3D8-7DFE67FA8F93}"/>
+                <a16:creationId xmlns:a16="http://schemas.microsoft.com/office/drawing/2014/main" id="{29FCF51D-CC9B-48DD-BD70-540D146D46E0}"/>
               </a:ext>
             </a:extLst>
           </p:cNvPr>
           <p:cNvCxnSpPr>
             <a:cxnSpLocks/>
-            <a:stCxn id="46" idx="3"/>
-            <a:endCxn id="53" idx="3"/>
+            <a:stCxn id="52" idx="3"/>
+            <a:endCxn id="95" idx="3"/>
           </p:cNvCxnSpPr>
           <p:nvPr/>
         </p:nvCxnSpPr>
         <p:spPr>
-          <a:xfrm>
-            <a:off x="4178695" y="1578508"/>
-            <a:ext cx="545705" cy="443926"/>
+          <a:xfrm rot="10800000" flipV="1">
+            <a:off x="4322360" y="1627446"/>
+            <a:ext cx="402041" cy="221607"/>
           </a:xfrm>
           <a:prstGeom prst="bentConnector3">
             <a:avLst>
               <a:gd name="adj1" fmla="val 50000"/>
             </a:avLst>
           </a:prstGeom>
+          <a:noFill/>
           <a:ln w="19050">
-            <a:solidFill>
-              <a:srgbClr val="46AAC5"/>
-            </a:solidFill>
-            <a:tailEnd type="triangle"/>
+            <a:headEnd type="arrow"/>
           </a:ln>
-        </p:spPr>
-        <p:style>
-          <a:lnRef idx="1">
-            <a:schemeClr val="accent1"/>
-          </a:lnRef>
-          <a:fillRef idx="0">
-            <a:schemeClr val="accent1"/>
-          </a:fillRef>
-          <a:effectRef idx="0">
-            <a:schemeClr val="accent1"/>
-          </a:effectRef>
-          <a:fontRef idx="minor">
-            <a:schemeClr val="tx1"/>
+          <a:effectLst/>
+        </p:spPr>
+        <p:style>
+          <a:lnRef idx="1">
+            <a:schemeClr val="accent5"/>
+          </a:lnRef>
+          <a:fillRef idx="2">
+            <a:schemeClr val="accent5"/>
+          </a:fillRef>
+          <a:effectRef idx="1">
+            <a:schemeClr val="accent5"/>
+          </a:effectRef>
+          <a:fontRef idx="minor">
+            <a:schemeClr val="dk1"/>
           </a:fontRef>
         </p:style>
       </p:cxnSp>
       <p:cxnSp>
         <p:nvCxnSpPr>
-          <p:cNvPr id="75" name="Connector: Elbow 74">
+          <p:cNvPr id="105" name="Elbow Connector 55">
             <a:extLst>
               <a:ext uri="{FF2B5EF4-FFF2-40B4-BE49-F238E27FC236}">
-                <a16:creationId xmlns:a16="http://schemas.microsoft.com/office/drawing/2014/main" id="{E22A381B-E58E-4C62-B071-EEE2F6B1B546}"/>
+                <a16:creationId xmlns:a16="http://schemas.microsoft.com/office/drawing/2014/main" id="{38C96BC8-03B7-49AB-80A3-00D4AFA18DFC}"/>
               </a:ext>
             </a:extLst>
           </p:cNvPr>
           <p:cNvCxnSpPr>
             <a:cxnSpLocks/>
-            <a:stCxn id="46" idx="3"/>
-            <a:endCxn id="59" idx="3"/>
+            <a:stCxn id="53" idx="3"/>
+            <a:endCxn id="95" idx="3"/>
           </p:cNvCxnSpPr>
           <p:nvPr/>
         </p:nvCxnSpPr>
         <p:spPr>
-          <a:xfrm>
-            <a:off x="4178695" y="1578508"/>
-            <a:ext cx="545705" cy="838912"/>
+          <a:xfrm rot="10800000">
+            <a:off x="4322360" y="1849054"/>
+            <a:ext cx="402041" cy="173380"/>
           </a:xfrm>
           <a:prstGeom prst="bentConnector3">
             <a:avLst>
               <a:gd name="adj1" fmla="val 50000"/>
             </a:avLst>
           </a:prstGeom>
+          <a:noFill/>
           <a:ln w="19050">
-            <a:solidFill>
-              <a:srgbClr val="46AAC5"/>
-            </a:solidFill>
-            <a:tailEnd type="triangle"/>
+            <a:headEnd type="arrow"/>
           </a:ln>
-        </p:spPr>
-        <p:style>
-          <a:lnRef idx="1">
-            <a:schemeClr val="accent1"/>
-          </a:lnRef>
-          <a:fillRef idx="0">
-            <a:schemeClr val="accent1"/>
-          </a:fillRef>
-          <a:effectRef idx="0">
-            <a:schemeClr val="accent1"/>
-          </a:effectRef>
-          <a:fontRef idx="minor">
-            <a:schemeClr val="tx1"/>
+          <a:effectLst/>
+        </p:spPr>
+        <p:style>
+          <a:lnRef idx="1">
+            <a:schemeClr val="accent5"/>
+          </a:lnRef>
+          <a:fillRef idx="2">
+            <a:schemeClr val="accent5"/>
+          </a:fillRef>
+          <a:effectRef idx="1">
+            <a:schemeClr val="accent5"/>
+          </a:effectRef>
+          <a:fontRef idx="minor">
+            <a:schemeClr val="dk1"/>
+          </a:fontRef>
+        </p:style>
+      </p:cxnSp>
+      <p:cxnSp>
+        <p:nvCxnSpPr>
+          <p:cNvPr id="112" name="Elbow Connector 55">
+            <a:extLst>
+              <a:ext uri="{FF2B5EF4-FFF2-40B4-BE49-F238E27FC236}">
+                <a16:creationId xmlns:a16="http://schemas.microsoft.com/office/drawing/2014/main" id="{E3F52993-BBCD-4A46-83E4-2E246B296379}"/>
+              </a:ext>
+            </a:extLst>
+          </p:cNvPr>
+          <p:cNvCxnSpPr>
+            <a:cxnSpLocks/>
+            <a:stCxn id="59" idx="3"/>
+            <a:endCxn id="95" idx="3"/>
+          </p:cNvCxnSpPr>
+          <p:nvPr/>
+        </p:nvCxnSpPr>
+        <p:spPr>
+          <a:xfrm rot="10800000">
+            <a:off x="4322360" y="1849054"/>
+            <a:ext cx="402041" cy="568366"/>
+          </a:xfrm>
+          <a:prstGeom prst="bentConnector3">
+            <a:avLst>
+              <a:gd name="adj1" fmla="val 50000"/>
+            </a:avLst>
+          </a:prstGeom>
+          <a:noFill/>
+          <a:ln w="19050">
+            <a:headEnd type="arrow"/>
+          </a:ln>
+          <a:effectLst/>
+        </p:spPr>
+        <p:style>
+          <a:lnRef idx="1">
+            <a:schemeClr val="accent5"/>
+          </a:lnRef>
+          <a:fillRef idx="2">
+            <a:schemeClr val="accent5"/>
+          </a:fillRef>
+          <a:effectRef idx="1">
+            <a:schemeClr val="accent5"/>
+          </a:effectRef>
+          <a:fontRef idx="minor">
+            <a:schemeClr val="dk1"/>
           </a:fontRef>
         </p:style>
       </p:cxnSp>

</xml_diff>

<commit_message>
DeveloperGuide: add AggregateCommand in main class diagram
</commit_message>
<xml_diff>
--- a/doc/Diagrams.pptx
+++ b/doc/Diagrams.pptx
@@ -126,6 +126,10 @@
 </p:presentation>
 </file>
 
+<file path=ppt/revisionInfo.xml><?xml version="1.0" encoding="utf-8"?>
+<p1510:revInfo xmlns:a="http://schemas.openxmlformats.org/drawingml/2006/main" xmlns:r="http://schemas.openxmlformats.org/officeDocument/2006/relationships" xmlns:p1510="http://schemas.microsoft.com/office/powerpoint/2015/10/main"/>
+</file>
+
 <file path=ppt/slideLayouts/slideLayout1.xml><?xml version="1.0" encoding="utf-8"?>
 <p:sldLayout xmlns:a="http://schemas.openxmlformats.org/drawingml/2006/main" xmlns:r="http://schemas.openxmlformats.org/officeDocument/2006/relationships" xmlns:p="http://schemas.openxmlformats.org/presentationml/2006/main" type="title" preserve="1">
   <p:cSld name="Title Slide">
@@ -164,10 +168,9 @@
           <a:lstStyle/>
           <a:p>
             <a:r>
-              <a:rPr lang="en-US" smtClean="0"/>
+              <a:rPr lang="en-US"/>
               <a:t>Click to edit Master title style</a:t>
             </a:r>
-            <a:endParaRPr lang="en-US"/>
           </a:p>
         </p:txBody>
       </p:sp>
@@ -283,10 +286,9 @@
           </a:lstStyle>
           <a:p>
             <a:r>
-              <a:rPr lang="en-US" smtClean="0"/>
+              <a:rPr lang="en-US"/>
               <a:t>Click to edit Master subtitle style</a:t>
             </a:r>
-            <a:endParaRPr lang="en-US"/>
           </a:p>
         </p:txBody>
       </p:sp>
@@ -307,7 +309,7 @@
           <a:p>
             <a:fld id="{78C97017-6FC3-485B-9764-EAC9E56C1D49}" type="datetimeFigureOut">
               <a:rPr lang="en-US" smtClean="0"/>
-              <a:t>8/31/2017</a:t>
+              <a:t>1/30/2018</a:t>
             </a:fld>
             <a:endParaRPr lang="en-US"/>
           </a:p>
@@ -401,10 +403,9 @@
           <a:lstStyle/>
           <a:p>
             <a:r>
-              <a:rPr lang="en-US" smtClean="0"/>
+              <a:rPr lang="en-US"/>
               <a:t>Click to edit Master title style</a:t>
             </a:r>
-            <a:endParaRPr lang="en-US"/>
           </a:p>
         </p:txBody>
       </p:sp>
@@ -425,38 +426,37 @@
           <a:p>
             <a:pPr lvl="0"/>
             <a:r>
-              <a:rPr lang="en-US" smtClean="0"/>
+              <a:rPr lang="en-US"/>
               <a:t>Click to edit Master text styles</a:t>
             </a:r>
           </a:p>
           <a:p>
             <a:pPr lvl="1"/>
             <a:r>
-              <a:rPr lang="en-US" smtClean="0"/>
+              <a:rPr lang="en-US"/>
               <a:t>Second level</a:t>
             </a:r>
           </a:p>
           <a:p>
             <a:pPr lvl="2"/>
             <a:r>
-              <a:rPr lang="en-US" smtClean="0"/>
+              <a:rPr lang="en-US"/>
               <a:t>Third level</a:t>
             </a:r>
           </a:p>
           <a:p>
             <a:pPr lvl="3"/>
             <a:r>
-              <a:rPr lang="en-US" smtClean="0"/>
+              <a:rPr lang="en-US"/>
               <a:t>Fourth level</a:t>
             </a:r>
           </a:p>
           <a:p>
             <a:pPr lvl="4"/>
             <a:r>
-              <a:rPr lang="en-US" smtClean="0"/>
+              <a:rPr lang="en-US"/>
               <a:t>Fifth level</a:t>
             </a:r>
-            <a:endParaRPr lang="en-US"/>
           </a:p>
         </p:txBody>
       </p:sp>
@@ -477,7 +477,7 @@
           <a:p>
             <a:fld id="{78C97017-6FC3-485B-9764-EAC9E56C1D49}" type="datetimeFigureOut">
               <a:rPr lang="en-US" smtClean="0"/>
-              <a:t>8/31/2017</a:t>
+              <a:t>1/30/2018</a:t>
             </a:fld>
             <a:endParaRPr lang="en-US"/>
           </a:p>
@@ -576,10 +576,9 @@
           <a:lstStyle/>
           <a:p>
             <a:r>
-              <a:rPr lang="en-US" smtClean="0"/>
+              <a:rPr lang="en-US"/>
               <a:t>Click to edit Master title style</a:t>
             </a:r>
-            <a:endParaRPr lang="en-US"/>
           </a:p>
         </p:txBody>
       </p:sp>
@@ -605,38 +604,37 @@
           <a:p>
             <a:pPr lvl="0"/>
             <a:r>
-              <a:rPr lang="en-US" smtClean="0"/>
+              <a:rPr lang="en-US"/>
               <a:t>Click to edit Master text styles</a:t>
             </a:r>
           </a:p>
           <a:p>
             <a:pPr lvl="1"/>
             <a:r>
-              <a:rPr lang="en-US" smtClean="0"/>
+              <a:rPr lang="en-US"/>
               <a:t>Second level</a:t>
             </a:r>
           </a:p>
           <a:p>
             <a:pPr lvl="2"/>
             <a:r>
-              <a:rPr lang="en-US" smtClean="0"/>
+              <a:rPr lang="en-US"/>
               <a:t>Third level</a:t>
             </a:r>
           </a:p>
           <a:p>
             <a:pPr lvl="3"/>
             <a:r>
-              <a:rPr lang="en-US" smtClean="0"/>
+              <a:rPr lang="en-US"/>
               <a:t>Fourth level</a:t>
             </a:r>
           </a:p>
           <a:p>
             <a:pPr lvl="4"/>
             <a:r>
-              <a:rPr lang="en-US" smtClean="0"/>
+              <a:rPr lang="en-US"/>
               <a:t>Fifth level</a:t>
             </a:r>
-            <a:endParaRPr lang="en-US"/>
           </a:p>
         </p:txBody>
       </p:sp>
@@ -657,7 +655,7 @@
           <a:p>
             <a:fld id="{78C97017-6FC3-485B-9764-EAC9E56C1D49}" type="datetimeFigureOut">
               <a:rPr lang="en-US" smtClean="0"/>
-              <a:t>8/31/2017</a:t>
+              <a:t>1/30/2018</a:t>
             </a:fld>
             <a:endParaRPr lang="en-US"/>
           </a:p>
@@ -751,10 +749,9 @@
           <a:lstStyle/>
           <a:p>
             <a:r>
-              <a:rPr lang="en-US" smtClean="0"/>
+              <a:rPr lang="en-US"/>
               <a:t>Click to edit Master title style</a:t>
             </a:r>
-            <a:endParaRPr lang="en-US"/>
           </a:p>
         </p:txBody>
       </p:sp>
@@ -775,38 +772,37 @@
           <a:p>
             <a:pPr lvl="0"/>
             <a:r>
-              <a:rPr lang="en-US" smtClean="0"/>
+              <a:rPr lang="en-US"/>
               <a:t>Click to edit Master text styles</a:t>
             </a:r>
           </a:p>
           <a:p>
             <a:pPr lvl="1"/>
             <a:r>
-              <a:rPr lang="en-US" smtClean="0"/>
+              <a:rPr lang="en-US"/>
               <a:t>Second level</a:t>
             </a:r>
           </a:p>
           <a:p>
             <a:pPr lvl="2"/>
             <a:r>
-              <a:rPr lang="en-US" smtClean="0"/>
+              <a:rPr lang="en-US"/>
               <a:t>Third level</a:t>
             </a:r>
           </a:p>
           <a:p>
             <a:pPr lvl="3"/>
             <a:r>
-              <a:rPr lang="en-US" smtClean="0"/>
+              <a:rPr lang="en-US"/>
               <a:t>Fourth level</a:t>
             </a:r>
           </a:p>
           <a:p>
             <a:pPr lvl="4"/>
             <a:r>
-              <a:rPr lang="en-US" smtClean="0"/>
+              <a:rPr lang="en-US"/>
               <a:t>Fifth level</a:t>
             </a:r>
-            <a:endParaRPr lang="en-US"/>
           </a:p>
         </p:txBody>
       </p:sp>
@@ -827,7 +823,7 @@
           <a:p>
             <a:fld id="{78C97017-6FC3-485B-9764-EAC9E56C1D49}" type="datetimeFigureOut">
               <a:rPr lang="en-US" smtClean="0"/>
-              <a:t>8/31/2017</a:t>
+              <a:t>1/30/2018</a:t>
             </a:fld>
             <a:endParaRPr lang="en-US"/>
           </a:p>
@@ -930,10 +926,9 @@
           </a:lstStyle>
           <a:p>
             <a:r>
-              <a:rPr lang="en-US" smtClean="0"/>
+              <a:rPr lang="en-US"/>
               <a:t>Click to edit Master title style</a:t>
             </a:r>
-            <a:endParaRPr lang="en-US"/>
           </a:p>
         </p:txBody>
       </p:sp>
@@ -1050,7 +1045,7 @@
           <a:p>
             <a:pPr lvl="0"/>
             <a:r>
-              <a:rPr lang="en-US" smtClean="0"/>
+              <a:rPr lang="en-US"/>
               <a:t>Click to edit Master text styles</a:t>
             </a:r>
           </a:p>
@@ -1073,7 +1068,7 @@
           <a:p>
             <a:fld id="{78C97017-6FC3-485B-9764-EAC9E56C1D49}" type="datetimeFigureOut">
               <a:rPr lang="en-US" smtClean="0"/>
-              <a:t>8/31/2017</a:t>
+              <a:t>1/30/2018</a:t>
             </a:fld>
             <a:endParaRPr lang="en-US"/>
           </a:p>
@@ -1167,10 +1162,9 @@
           <a:lstStyle/>
           <a:p>
             <a:r>
-              <a:rPr lang="en-US" smtClean="0"/>
+              <a:rPr lang="en-US"/>
               <a:t>Click to edit Master title style</a:t>
             </a:r>
-            <a:endParaRPr lang="en-US"/>
           </a:p>
         </p:txBody>
       </p:sp>
@@ -1224,38 +1218,37 @@
           <a:p>
             <a:pPr lvl="0"/>
             <a:r>
-              <a:rPr lang="en-US" smtClean="0"/>
+              <a:rPr lang="en-US"/>
               <a:t>Click to edit Master text styles</a:t>
             </a:r>
           </a:p>
           <a:p>
             <a:pPr lvl="1"/>
             <a:r>
-              <a:rPr lang="en-US" smtClean="0"/>
+              <a:rPr lang="en-US"/>
               <a:t>Second level</a:t>
             </a:r>
           </a:p>
           <a:p>
             <a:pPr lvl="2"/>
             <a:r>
-              <a:rPr lang="en-US" smtClean="0"/>
+              <a:rPr lang="en-US"/>
               <a:t>Third level</a:t>
             </a:r>
           </a:p>
           <a:p>
             <a:pPr lvl="3"/>
             <a:r>
-              <a:rPr lang="en-US" smtClean="0"/>
+              <a:rPr lang="en-US"/>
               <a:t>Fourth level</a:t>
             </a:r>
           </a:p>
           <a:p>
             <a:pPr lvl="4"/>
             <a:r>
-              <a:rPr lang="en-US" smtClean="0"/>
+              <a:rPr lang="en-US"/>
               <a:t>Fifth level</a:t>
             </a:r>
-            <a:endParaRPr lang="en-US"/>
           </a:p>
         </p:txBody>
       </p:sp>
@@ -1309,38 +1302,37 @@
           <a:p>
             <a:pPr lvl="0"/>
             <a:r>
-              <a:rPr lang="en-US" smtClean="0"/>
+              <a:rPr lang="en-US"/>
               <a:t>Click to edit Master text styles</a:t>
             </a:r>
           </a:p>
           <a:p>
             <a:pPr lvl="1"/>
             <a:r>
-              <a:rPr lang="en-US" smtClean="0"/>
+              <a:rPr lang="en-US"/>
               <a:t>Second level</a:t>
             </a:r>
           </a:p>
           <a:p>
             <a:pPr lvl="2"/>
             <a:r>
-              <a:rPr lang="en-US" smtClean="0"/>
+              <a:rPr lang="en-US"/>
               <a:t>Third level</a:t>
             </a:r>
           </a:p>
           <a:p>
             <a:pPr lvl="3"/>
             <a:r>
-              <a:rPr lang="en-US" smtClean="0"/>
+              <a:rPr lang="en-US"/>
               <a:t>Fourth level</a:t>
             </a:r>
           </a:p>
           <a:p>
             <a:pPr lvl="4"/>
             <a:r>
-              <a:rPr lang="en-US" smtClean="0"/>
+              <a:rPr lang="en-US"/>
               <a:t>Fifth level</a:t>
             </a:r>
-            <a:endParaRPr lang="en-US"/>
           </a:p>
         </p:txBody>
       </p:sp>
@@ -1361,7 +1353,7 @@
           <a:p>
             <a:fld id="{78C97017-6FC3-485B-9764-EAC9E56C1D49}" type="datetimeFigureOut">
               <a:rPr lang="en-US" smtClean="0"/>
-              <a:t>8/31/2017</a:t>
+              <a:t>1/30/2018</a:t>
             </a:fld>
             <a:endParaRPr lang="en-US"/>
           </a:p>
@@ -1459,10 +1451,9 @@
           </a:lstStyle>
           <a:p>
             <a:r>
-              <a:rPr lang="en-US" smtClean="0"/>
+              <a:rPr lang="en-US"/>
               <a:t>Click to edit Master title style</a:t>
             </a:r>
-            <a:endParaRPr lang="en-US"/>
           </a:p>
         </p:txBody>
       </p:sp>
@@ -1525,7 +1516,7 @@
           <a:p>
             <a:pPr lvl="0"/>
             <a:r>
-              <a:rPr lang="en-US" smtClean="0"/>
+              <a:rPr lang="en-US"/>
               <a:t>Click to edit Master text styles</a:t>
             </a:r>
           </a:p>
@@ -1581,38 +1572,37 @@
           <a:p>
             <a:pPr lvl="0"/>
             <a:r>
-              <a:rPr lang="en-US" smtClean="0"/>
+              <a:rPr lang="en-US"/>
               <a:t>Click to edit Master text styles</a:t>
             </a:r>
           </a:p>
           <a:p>
             <a:pPr lvl="1"/>
             <a:r>
-              <a:rPr lang="en-US" smtClean="0"/>
+              <a:rPr lang="en-US"/>
               <a:t>Second level</a:t>
             </a:r>
           </a:p>
           <a:p>
             <a:pPr lvl="2"/>
             <a:r>
-              <a:rPr lang="en-US" smtClean="0"/>
+              <a:rPr lang="en-US"/>
               <a:t>Third level</a:t>
             </a:r>
           </a:p>
           <a:p>
             <a:pPr lvl="3"/>
             <a:r>
-              <a:rPr lang="en-US" smtClean="0"/>
+              <a:rPr lang="en-US"/>
               <a:t>Fourth level</a:t>
             </a:r>
           </a:p>
           <a:p>
             <a:pPr lvl="4"/>
             <a:r>
-              <a:rPr lang="en-US" smtClean="0"/>
+              <a:rPr lang="en-US"/>
               <a:t>Fifth level</a:t>
             </a:r>
-            <a:endParaRPr lang="en-US"/>
           </a:p>
         </p:txBody>
       </p:sp>
@@ -1675,7 +1665,7 @@
           <a:p>
             <a:pPr lvl="0"/>
             <a:r>
-              <a:rPr lang="en-US" smtClean="0"/>
+              <a:rPr lang="en-US"/>
               <a:t>Click to edit Master text styles</a:t>
             </a:r>
           </a:p>
@@ -1731,38 +1721,37 @@
           <a:p>
             <a:pPr lvl="0"/>
             <a:r>
-              <a:rPr lang="en-US" smtClean="0"/>
+              <a:rPr lang="en-US"/>
               <a:t>Click to edit Master text styles</a:t>
             </a:r>
           </a:p>
           <a:p>
             <a:pPr lvl="1"/>
             <a:r>
-              <a:rPr lang="en-US" smtClean="0"/>
+              <a:rPr lang="en-US"/>
               <a:t>Second level</a:t>
             </a:r>
           </a:p>
           <a:p>
             <a:pPr lvl="2"/>
             <a:r>
-              <a:rPr lang="en-US" smtClean="0"/>
+              <a:rPr lang="en-US"/>
               <a:t>Third level</a:t>
             </a:r>
           </a:p>
           <a:p>
             <a:pPr lvl="3"/>
             <a:r>
-              <a:rPr lang="en-US" smtClean="0"/>
+              <a:rPr lang="en-US"/>
               <a:t>Fourth level</a:t>
             </a:r>
           </a:p>
           <a:p>
             <a:pPr lvl="4"/>
             <a:r>
-              <a:rPr lang="en-US" smtClean="0"/>
+              <a:rPr lang="en-US"/>
               <a:t>Fifth level</a:t>
             </a:r>
-            <a:endParaRPr lang="en-US"/>
           </a:p>
         </p:txBody>
       </p:sp>
@@ -1783,7 +1772,7 @@
           <a:p>
             <a:fld id="{78C97017-6FC3-485B-9764-EAC9E56C1D49}" type="datetimeFigureOut">
               <a:rPr lang="en-US" smtClean="0"/>
-              <a:t>8/31/2017</a:t>
+              <a:t>1/30/2018</a:t>
             </a:fld>
             <a:endParaRPr lang="en-US"/>
           </a:p>
@@ -1877,10 +1866,9 @@
           <a:lstStyle/>
           <a:p>
             <a:r>
-              <a:rPr lang="en-US" smtClean="0"/>
+              <a:rPr lang="en-US"/>
               <a:t>Click to edit Master title style</a:t>
             </a:r>
-            <a:endParaRPr lang="en-US"/>
           </a:p>
         </p:txBody>
       </p:sp>
@@ -1901,7 +1889,7 @@
           <a:p>
             <a:fld id="{78C97017-6FC3-485B-9764-EAC9E56C1D49}" type="datetimeFigureOut">
               <a:rPr lang="en-US" smtClean="0"/>
-              <a:t>8/31/2017</a:t>
+              <a:t>1/30/2018</a:t>
             </a:fld>
             <a:endParaRPr lang="en-US"/>
           </a:p>
@@ -1996,7 +1984,7 @@
           <a:p>
             <a:fld id="{78C97017-6FC3-485B-9764-EAC9E56C1D49}" type="datetimeFigureOut">
               <a:rPr lang="en-US" smtClean="0"/>
-              <a:t>8/31/2017</a:t>
+              <a:t>1/30/2018</a:t>
             </a:fld>
             <a:endParaRPr lang="en-US"/>
           </a:p>
@@ -2099,10 +2087,9 @@
           </a:lstStyle>
           <a:p>
             <a:r>
-              <a:rPr lang="en-US" smtClean="0"/>
+              <a:rPr lang="en-US"/>
               <a:t>Click to edit Master title style</a:t>
             </a:r>
-            <a:endParaRPr lang="en-US"/>
           </a:p>
         </p:txBody>
       </p:sp>
@@ -2156,38 +2143,37 @@
           <a:p>
             <a:pPr lvl="0"/>
             <a:r>
-              <a:rPr lang="en-US" smtClean="0"/>
+              <a:rPr lang="en-US"/>
               <a:t>Click to edit Master text styles</a:t>
             </a:r>
           </a:p>
           <a:p>
             <a:pPr lvl="1"/>
             <a:r>
-              <a:rPr lang="en-US" smtClean="0"/>
+              <a:rPr lang="en-US"/>
               <a:t>Second level</a:t>
             </a:r>
           </a:p>
           <a:p>
             <a:pPr lvl="2"/>
             <a:r>
-              <a:rPr lang="en-US" smtClean="0"/>
+              <a:rPr lang="en-US"/>
               <a:t>Third level</a:t>
             </a:r>
           </a:p>
           <a:p>
             <a:pPr lvl="3"/>
             <a:r>
-              <a:rPr lang="en-US" smtClean="0"/>
+              <a:rPr lang="en-US"/>
               <a:t>Fourth level</a:t>
             </a:r>
           </a:p>
           <a:p>
             <a:pPr lvl="4"/>
             <a:r>
-              <a:rPr lang="en-US" smtClean="0"/>
+              <a:rPr lang="en-US"/>
               <a:t>Fifth level</a:t>
             </a:r>
-            <a:endParaRPr lang="en-US"/>
           </a:p>
         </p:txBody>
       </p:sp>
@@ -2250,7 +2236,7 @@
           <a:p>
             <a:pPr lvl="0"/>
             <a:r>
-              <a:rPr lang="en-US" smtClean="0"/>
+              <a:rPr lang="en-US"/>
               <a:t>Click to edit Master text styles</a:t>
             </a:r>
           </a:p>
@@ -2273,7 +2259,7 @@
           <a:p>
             <a:fld id="{78C97017-6FC3-485B-9764-EAC9E56C1D49}" type="datetimeFigureOut">
               <a:rPr lang="en-US" smtClean="0"/>
-              <a:t>8/31/2017</a:t>
+              <a:t>1/30/2018</a:t>
             </a:fld>
             <a:endParaRPr lang="en-US"/>
           </a:p>
@@ -2376,10 +2362,9 @@
           </a:lstStyle>
           <a:p>
             <a:r>
-              <a:rPr lang="en-US" smtClean="0"/>
+              <a:rPr lang="en-US"/>
               <a:t>Click to edit Master title style</a:t>
             </a:r>
-            <a:endParaRPr lang="en-US"/>
           </a:p>
         </p:txBody>
       </p:sp>
@@ -2503,7 +2488,7 @@
           <a:p>
             <a:pPr lvl="0"/>
             <a:r>
-              <a:rPr lang="en-US" smtClean="0"/>
+              <a:rPr lang="en-US"/>
               <a:t>Click to edit Master text styles</a:t>
             </a:r>
           </a:p>
@@ -2526,7 +2511,7 @@
           <a:p>
             <a:fld id="{78C97017-6FC3-485B-9764-EAC9E56C1D49}" type="datetimeFigureOut">
               <a:rPr lang="en-US" smtClean="0"/>
-              <a:t>8/31/2017</a:t>
+              <a:t>1/30/2018</a:t>
             </a:fld>
             <a:endParaRPr lang="en-US"/>
           </a:p>
@@ -2635,10 +2620,9 @@
           <a:lstStyle/>
           <a:p>
             <a:r>
-              <a:rPr lang="en-US" smtClean="0"/>
+              <a:rPr lang="en-US"/>
               <a:t>Click to edit Master title style</a:t>
             </a:r>
-            <a:endParaRPr lang="en-US"/>
           </a:p>
         </p:txBody>
       </p:sp>
@@ -2669,38 +2653,37 @@
           <a:p>
             <a:pPr lvl="0"/>
             <a:r>
-              <a:rPr lang="en-US" smtClean="0"/>
+              <a:rPr lang="en-US"/>
               <a:t>Click to edit Master text styles</a:t>
             </a:r>
           </a:p>
           <a:p>
             <a:pPr lvl="1"/>
             <a:r>
-              <a:rPr lang="en-US" smtClean="0"/>
+              <a:rPr lang="en-US"/>
               <a:t>Second level</a:t>
             </a:r>
           </a:p>
           <a:p>
             <a:pPr lvl="2"/>
             <a:r>
-              <a:rPr lang="en-US" smtClean="0"/>
+              <a:rPr lang="en-US"/>
               <a:t>Third level</a:t>
             </a:r>
           </a:p>
           <a:p>
             <a:pPr lvl="3"/>
             <a:r>
-              <a:rPr lang="en-US" smtClean="0"/>
+              <a:rPr lang="en-US"/>
               <a:t>Fourth level</a:t>
             </a:r>
           </a:p>
           <a:p>
             <a:pPr lvl="4"/>
             <a:r>
-              <a:rPr lang="en-US" smtClean="0"/>
+              <a:rPr lang="en-US"/>
               <a:t>Fifth level</a:t>
             </a:r>
-            <a:endParaRPr lang="en-US"/>
           </a:p>
         </p:txBody>
       </p:sp>
@@ -2739,7 +2722,7 @@
           <a:p>
             <a:fld id="{78C97017-6FC3-485B-9764-EAC9E56C1D49}" type="datetimeFigureOut">
               <a:rPr lang="en-US" smtClean="0"/>
-              <a:t>8/31/2017</a:t>
+              <a:t>1/30/2018</a:t>
             </a:fld>
             <a:endParaRPr lang="en-US"/>
           </a:p>
@@ -3130,14 +3113,13 @@
           <a:lstStyle/>
           <a:p>
             <a:r>
-              <a:rPr lang="en-US" dirty="0" err="1" smtClean="0"/>
+              <a:rPr lang="en-US" dirty="0" err="1"/>
               <a:t>AddressBook</a:t>
             </a:r>
             <a:r>
-              <a:rPr lang="en-US" dirty="0" smtClean="0"/>
+              <a:rPr lang="en-US" dirty="0"/>
               <a:t> – Level 2</a:t>
             </a:r>
-            <a:endParaRPr lang="en-US" dirty="0"/>
           </a:p>
         </p:txBody>
       </p:sp>
@@ -3157,10 +3139,9 @@
           <a:lstStyle/>
           <a:p>
             <a:r>
-              <a:rPr lang="en-US" dirty="0" smtClean="0"/>
+              <a:rPr lang="en-US" dirty="0"/>
               <a:t>Diagrams</a:t>
             </a:r>
-            <a:endParaRPr lang="en-US" dirty="0"/>
           </a:p>
         </p:txBody>
       </p:sp>
@@ -3231,7 +3212,7 @@
           <a:p>
             <a:pPr algn="ctr"/>
             <a:r>
-              <a:rPr lang="en-US" sz="1050" dirty="0" err="1" smtClean="0"/>
+              <a:rPr lang="en-US" sz="1050" dirty="0" err="1"/>
               <a:t>TextUi</a:t>
             </a:r>
             <a:endParaRPr lang="en-SG" sz="1050" dirty="0"/>
@@ -3282,7 +3263,7 @@
           <a:p>
             <a:pPr algn="ctr"/>
             <a:r>
-              <a:rPr lang="en-US" sz="1050" dirty="0" smtClean="0">
+              <a:rPr lang="en-US" sz="1050" dirty="0">
                 <a:solidFill>
                   <a:schemeClr val="bg1"/>
                 </a:solidFill>
@@ -3378,7 +3359,7 @@
           <a:p>
             <a:pPr algn="ctr"/>
             <a:r>
-              <a:rPr lang="en-US" sz="1050" dirty="0" smtClean="0"/>
+              <a:rPr lang="en-US" sz="1050" dirty="0"/>
               <a:t>Parser</a:t>
             </a:r>
             <a:endParaRPr lang="en-SG" sz="1050" dirty="0"/>
@@ -3422,14 +3403,14 @@
           <a:p>
             <a:pPr algn="ctr"/>
             <a:r>
-              <a:rPr lang="en-US" sz="1050" dirty="0" smtClean="0"/>
+              <a:rPr lang="en-US" sz="1050" dirty="0"/>
               <a:t>Unique</a:t>
             </a:r>
             <a:br>
-              <a:rPr lang="en-US" sz="1050" dirty="0" smtClean="0"/>
+              <a:rPr lang="en-US" sz="1050" dirty="0"/>
             </a:br>
             <a:r>
-              <a:rPr lang="en-US" sz="1050" dirty="0" err="1" smtClean="0"/>
+              <a:rPr lang="en-US" sz="1050" dirty="0" err="1"/>
               <a:t>TagList</a:t>
             </a:r>
             <a:endParaRPr lang="en-SG" sz="1050" dirty="0"/>
@@ -3473,14 +3454,14 @@
           <a:p>
             <a:pPr algn="ctr"/>
             <a:r>
-              <a:rPr lang="en-US" sz="1050" dirty="0" smtClean="0"/>
+              <a:rPr lang="en-US" sz="1050" dirty="0"/>
               <a:t>Unique</a:t>
             </a:r>
             <a:br>
-              <a:rPr lang="en-US" sz="1050" dirty="0" smtClean="0"/>
+              <a:rPr lang="en-US" sz="1050" dirty="0"/>
             </a:br>
             <a:r>
-              <a:rPr lang="en-US" sz="1050" dirty="0" err="1" smtClean="0"/>
+              <a:rPr lang="en-US" sz="1050" dirty="0" err="1"/>
               <a:t>PersonList</a:t>
             </a:r>
             <a:endParaRPr lang="en-SG" sz="1050" dirty="0"/>
@@ -3524,7 +3505,7 @@
           <a:p>
             <a:pPr algn="ctr"/>
             <a:r>
-              <a:rPr lang="en-US" sz="1050" dirty="0" smtClean="0"/>
+              <a:rPr lang="en-US" sz="1050" dirty="0"/>
               <a:t>Person</a:t>
             </a:r>
             <a:endParaRPr lang="en-SG" sz="1050" dirty="0"/>
@@ -3568,7 +3549,7 @@
           <a:p>
             <a:pPr algn="ctr"/>
             <a:r>
-              <a:rPr lang="en-US" sz="1050" dirty="0" smtClean="0"/>
+              <a:rPr lang="en-US" sz="1050" dirty="0"/>
               <a:t>Phone</a:t>
             </a:r>
             <a:endParaRPr lang="en-SG" sz="1050" dirty="0"/>
@@ -3612,7 +3593,7 @@
           <a:p>
             <a:pPr algn="ctr"/>
             <a:r>
-              <a:rPr lang="en-US" sz="1050" dirty="0" smtClean="0"/>
+              <a:rPr lang="en-US" sz="1050" dirty="0"/>
               <a:t>Email</a:t>
             </a:r>
             <a:endParaRPr lang="en-SG" sz="1050" dirty="0"/>
@@ -3656,7 +3637,7 @@
           <a:p>
             <a:pPr algn="ctr"/>
             <a:r>
-              <a:rPr lang="en-US" sz="1050" dirty="0" smtClean="0"/>
+              <a:rPr lang="en-US" sz="1050" dirty="0"/>
               <a:t>Address</a:t>
             </a:r>
             <a:endParaRPr lang="en-SG" sz="1050" dirty="0"/>
@@ -3700,7 +3681,7 @@
           <a:p>
             <a:pPr algn="ctr"/>
             <a:r>
-              <a:rPr lang="en-US" sz="1050" dirty="0" err="1" smtClean="0"/>
+              <a:rPr lang="en-US" sz="1050" dirty="0" err="1"/>
               <a:t>StorageFile</a:t>
             </a:r>
             <a:endParaRPr lang="en-SG" sz="1050" dirty="0"/>
@@ -4435,14 +4416,14 @@
           <a:p>
             <a:pPr algn="ctr"/>
             <a:r>
-              <a:rPr lang="en-US" sz="1050" dirty="0" smtClean="0"/>
+              <a:rPr lang="en-US" sz="1050" dirty="0"/>
               <a:t>&lt;&lt;interface&gt;&gt;</a:t>
             </a:r>
           </a:p>
           <a:p>
             <a:pPr algn="ctr"/>
             <a:r>
-              <a:rPr lang="en-US" sz="1050" dirty="0" err="1" smtClean="0"/>
+              <a:rPr lang="en-US" sz="1050" dirty="0" err="1"/>
               <a:t>ReadOnlyPerson</a:t>
             </a:r>
             <a:endParaRPr lang="en-SG" sz="1050" dirty="0"/>
@@ -4580,7 +4561,7 @@
         </p:nvSpPr>
         <p:spPr>
           <a:xfrm>
-            <a:off x="2566828" y="1356188"/>
+            <a:off x="6797964" y="1620559"/>
             <a:ext cx="1611867" cy="444640"/>
           </a:xfrm>
           <a:prstGeom prst="rect">
@@ -4609,7 +4590,7 @@
           <a:p>
             <a:pPr algn="ctr"/>
             <a:r>
-              <a:rPr lang="en-US" sz="1050" dirty="0" smtClean="0"/>
+              <a:rPr lang="en-US" sz="1050" dirty="0"/>
               <a:t>Command</a:t>
             </a:r>
             <a:endParaRPr lang="en-SG" sz="1050" dirty="0"/>
@@ -4745,46 +4726,6 @@
               <a:t>IncorrectCommand</a:t>
             </a:r>
             <a:endParaRPr lang="en-SG" sz="1050" dirty="0"/>
-          </a:p>
-        </p:txBody>
-      </p:sp>
-      <p:sp>
-        <p:nvSpPr>
-          <p:cNvPr id="54" name="Isosceles Triangle 53"/>
-          <p:cNvSpPr/>
-          <p:nvPr/>
-        </p:nvSpPr>
-        <p:spPr>
-          <a:xfrm rot="16200000">
-            <a:off x="4131203" y="1571491"/>
-            <a:ext cx="270504" cy="175523"/>
-          </a:xfrm>
-          <a:prstGeom prst="triangle">
-            <a:avLst/>
-          </a:prstGeom>
-          <a:ln w="19050"/>
-          <a:effectLst/>
-        </p:spPr>
-        <p:style>
-          <a:lnRef idx="1">
-            <a:schemeClr val="accent5"/>
-          </a:lnRef>
-          <a:fillRef idx="2">
-            <a:schemeClr val="accent5"/>
-          </a:fillRef>
-          <a:effectRef idx="1">
-            <a:schemeClr val="accent5"/>
-          </a:effectRef>
-          <a:fontRef idx="minor">
-            <a:schemeClr val="dk1"/>
-          </a:fontRef>
-        </p:style>
-        <p:txBody>
-          <a:bodyPr rtlCol="0" anchor="ctr"/>
-          <a:lstStyle/>
-          <a:p>
-            <a:pPr algn="ctr"/>
-            <a:endParaRPr lang="en-SG" sz="1050"/>
           </a:p>
         </p:txBody>
       </p:sp>
@@ -4792,15 +4733,16 @@
         <p:nvCxnSpPr>
           <p:cNvPr id="55" name="Elbow Connector 54"/>
           <p:cNvCxnSpPr>
-            <a:stCxn id="54" idx="3"/>
-            <a:endCxn id="52" idx="3"/>
+            <a:cxnSpLocks/>
+            <a:stCxn id="59" idx="1"/>
+            <a:endCxn id="46" idx="1"/>
           </p:cNvCxnSpPr>
           <p:nvPr/>
         </p:nvCxnSpPr>
         <p:spPr>
           <a:xfrm flipV="1">
-            <a:off x="4354217" y="1627447"/>
-            <a:ext cx="370183" cy="31806"/>
+            <a:off x="6128509" y="1842879"/>
+            <a:ext cx="669455" cy="574541"/>
           </a:xfrm>
           <a:prstGeom prst="bentConnector3">
             <a:avLst>
@@ -4830,15 +4772,16 @@
         <p:nvCxnSpPr>
           <p:cNvPr id="56" name="Elbow Connector 55"/>
           <p:cNvCxnSpPr>
-            <a:stCxn id="54" idx="3"/>
-            <a:endCxn id="50" idx="3"/>
+            <a:cxnSpLocks/>
+            <a:stCxn id="46" idx="1"/>
+            <a:endCxn id="50" idx="1"/>
           </p:cNvCxnSpPr>
           <p:nvPr/>
         </p:nvCxnSpPr>
         <p:spPr>
-          <a:xfrm flipV="1">
-            <a:off x="4354217" y="1232460"/>
-            <a:ext cx="370183" cy="426793"/>
+          <a:xfrm rot="10800000">
+            <a:off x="6128510" y="1232461"/>
+            <a:ext cx="669455" cy="610419"/>
           </a:xfrm>
           <a:prstGeom prst="bentConnector3">
             <a:avLst>
@@ -4868,15 +4811,16 @@
         <p:nvCxnSpPr>
           <p:cNvPr id="57" name="Elbow Connector 56"/>
           <p:cNvCxnSpPr>
-            <a:stCxn id="54" idx="3"/>
-            <a:endCxn id="53" idx="3"/>
+            <a:cxnSpLocks/>
+            <a:stCxn id="53" idx="1"/>
+            <a:endCxn id="46" idx="1"/>
           </p:cNvCxnSpPr>
           <p:nvPr/>
         </p:nvCxnSpPr>
         <p:spPr>
-          <a:xfrm>
-            <a:off x="4354217" y="1659253"/>
-            <a:ext cx="370183" cy="363181"/>
+          <a:xfrm flipV="1">
+            <a:off x="6128509" y="1842879"/>
+            <a:ext cx="669455" cy="179555"/>
           </a:xfrm>
           <a:prstGeom prst="bentConnector3">
             <a:avLst>
@@ -4939,7 +4883,7 @@
           <a:p>
             <a:pPr algn="ctr"/>
             <a:r>
-              <a:rPr lang="en-US" sz="1050" dirty="0" smtClean="0"/>
+              <a:rPr lang="en-US" sz="1050" dirty="0"/>
               <a:t>…Command</a:t>
             </a:r>
             <a:endParaRPr lang="en-SG" sz="1050" dirty="0"/>
@@ -4950,15 +4894,16 @@
         <p:nvCxnSpPr>
           <p:cNvPr id="60" name="Elbow Connector 59"/>
           <p:cNvCxnSpPr>
-            <a:stCxn id="54" idx="3"/>
-            <a:endCxn id="59" idx="3"/>
+            <a:cxnSpLocks/>
+            <a:stCxn id="52" idx="1"/>
+            <a:endCxn id="46" idx="1"/>
           </p:cNvCxnSpPr>
           <p:nvPr/>
         </p:nvCxnSpPr>
         <p:spPr>
           <a:xfrm>
-            <a:off x="4354217" y="1659253"/>
-            <a:ext cx="370183" cy="758167"/>
+            <a:off x="6128509" y="1627447"/>
+            <a:ext cx="669455" cy="215432"/>
           </a:xfrm>
           <a:prstGeom prst="bentConnector3">
             <a:avLst>
@@ -4988,15 +4933,16 @@
         <p:nvCxnSpPr>
           <p:cNvPr id="67" name="Elbow Connector 66"/>
           <p:cNvCxnSpPr>
+            <a:cxnSpLocks/>
             <a:stCxn id="14" idx="0"/>
-            <a:endCxn id="46" idx="1"/>
+            <a:endCxn id="80" idx="1"/>
           </p:cNvCxnSpPr>
           <p:nvPr/>
         </p:nvCxnSpPr>
         <p:spPr>
           <a:xfrm rot="5400000" flipH="1" flipV="1">
-            <a:off x="1452229" y="1891441"/>
-            <a:ext cx="1427532" cy="801666"/>
+            <a:off x="1541310" y="2072906"/>
+            <a:ext cx="1156986" cy="709282"/>
           </a:xfrm>
           <a:prstGeom prst="bentConnector2">
             <a:avLst/>
@@ -5026,18 +4972,19 @@
       <p:cxnSp>
         <p:nvCxnSpPr>
           <p:cNvPr id="70" name="Elbow Connector 69"/>
-          <p:cNvCxnSpPr/>
+          <p:cNvCxnSpPr>
+            <a:cxnSpLocks/>
+            <a:endCxn id="80" idx="1"/>
+          </p:cNvCxnSpPr>
           <p:nvPr/>
         </p:nvCxnSpPr>
         <p:spPr>
           <a:xfrm rot="5400000" flipH="1" flipV="1">
-            <a:off x="632132" y="1812364"/>
-            <a:ext cx="2293164" cy="1576229"/>
-          </a:xfrm>
-          <a:prstGeom prst="bentConnector3">
-            <a:avLst>
-              <a:gd name="adj1" fmla="val 100051"/>
-            </a:avLst>
+            <a:off x="820572" y="2056625"/>
+            <a:ext cx="1861443" cy="1446302"/>
+          </a:xfrm>
+          <a:prstGeom prst="bentConnector2">
+            <a:avLst/>
           </a:prstGeom>
           <a:ln w="19050">
             <a:solidFill>
@@ -5067,13 +5014,17 @@
       <p:cxnSp>
         <p:nvCxnSpPr>
           <p:cNvPr id="73" name="Elbow Connector 72"/>
-          <p:cNvCxnSpPr/>
+          <p:cNvCxnSpPr>
+            <a:cxnSpLocks/>
+            <a:stCxn id="80" idx="2"/>
+            <a:endCxn id="13" idx="0"/>
+          </p:cNvCxnSpPr>
           <p:nvPr/>
         </p:nvCxnSpPr>
         <p:spPr>
           <a:xfrm rot="5400000">
-            <a:off x="1795164" y="2790743"/>
-            <a:ext cx="1889726" cy="6348"/>
+            <a:off x="2067094" y="2533776"/>
+            <a:ext cx="1675686" cy="750882"/>
           </a:xfrm>
           <a:prstGeom prst="bentConnector3">
             <a:avLst>
@@ -5151,17 +5102,693 @@
       </p:sp>
       <p:cxnSp>
         <p:nvCxnSpPr>
-          <p:cNvPr id="82" name="Elbow Connector 81"/>
+          <p:cNvPr id="84" name="Elbow Connector 83"/>
           <p:cNvCxnSpPr>
-            <a:stCxn id="46" idx="0"/>
+            <a:endCxn id="81" idx="3"/>
+          </p:cNvCxnSpPr>
+          <p:nvPr/>
+        </p:nvCxnSpPr>
+        <p:spPr>
+          <a:xfrm rot="5400000" flipH="1" flipV="1">
+            <a:off x="-394396" y="2133468"/>
+            <a:ext cx="2853643" cy="373549"/>
+          </a:xfrm>
+          <a:prstGeom prst="bentConnector2">
+            <a:avLst/>
+          </a:prstGeom>
+          <a:ln w="19050">
+            <a:solidFill>
+              <a:srgbClr val="C00000"/>
+            </a:solidFill>
+            <a:prstDash val="dash"/>
+            <a:headEnd type="none" w="med" len="med"/>
+            <a:tailEnd type="arrow" w="med" len="med"/>
+          </a:ln>
+          <a:effectLst/>
+        </p:spPr>
+        <p:style>
+          <a:lnRef idx="1">
+            <a:schemeClr val="accent2"/>
+          </a:lnRef>
+          <a:fillRef idx="2">
+            <a:schemeClr val="accent2"/>
+          </a:fillRef>
+          <a:effectRef idx="1">
+            <a:schemeClr val="accent2"/>
+          </a:effectRef>
+          <a:fontRef idx="minor">
+            <a:schemeClr val="dk1"/>
+          </a:fontRef>
+        </p:style>
+      </p:cxnSp>
+      <p:sp>
+        <p:nvSpPr>
+          <p:cNvPr id="92" name="Rectangle 91"/>
+          <p:cNvSpPr/>
+          <p:nvPr/>
+        </p:nvSpPr>
+        <p:spPr>
+          <a:xfrm>
+            <a:off x="6781800" y="3539440"/>
+            <a:ext cx="929296" cy="346760"/>
+          </a:xfrm>
+          <a:prstGeom prst="rect">
+            <a:avLst/>
+          </a:prstGeom>
+          <a:ln w="19050"/>
+          <a:effectLst/>
+        </p:spPr>
+        <p:style>
+          <a:lnRef idx="1">
+            <a:schemeClr val="accent4"/>
+          </a:lnRef>
+          <a:fillRef idx="2">
+            <a:schemeClr val="accent4"/>
+          </a:fillRef>
+          <a:effectRef idx="1">
+            <a:schemeClr val="accent4"/>
+          </a:effectRef>
+          <a:fontRef idx="minor">
+            <a:schemeClr val="dk1"/>
+          </a:fontRef>
+        </p:style>
+        <p:txBody>
+          <a:bodyPr rtlCol="0" anchor="ctr"/>
+          <a:lstStyle/>
+          <a:p>
+            <a:pPr algn="ctr"/>
+            <a:r>
+              <a:rPr lang="en-US" sz="1050" dirty="0"/>
+              <a:t>Name</a:t>
+            </a:r>
+            <a:endParaRPr lang="en-SG" sz="1050" dirty="0"/>
+          </a:p>
+        </p:txBody>
+      </p:sp>
+      <p:cxnSp>
+        <p:nvCxnSpPr>
+          <p:cNvPr id="93" name="Elbow Connector 92"/>
+          <p:cNvCxnSpPr>
+            <a:stCxn id="90" idx="3"/>
+            <a:endCxn id="92" idx="1"/>
+          </p:cNvCxnSpPr>
+          <p:nvPr/>
+        </p:nvCxnSpPr>
+        <p:spPr>
+          <a:xfrm flipV="1">
+            <a:off x="6384802" y="3712820"/>
+            <a:ext cx="396998" cy="809271"/>
+          </a:xfrm>
+          <a:prstGeom prst="bentConnector3">
+            <a:avLst>
+              <a:gd name="adj1" fmla="val 50000"/>
+            </a:avLst>
+          </a:prstGeom>
+          <a:ln w="19050">
+            <a:headEnd type="none" w="med" len="med"/>
+            <a:tailEnd type="arrow" w="med" len="med"/>
+          </a:ln>
+          <a:effectLst/>
+        </p:spPr>
+        <p:style>
+          <a:lnRef idx="1">
+            <a:schemeClr val="accent6"/>
+          </a:lnRef>
+          <a:fillRef idx="2">
+            <a:schemeClr val="accent6"/>
+          </a:fillRef>
+          <a:effectRef idx="1">
+            <a:schemeClr val="accent6"/>
+          </a:effectRef>
+          <a:fontRef idx="minor">
+            <a:schemeClr val="dk1"/>
+          </a:fontRef>
+        </p:style>
+      </p:cxnSp>
+      <p:sp>
+        <p:nvSpPr>
+          <p:cNvPr id="96" name="Rectangle 95"/>
+          <p:cNvSpPr/>
+          <p:nvPr/>
+        </p:nvSpPr>
+        <p:spPr>
+          <a:xfrm>
+            <a:off x="6384801" y="717653"/>
+            <a:ext cx="929296" cy="346760"/>
+          </a:xfrm>
+          <a:prstGeom prst="rect">
+            <a:avLst/>
+          </a:prstGeom>
+          <a:ln w="19050"/>
+          <a:effectLst/>
+        </p:spPr>
+        <p:style>
+          <a:lnRef idx="1">
+            <a:schemeClr val="accent3"/>
+          </a:lnRef>
+          <a:fillRef idx="2">
+            <a:schemeClr val="accent3"/>
+          </a:fillRef>
+          <a:effectRef idx="1">
+            <a:schemeClr val="accent3"/>
+          </a:effectRef>
+          <a:fontRef idx="minor">
+            <a:schemeClr val="dk1"/>
+          </a:fontRef>
+        </p:style>
+        <p:txBody>
+          <a:bodyPr rtlCol="0" anchor="ctr"/>
+          <a:lstStyle/>
+          <a:p>
+            <a:pPr algn="ctr"/>
+            <a:r>
+              <a:rPr lang="en-US" sz="1050" dirty="0"/>
+              <a:t>Messages</a:t>
+            </a:r>
+            <a:endParaRPr lang="en-SG" sz="1050" dirty="0"/>
+          </a:p>
+        </p:txBody>
+      </p:sp>
+      <p:sp>
+        <p:nvSpPr>
+          <p:cNvPr id="98" name="Rectangle 97"/>
+          <p:cNvSpPr/>
+          <p:nvPr/>
+        </p:nvSpPr>
+        <p:spPr>
+          <a:xfrm>
+            <a:off x="7592519" y="717653"/>
+            <a:ext cx="929296" cy="346760"/>
+          </a:xfrm>
+          <a:prstGeom prst="rect">
+            <a:avLst/>
+          </a:prstGeom>
+          <a:ln w="19050"/>
+          <a:effectLst/>
+        </p:spPr>
+        <p:style>
+          <a:lnRef idx="1">
+            <a:schemeClr val="accent3"/>
+          </a:lnRef>
+          <a:fillRef idx="2">
+            <a:schemeClr val="accent3"/>
+          </a:fillRef>
+          <a:effectRef idx="1">
+            <a:schemeClr val="accent3"/>
+          </a:effectRef>
+          <a:fontRef idx="minor">
+            <a:schemeClr val="dk1"/>
+          </a:fontRef>
+        </p:style>
+        <p:txBody>
+          <a:bodyPr rtlCol="0" anchor="ctr"/>
+          <a:lstStyle/>
+          <a:p>
+            <a:pPr algn="ctr"/>
+            <a:r>
+              <a:rPr lang="en-US" sz="1050" dirty="0" err="1"/>
+              <a:t>Utils</a:t>
+            </a:r>
+            <a:endParaRPr lang="en-SG" sz="1050" dirty="0"/>
+          </a:p>
+        </p:txBody>
+      </p:sp>
+      <p:sp>
+        <p:nvSpPr>
+          <p:cNvPr id="99" name="Rectangle 98"/>
+          <p:cNvSpPr/>
+          <p:nvPr/>
+        </p:nvSpPr>
+        <p:spPr>
+          <a:xfrm>
+            <a:off x="3666876" y="3710497"/>
+            <a:ext cx="929296" cy="346760"/>
+          </a:xfrm>
+          <a:prstGeom prst="rect">
+            <a:avLst/>
+          </a:prstGeom>
+          <a:ln w="19050"/>
+          <a:effectLst/>
+        </p:spPr>
+        <p:style>
+          <a:lnRef idx="1">
+            <a:schemeClr val="accent6"/>
+          </a:lnRef>
+          <a:fillRef idx="2">
+            <a:schemeClr val="accent6"/>
+          </a:fillRef>
+          <a:effectRef idx="1">
+            <a:schemeClr val="accent6"/>
+          </a:effectRef>
+          <a:fontRef idx="minor">
+            <a:schemeClr val="dk1"/>
+          </a:fontRef>
+        </p:style>
+        <p:txBody>
+          <a:bodyPr rtlCol="0" anchor="ctr"/>
+          <a:lstStyle/>
+          <a:p>
+            <a:pPr algn="ctr"/>
+            <a:r>
+              <a:rPr lang="en-US" sz="1050" dirty="0"/>
+              <a:t>…Exception</a:t>
+            </a:r>
+            <a:endParaRPr lang="en-SG" sz="1050" dirty="0"/>
+          </a:p>
+        </p:txBody>
+      </p:sp>
+      <p:sp>
+        <p:nvSpPr>
+          <p:cNvPr id="101" name="Rectangle 100"/>
+          <p:cNvSpPr/>
+          <p:nvPr/>
+        </p:nvSpPr>
+        <p:spPr>
+          <a:xfrm>
+            <a:off x="2356763" y="4455640"/>
+            <a:ext cx="929296" cy="346760"/>
+          </a:xfrm>
+          <a:prstGeom prst="rect">
+            <a:avLst/>
+          </a:prstGeom>
+          <a:ln w="19050"/>
+          <a:effectLst/>
+        </p:spPr>
+        <p:style>
+          <a:lnRef idx="1">
+            <a:schemeClr val="accent2"/>
+          </a:lnRef>
+          <a:fillRef idx="2">
+            <a:schemeClr val="accent2"/>
+          </a:fillRef>
+          <a:effectRef idx="1">
+            <a:schemeClr val="accent2"/>
+          </a:effectRef>
+          <a:fontRef idx="minor">
+            <a:schemeClr val="dk1"/>
+          </a:fontRef>
+        </p:style>
+        <p:txBody>
+          <a:bodyPr rtlCol="0" anchor="ctr"/>
+          <a:lstStyle/>
+          <a:p>
+            <a:pPr algn="ctr"/>
+            <a:r>
+              <a:rPr lang="en-US" sz="1050" dirty="0"/>
+              <a:t>Adapted…</a:t>
+            </a:r>
+            <a:endParaRPr lang="en-SG" sz="1050" dirty="0"/>
+          </a:p>
+        </p:txBody>
+      </p:sp>
+      <p:cxnSp>
+        <p:nvCxnSpPr>
+          <p:cNvPr id="102" name="Elbow Connector 101"/>
+          <p:cNvCxnSpPr>
+            <a:stCxn id="23" idx="3"/>
+            <a:endCxn id="101" idx="1"/>
+          </p:cNvCxnSpPr>
+          <p:nvPr/>
+        </p:nvCxnSpPr>
+        <p:spPr>
+          <a:xfrm flipV="1">
+            <a:off x="2082523" y="4629020"/>
+            <a:ext cx="274240" cy="4831"/>
+          </a:xfrm>
+          <a:prstGeom prst="bentConnector3">
+            <a:avLst>
+              <a:gd name="adj1" fmla="val 50000"/>
+            </a:avLst>
+          </a:prstGeom>
+          <a:ln w="19050">
+            <a:solidFill>
+              <a:srgbClr val="C00000"/>
+            </a:solidFill>
+            <a:prstDash val="dash"/>
+            <a:headEnd type="none" w="med" len="med"/>
+            <a:tailEnd type="arrow" w="med" len="med"/>
+          </a:ln>
+          <a:effectLst/>
+        </p:spPr>
+        <p:style>
+          <a:lnRef idx="1">
+            <a:schemeClr val="accent2"/>
+          </a:lnRef>
+          <a:fillRef idx="2">
+            <a:schemeClr val="accent2"/>
+          </a:fillRef>
+          <a:effectRef idx="1">
+            <a:schemeClr val="accent2"/>
+          </a:effectRef>
+          <a:fontRef idx="minor">
+            <a:schemeClr val="dk1"/>
+          </a:fontRef>
+        </p:style>
+      </p:cxnSp>
+      <p:cxnSp>
+        <p:nvCxnSpPr>
+          <p:cNvPr id="87" name="Straight Arrow Connector 86"/>
+          <p:cNvCxnSpPr/>
+          <p:nvPr/>
+        </p:nvCxnSpPr>
+        <p:spPr>
+          <a:xfrm flipV="1">
+            <a:off x="6689602" y="1042956"/>
+            <a:ext cx="0" cy="304800"/>
+          </a:xfrm>
+          <a:prstGeom prst="straightConnector1">
+            <a:avLst/>
+          </a:prstGeom>
+          <a:ln w="19050">
+            <a:solidFill>
+              <a:schemeClr val="accent3"/>
+            </a:solidFill>
+            <a:prstDash val="dash"/>
+            <a:headEnd type="none" w="med" len="med"/>
+            <a:tailEnd type="arrow" w="med" len="med"/>
+          </a:ln>
+          <a:effectLst/>
+        </p:spPr>
+        <p:style>
+          <a:lnRef idx="1">
+            <a:schemeClr val="accent2"/>
+          </a:lnRef>
+          <a:fillRef idx="2">
+            <a:schemeClr val="accent2"/>
+          </a:fillRef>
+          <a:effectRef idx="1">
+            <a:schemeClr val="accent2"/>
+          </a:effectRef>
+          <a:fontRef idx="minor">
+            <a:schemeClr val="dk1"/>
+          </a:fontRef>
+        </p:style>
+      </p:cxnSp>
+      <p:cxnSp>
+        <p:nvCxnSpPr>
+          <p:cNvPr id="107" name="Straight Arrow Connector 106"/>
+          <p:cNvCxnSpPr/>
+          <p:nvPr/>
+        </p:nvCxnSpPr>
+        <p:spPr>
+          <a:xfrm flipV="1">
+            <a:off x="6842002" y="1042956"/>
+            <a:ext cx="0" cy="304800"/>
+          </a:xfrm>
+          <a:prstGeom prst="straightConnector1">
+            <a:avLst/>
+          </a:prstGeom>
+          <a:ln w="19050">
+            <a:solidFill>
+              <a:schemeClr val="accent3"/>
+            </a:solidFill>
+            <a:prstDash val="dash"/>
+            <a:headEnd type="none" w="med" len="med"/>
+            <a:tailEnd type="arrow" w="med" len="med"/>
+          </a:ln>
+          <a:effectLst/>
+        </p:spPr>
+        <p:style>
+          <a:lnRef idx="1">
+            <a:schemeClr val="accent2"/>
+          </a:lnRef>
+          <a:fillRef idx="2">
+            <a:schemeClr val="accent2"/>
+          </a:fillRef>
+          <a:effectRef idx="1">
+            <a:schemeClr val="accent2"/>
+          </a:effectRef>
+          <a:fontRef idx="minor">
+            <a:schemeClr val="dk1"/>
+          </a:fontRef>
+        </p:style>
+      </p:cxnSp>
+      <p:cxnSp>
+        <p:nvCxnSpPr>
+          <p:cNvPr id="108" name="Straight Arrow Connector 107"/>
+          <p:cNvCxnSpPr/>
+          <p:nvPr/>
+        </p:nvCxnSpPr>
+        <p:spPr>
+          <a:xfrm flipV="1">
+            <a:off x="6994402" y="1042956"/>
+            <a:ext cx="0" cy="304800"/>
+          </a:xfrm>
+          <a:prstGeom prst="straightConnector1">
+            <a:avLst/>
+          </a:prstGeom>
+          <a:ln w="19050">
+            <a:solidFill>
+              <a:schemeClr val="accent3"/>
+            </a:solidFill>
+            <a:prstDash val="dash"/>
+            <a:headEnd type="none" w="med" len="med"/>
+            <a:tailEnd type="arrow" w="med" len="med"/>
+          </a:ln>
+          <a:effectLst/>
+        </p:spPr>
+        <p:style>
+          <a:lnRef idx="1">
+            <a:schemeClr val="accent2"/>
+          </a:lnRef>
+          <a:fillRef idx="2">
+            <a:schemeClr val="accent2"/>
+          </a:fillRef>
+          <a:effectRef idx="1">
+            <a:schemeClr val="accent2"/>
+          </a:effectRef>
+          <a:fontRef idx="minor">
+            <a:schemeClr val="dk1"/>
+          </a:fontRef>
+        </p:style>
+      </p:cxnSp>
+      <p:cxnSp>
+        <p:nvCxnSpPr>
+          <p:cNvPr id="109" name="Straight Arrow Connector 108"/>
+          <p:cNvCxnSpPr/>
+          <p:nvPr/>
+        </p:nvCxnSpPr>
+        <p:spPr>
+          <a:xfrm flipV="1">
+            <a:off x="7864445" y="1042956"/>
+            <a:ext cx="0" cy="304800"/>
+          </a:xfrm>
+          <a:prstGeom prst="straightConnector1">
+            <a:avLst/>
+          </a:prstGeom>
+          <a:ln w="19050">
+            <a:solidFill>
+              <a:schemeClr val="accent3"/>
+            </a:solidFill>
+            <a:prstDash val="dash"/>
+            <a:headEnd type="none" w="med" len="med"/>
+            <a:tailEnd type="arrow" w="med" len="med"/>
+          </a:ln>
+          <a:effectLst/>
+        </p:spPr>
+        <p:style>
+          <a:lnRef idx="1">
+            <a:schemeClr val="accent2"/>
+          </a:lnRef>
+          <a:fillRef idx="2">
+            <a:schemeClr val="accent2"/>
+          </a:fillRef>
+          <a:effectRef idx="1">
+            <a:schemeClr val="accent2"/>
+          </a:effectRef>
+          <a:fontRef idx="minor">
+            <a:schemeClr val="dk1"/>
+          </a:fontRef>
+        </p:style>
+      </p:cxnSp>
+      <p:cxnSp>
+        <p:nvCxnSpPr>
+          <p:cNvPr id="110" name="Straight Arrow Connector 109"/>
+          <p:cNvCxnSpPr/>
+          <p:nvPr/>
+        </p:nvCxnSpPr>
+        <p:spPr>
+          <a:xfrm flipV="1">
+            <a:off x="8016845" y="1042956"/>
+            <a:ext cx="0" cy="304800"/>
+          </a:xfrm>
+          <a:prstGeom prst="straightConnector1">
+            <a:avLst/>
+          </a:prstGeom>
+          <a:ln w="19050">
+            <a:solidFill>
+              <a:schemeClr val="accent3"/>
+            </a:solidFill>
+            <a:prstDash val="dash"/>
+            <a:headEnd type="none" w="med" len="med"/>
+            <a:tailEnd type="arrow" w="med" len="med"/>
+          </a:ln>
+          <a:effectLst/>
+        </p:spPr>
+        <p:style>
+          <a:lnRef idx="1">
+            <a:schemeClr val="accent2"/>
+          </a:lnRef>
+          <a:fillRef idx="2">
+            <a:schemeClr val="accent2"/>
+          </a:fillRef>
+          <a:effectRef idx="1">
+            <a:schemeClr val="accent2"/>
+          </a:effectRef>
+          <a:fontRef idx="minor">
+            <a:schemeClr val="dk1"/>
+          </a:fontRef>
+        </p:style>
+      </p:cxnSp>
+      <p:cxnSp>
+        <p:nvCxnSpPr>
+          <p:cNvPr id="111" name="Straight Arrow Connector 110"/>
+          <p:cNvCxnSpPr/>
+          <p:nvPr/>
+        </p:nvCxnSpPr>
+        <p:spPr>
+          <a:xfrm flipV="1">
+            <a:off x="8169245" y="1042956"/>
+            <a:ext cx="0" cy="304800"/>
+          </a:xfrm>
+          <a:prstGeom prst="straightConnector1">
+            <a:avLst/>
+          </a:prstGeom>
+          <a:ln w="19050">
+            <a:solidFill>
+              <a:schemeClr val="accent3"/>
+            </a:solidFill>
+            <a:prstDash val="dash"/>
+            <a:headEnd type="none" w="med" len="med"/>
+            <a:tailEnd type="arrow" w="med" len="med"/>
+          </a:ln>
+          <a:effectLst/>
+        </p:spPr>
+        <p:style>
+          <a:lnRef idx="1">
+            <a:schemeClr val="accent2"/>
+          </a:lnRef>
+          <a:fillRef idx="2">
+            <a:schemeClr val="accent2"/>
+          </a:fillRef>
+          <a:effectRef idx="1">
+            <a:schemeClr val="accent2"/>
+          </a:effectRef>
+          <a:fontRef idx="minor">
+            <a:schemeClr val="dk1"/>
+          </a:fontRef>
+        </p:style>
+      </p:cxnSp>
+      <p:sp>
+        <p:nvSpPr>
+          <p:cNvPr id="54" name="Isosceles Triangle 53"/>
+          <p:cNvSpPr/>
+          <p:nvPr/>
+        </p:nvSpPr>
+        <p:spPr>
+          <a:xfrm rot="5400000">
+            <a:off x="6564806" y="1762377"/>
+            <a:ext cx="270504" cy="175523"/>
+          </a:xfrm>
+          <a:prstGeom prst="triangle">
+            <a:avLst/>
+          </a:prstGeom>
+          <a:ln w="19050"/>
+          <a:effectLst/>
+        </p:spPr>
+        <p:style>
+          <a:lnRef idx="1">
+            <a:schemeClr val="accent5"/>
+          </a:lnRef>
+          <a:fillRef idx="2">
+            <a:schemeClr val="accent5"/>
+          </a:fillRef>
+          <a:effectRef idx="1">
+            <a:schemeClr val="accent5"/>
+          </a:effectRef>
+          <a:fontRef idx="minor">
+            <a:schemeClr val="dk1"/>
+          </a:fontRef>
+        </p:style>
+        <p:txBody>
+          <a:bodyPr rtlCol="0" anchor="ctr"/>
+          <a:lstStyle/>
+          <a:p>
+            <a:pPr algn="ctr"/>
+            <a:endParaRPr lang="en-SG" sz="1050"/>
+          </a:p>
+        </p:txBody>
+      </p:sp>
+      <p:sp>
+        <p:nvSpPr>
+          <p:cNvPr id="80" name="Rectangle 79">
+            <a:extLst>
+              <a:ext uri="{FF2B5EF4-FFF2-40B4-BE49-F238E27FC236}">
+                <a16:creationId xmlns:a16="http://schemas.microsoft.com/office/drawing/2014/main" id="{FC882BB2-6C59-4B26-AAFB-255F91F2E51C}"/>
+              </a:ext>
+            </a:extLst>
+          </p:cNvPr>
+          <p:cNvSpPr/>
+          <p:nvPr/>
+        </p:nvSpPr>
+        <p:spPr>
+          <a:xfrm>
+            <a:off x="2474444" y="1626734"/>
+            <a:ext cx="1611867" cy="444640"/>
+          </a:xfrm>
+          <a:prstGeom prst="rect">
+            <a:avLst/>
+          </a:prstGeom>
+          <a:ln w="19050"/>
+          <a:effectLst/>
+        </p:spPr>
+        <p:style>
+          <a:lnRef idx="1">
+            <a:schemeClr val="accent5"/>
+          </a:lnRef>
+          <a:fillRef idx="2">
+            <a:schemeClr val="accent5"/>
+          </a:fillRef>
+          <a:effectRef idx="1">
+            <a:schemeClr val="accent5"/>
+          </a:effectRef>
+          <a:fontRef idx="minor">
+            <a:schemeClr val="dk1"/>
+          </a:fontRef>
+        </p:style>
+        <p:txBody>
+          <a:bodyPr rtlCol="0" anchor="ctr"/>
+          <a:lstStyle/>
+          <a:p>
+            <a:pPr algn="ctr"/>
+            <a:r>
+              <a:rPr lang="en-US" sz="1050" dirty="0" err="1"/>
+              <a:t>AggregateCommand</a:t>
+            </a:r>
+            <a:endParaRPr lang="en-SG" sz="1050" dirty="0"/>
+          </a:p>
+        </p:txBody>
+      </p:sp>
+      <p:cxnSp>
+        <p:nvCxnSpPr>
+          <p:cNvPr id="85" name="Elbow Connector 72">
+            <a:extLst>
+              <a:ext uri="{FF2B5EF4-FFF2-40B4-BE49-F238E27FC236}">
+                <a16:creationId xmlns:a16="http://schemas.microsoft.com/office/drawing/2014/main" id="{9AAFAFD1-1C5C-485E-B2F7-1FCE56076B96}"/>
+              </a:ext>
+            </a:extLst>
+          </p:cNvPr>
+          <p:cNvCxnSpPr>
+            <a:cxnSpLocks/>
+            <a:stCxn id="80" idx="0"/>
             <a:endCxn id="81" idx="1"/>
           </p:cNvCxnSpPr>
           <p:nvPr/>
         </p:nvCxnSpPr>
         <p:spPr>
           <a:xfrm rot="16200000" flipV="1">
-            <a:off x="2766652" y="750077"/>
-            <a:ext cx="462768" cy="749453"/>
+            <a:off x="2585187" y="931542"/>
+            <a:ext cx="733314" cy="657069"/>
           </a:xfrm>
           <a:prstGeom prst="bentConnector2">
             <a:avLst/>
@@ -5191,345 +5818,151 @@
           </a:fontRef>
         </p:style>
       </p:cxnSp>
+      <p:sp>
+        <p:nvSpPr>
+          <p:cNvPr id="95" name="Flowchart: Decision 94">
+            <a:extLst>
+              <a:ext uri="{FF2B5EF4-FFF2-40B4-BE49-F238E27FC236}">
+                <a16:creationId xmlns:a16="http://schemas.microsoft.com/office/drawing/2014/main" id="{5C78FDD6-881F-4A93-87FF-E28FA800139B}"/>
+              </a:ext>
+            </a:extLst>
+          </p:cNvPr>
+          <p:cNvSpPr/>
+          <p:nvPr/>
+        </p:nvSpPr>
+        <p:spPr>
+          <a:xfrm>
+            <a:off x="4086311" y="1762364"/>
+            <a:ext cx="236048" cy="173380"/>
+          </a:xfrm>
+          <a:prstGeom prst="flowChartDecision">
+            <a:avLst/>
+          </a:prstGeom>
+          <a:solidFill>
+            <a:srgbClr val="46AAC5"/>
+          </a:solidFill>
+          <a:ln w="19050">
+            <a:solidFill>
+              <a:srgbClr val="46AAC5"/>
+            </a:solidFill>
+          </a:ln>
+          <a:effectLst/>
+        </p:spPr>
+        <p:style>
+          <a:lnRef idx="1">
+            <a:schemeClr val="accent6"/>
+          </a:lnRef>
+          <a:fillRef idx="2">
+            <a:schemeClr val="accent6"/>
+          </a:fillRef>
+          <a:effectRef idx="1">
+            <a:schemeClr val="accent6"/>
+          </a:effectRef>
+          <a:fontRef idx="minor">
+            <a:schemeClr val="dk1"/>
+          </a:fontRef>
+        </p:style>
+        <p:txBody>
+          <a:bodyPr rtlCol="0" anchor="ctr"/>
+          <a:lstStyle/>
+          <a:p>
+            <a:pPr algn="ctr"/>
+            <a:endParaRPr lang="en-US" sz="1050">
+              <a:solidFill>
+                <a:srgbClr val="46AAC5"/>
+              </a:solidFill>
+            </a:endParaRPr>
+          </a:p>
+        </p:txBody>
+      </p:sp>
       <p:cxnSp>
         <p:nvCxnSpPr>
-          <p:cNvPr id="84" name="Elbow Connector 83"/>
+          <p:cNvPr id="103" name="Elbow Connector 55">
+            <a:extLst>
+              <a:ext uri="{FF2B5EF4-FFF2-40B4-BE49-F238E27FC236}">
+                <a16:creationId xmlns:a16="http://schemas.microsoft.com/office/drawing/2014/main" id="{8C426CEE-A3D5-4F5D-BF2B-D21B45BFB6A3}"/>
+              </a:ext>
+            </a:extLst>
+          </p:cNvPr>
           <p:cNvCxnSpPr>
-            <a:endCxn id="81" idx="3"/>
+            <a:cxnSpLocks/>
+            <a:stCxn id="50" idx="3"/>
+            <a:endCxn id="95" idx="3"/>
           </p:cNvCxnSpPr>
           <p:nvPr/>
         </p:nvCxnSpPr>
         <p:spPr>
-          <a:xfrm rot="5400000" flipH="1" flipV="1">
-            <a:off x="-394396" y="2133468"/>
-            <a:ext cx="2853643" cy="373549"/>
-          </a:xfrm>
-          <a:prstGeom prst="bentConnector2">
-            <a:avLst/>
-          </a:prstGeom>
-          <a:ln w="19050">
-            <a:solidFill>
-              <a:srgbClr val="C00000"/>
-            </a:solidFill>
-            <a:prstDash val="dash"/>
-            <a:headEnd type="none" w="med" len="med"/>
-            <a:tailEnd type="arrow" w="med" len="med"/>
-          </a:ln>
-          <a:effectLst/>
-        </p:spPr>
-        <p:style>
-          <a:lnRef idx="1">
-            <a:schemeClr val="accent2"/>
-          </a:lnRef>
-          <a:fillRef idx="2">
-            <a:schemeClr val="accent2"/>
-          </a:fillRef>
-          <a:effectRef idx="1">
-            <a:schemeClr val="accent2"/>
-          </a:effectRef>
-          <a:fontRef idx="minor">
-            <a:schemeClr val="dk1"/>
-          </a:fontRef>
-        </p:style>
-      </p:cxnSp>
-      <p:sp>
-        <p:nvSpPr>
-          <p:cNvPr id="92" name="Rectangle 91"/>
-          <p:cNvSpPr/>
-          <p:nvPr/>
-        </p:nvSpPr>
-        <p:spPr>
-          <a:xfrm>
-            <a:off x="6781800" y="3539440"/>
-            <a:ext cx="929296" cy="346760"/>
-          </a:xfrm>
-          <a:prstGeom prst="rect">
-            <a:avLst/>
-          </a:prstGeom>
-          <a:ln w="19050"/>
-          <a:effectLst/>
-        </p:spPr>
-        <p:style>
-          <a:lnRef idx="1">
-            <a:schemeClr val="accent4"/>
-          </a:lnRef>
-          <a:fillRef idx="2">
-            <a:schemeClr val="accent4"/>
-          </a:fillRef>
-          <a:effectRef idx="1">
-            <a:schemeClr val="accent4"/>
-          </a:effectRef>
-          <a:fontRef idx="minor">
-            <a:schemeClr val="dk1"/>
-          </a:fontRef>
-        </p:style>
-        <p:txBody>
-          <a:bodyPr rtlCol="0" anchor="ctr"/>
-          <a:lstStyle/>
-          <a:p>
-            <a:pPr algn="ctr"/>
-            <a:r>
-              <a:rPr lang="en-US" sz="1050" dirty="0"/>
-              <a:t>Name</a:t>
-            </a:r>
-            <a:endParaRPr lang="en-SG" sz="1050" dirty="0"/>
-          </a:p>
-        </p:txBody>
-      </p:sp>
-      <p:cxnSp>
-        <p:nvCxnSpPr>
-          <p:cNvPr id="93" name="Elbow Connector 92"/>
-          <p:cNvCxnSpPr>
-            <a:stCxn id="90" idx="3"/>
-            <a:endCxn id="92" idx="1"/>
-          </p:cNvCxnSpPr>
-          <p:nvPr/>
-        </p:nvCxnSpPr>
-        <p:spPr>
-          <a:xfrm flipV="1">
-            <a:off x="6384802" y="3712820"/>
-            <a:ext cx="396998" cy="809271"/>
+          <a:xfrm rot="10800000" flipV="1">
+            <a:off x="4322360" y="1232460"/>
+            <a:ext cx="402041" cy="616594"/>
           </a:xfrm>
           <a:prstGeom prst="bentConnector3">
             <a:avLst>
               <a:gd name="adj1" fmla="val 50000"/>
             </a:avLst>
           </a:prstGeom>
+          <a:noFill/>
           <a:ln w="19050">
-            <a:headEnd type="none" w="med" len="med"/>
-            <a:tailEnd type="arrow" w="med" len="med"/>
+            <a:headEnd type="arrow"/>
           </a:ln>
           <a:effectLst/>
         </p:spPr>
         <p:style>
           <a:lnRef idx="1">
-            <a:schemeClr val="accent6"/>
-          </a:lnRef>
-          <a:fillRef idx="2">
-            <a:schemeClr val="accent6"/>
-          </a:fillRef>
-          <a:effectRef idx="1">
-            <a:schemeClr val="accent6"/>
+            <a:schemeClr val="accent5"/>
+          </a:lnRef>
+          <a:fillRef idx="2">
+            <a:schemeClr val="accent5"/>
+          </a:fillRef>
+          <a:effectRef idx="1">
+            <a:schemeClr val="accent5"/>
           </a:effectRef>
           <a:fontRef idx="minor">
             <a:schemeClr val="dk1"/>
           </a:fontRef>
         </p:style>
       </p:cxnSp>
-      <p:sp>
-        <p:nvSpPr>
-          <p:cNvPr id="96" name="Rectangle 95"/>
-          <p:cNvSpPr/>
-          <p:nvPr/>
-        </p:nvSpPr>
-        <p:spPr>
-          <a:xfrm>
-            <a:off x="6384802" y="874142"/>
-            <a:ext cx="929296" cy="346760"/>
-          </a:xfrm>
-          <a:prstGeom prst="rect">
-            <a:avLst/>
-          </a:prstGeom>
-          <a:ln w="19050"/>
-          <a:effectLst/>
-        </p:spPr>
-        <p:style>
-          <a:lnRef idx="1">
-            <a:schemeClr val="accent3"/>
-          </a:lnRef>
-          <a:fillRef idx="2">
-            <a:schemeClr val="accent3"/>
-          </a:fillRef>
-          <a:effectRef idx="1">
-            <a:schemeClr val="accent3"/>
-          </a:effectRef>
-          <a:fontRef idx="minor">
-            <a:schemeClr val="dk1"/>
-          </a:fontRef>
-        </p:style>
-        <p:txBody>
-          <a:bodyPr rtlCol="0" anchor="ctr"/>
-          <a:lstStyle/>
-          <a:p>
-            <a:pPr algn="ctr"/>
-            <a:r>
-              <a:rPr lang="en-US" sz="1050" dirty="0" smtClean="0"/>
-              <a:t>Messages</a:t>
-            </a:r>
-            <a:endParaRPr lang="en-SG" sz="1050" dirty="0"/>
-          </a:p>
-        </p:txBody>
-      </p:sp>
-      <p:sp>
-        <p:nvSpPr>
-          <p:cNvPr id="98" name="Rectangle 97"/>
-          <p:cNvSpPr/>
-          <p:nvPr/>
-        </p:nvSpPr>
-        <p:spPr>
-          <a:xfrm>
-            <a:off x="7592520" y="874142"/>
-            <a:ext cx="929296" cy="346760"/>
-          </a:xfrm>
-          <a:prstGeom prst="rect">
-            <a:avLst/>
-          </a:prstGeom>
-          <a:ln w="19050"/>
-          <a:effectLst/>
-        </p:spPr>
-        <p:style>
-          <a:lnRef idx="1">
-            <a:schemeClr val="accent3"/>
-          </a:lnRef>
-          <a:fillRef idx="2">
-            <a:schemeClr val="accent3"/>
-          </a:fillRef>
-          <a:effectRef idx="1">
-            <a:schemeClr val="accent3"/>
-          </a:effectRef>
-          <a:fontRef idx="minor">
-            <a:schemeClr val="dk1"/>
-          </a:fontRef>
-        </p:style>
-        <p:txBody>
-          <a:bodyPr rtlCol="0" anchor="ctr"/>
-          <a:lstStyle/>
-          <a:p>
-            <a:pPr algn="ctr"/>
-            <a:r>
-              <a:rPr lang="en-US" sz="1050" dirty="0" err="1" smtClean="0"/>
-              <a:t>Utils</a:t>
-            </a:r>
-            <a:endParaRPr lang="en-SG" sz="1050" dirty="0"/>
-          </a:p>
-        </p:txBody>
-      </p:sp>
-      <p:sp>
-        <p:nvSpPr>
-          <p:cNvPr id="99" name="Rectangle 98"/>
-          <p:cNvSpPr/>
-          <p:nvPr/>
-        </p:nvSpPr>
-        <p:spPr>
-          <a:xfrm>
-            <a:off x="3666876" y="3710497"/>
-            <a:ext cx="929296" cy="346760"/>
-          </a:xfrm>
-          <a:prstGeom prst="rect">
-            <a:avLst/>
-          </a:prstGeom>
-          <a:ln w="19050"/>
-          <a:effectLst/>
-        </p:spPr>
-        <p:style>
-          <a:lnRef idx="1">
-            <a:schemeClr val="accent6"/>
-          </a:lnRef>
-          <a:fillRef idx="2">
-            <a:schemeClr val="accent6"/>
-          </a:fillRef>
-          <a:effectRef idx="1">
-            <a:schemeClr val="accent6"/>
-          </a:effectRef>
-          <a:fontRef idx="minor">
-            <a:schemeClr val="dk1"/>
-          </a:fontRef>
-        </p:style>
-        <p:txBody>
-          <a:bodyPr rtlCol="0" anchor="ctr"/>
-          <a:lstStyle/>
-          <a:p>
-            <a:pPr algn="ctr"/>
-            <a:r>
-              <a:rPr lang="en-US" sz="1050" dirty="0"/>
-              <a:t>…Exception</a:t>
-            </a:r>
-            <a:endParaRPr lang="en-SG" sz="1050" dirty="0"/>
-          </a:p>
-        </p:txBody>
-      </p:sp>
-      <p:sp>
-        <p:nvSpPr>
-          <p:cNvPr id="101" name="Rectangle 100"/>
-          <p:cNvSpPr/>
-          <p:nvPr/>
-        </p:nvSpPr>
-        <p:spPr>
-          <a:xfrm>
-            <a:off x="2356763" y="4455640"/>
-            <a:ext cx="929296" cy="346760"/>
-          </a:xfrm>
-          <a:prstGeom prst="rect">
-            <a:avLst/>
-          </a:prstGeom>
-          <a:ln w="19050"/>
-          <a:effectLst/>
-        </p:spPr>
-        <p:style>
-          <a:lnRef idx="1">
-            <a:schemeClr val="accent2"/>
-          </a:lnRef>
-          <a:fillRef idx="2">
-            <a:schemeClr val="accent2"/>
-          </a:fillRef>
-          <a:effectRef idx="1">
-            <a:schemeClr val="accent2"/>
-          </a:effectRef>
-          <a:fontRef idx="minor">
-            <a:schemeClr val="dk1"/>
-          </a:fontRef>
-        </p:style>
-        <p:txBody>
-          <a:bodyPr rtlCol="0" anchor="ctr"/>
-          <a:lstStyle/>
-          <a:p>
-            <a:pPr algn="ctr"/>
-            <a:r>
-              <a:rPr lang="en-US" sz="1050" dirty="0" smtClean="0"/>
-              <a:t>Adapted…</a:t>
-            </a:r>
-            <a:endParaRPr lang="en-SG" sz="1050" dirty="0"/>
-          </a:p>
-        </p:txBody>
-      </p:sp>
       <p:cxnSp>
         <p:nvCxnSpPr>
-          <p:cNvPr id="102" name="Elbow Connector 101"/>
+          <p:cNvPr id="104" name="Elbow Connector 55">
+            <a:extLst>
+              <a:ext uri="{FF2B5EF4-FFF2-40B4-BE49-F238E27FC236}">
+                <a16:creationId xmlns:a16="http://schemas.microsoft.com/office/drawing/2014/main" id="{29FCF51D-CC9B-48DD-BD70-540D146D46E0}"/>
+              </a:ext>
+            </a:extLst>
+          </p:cNvPr>
           <p:cNvCxnSpPr>
-            <a:stCxn id="23" idx="3"/>
-            <a:endCxn id="101" idx="1"/>
+            <a:cxnSpLocks/>
+            <a:stCxn id="52" idx="3"/>
+            <a:endCxn id="95" idx="3"/>
           </p:cNvCxnSpPr>
           <p:nvPr/>
         </p:nvCxnSpPr>
         <p:spPr>
-          <a:xfrm flipV="1">
-            <a:off x="2082523" y="4629020"/>
-            <a:ext cx="274240" cy="4831"/>
+          <a:xfrm rot="10800000" flipV="1">
+            <a:off x="4322360" y="1627446"/>
+            <a:ext cx="402041" cy="221607"/>
           </a:xfrm>
           <a:prstGeom prst="bentConnector3">
             <a:avLst>
               <a:gd name="adj1" fmla="val 50000"/>
             </a:avLst>
           </a:prstGeom>
+          <a:noFill/>
           <a:ln w="19050">
-            <a:solidFill>
-              <a:srgbClr val="C00000"/>
-            </a:solidFill>
-            <a:prstDash val="dash"/>
-            <a:headEnd type="none" w="med" len="med"/>
-            <a:tailEnd type="arrow" w="med" len="med"/>
+            <a:headEnd type="arrow"/>
           </a:ln>
           <a:effectLst/>
         </p:spPr>
         <p:style>
           <a:lnRef idx="1">
-            <a:schemeClr val="accent2"/>
-          </a:lnRef>
-          <a:fillRef idx="2">
-            <a:schemeClr val="accent2"/>
-          </a:fillRef>
-          <a:effectRef idx="1">
-            <a:schemeClr val="accent2"/>
+            <a:schemeClr val="accent5"/>
+          </a:lnRef>
+          <a:fillRef idx="2">
+            <a:schemeClr val="accent5"/>
+          </a:fillRef>
+          <a:effectRef idx="1">
+            <a:schemeClr val="accent5"/>
           </a:effectRef>
           <a:fontRef idx="minor">
             <a:schemeClr val="dk1"/>
@@ -5538,37 +5971,45 @@
       </p:cxnSp>
       <p:cxnSp>
         <p:nvCxnSpPr>
-          <p:cNvPr id="87" name="Straight Arrow Connector 86"/>
-          <p:cNvCxnSpPr/>
+          <p:cNvPr id="105" name="Elbow Connector 55">
+            <a:extLst>
+              <a:ext uri="{FF2B5EF4-FFF2-40B4-BE49-F238E27FC236}">
+                <a16:creationId xmlns:a16="http://schemas.microsoft.com/office/drawing/2014/main" id="{38C96BC8-03B7-49AB-80A3-00D4AFA18DFC}"/>
+              </a:ext>
+            </a:extLst>
+          </p:cNvPr>
+          <p:cNvCxnSpPr>
+            <a:cxnSpLocks/>
+            <a:stCxn id="53" idx="3"/>
+            <a:endCxn id="95" idx="3"/>
+          </p:cNvCxnSpPr>
           <p:nvPr/>
         </p:nvCxnSpPr>
         <p:spPr>
-          <a:xfrm flipV="1">
-            <a:off x="6689603" y="1199445"/>
-            <a:ext cx="0" cy="304800"/>
-          </a:xfrm>
-          <a:prstGeom prst="straightConnector1">
-            <a:avLst/>
-          </a:prstGeom>
+          <a:xfrm rot="10800000">
+            <a:off x="4322360" y="1849054"/>
+            <a:ext cx="402041" cy="173380"/>
+          </a:xfrm>
+          <a:prstGeom prst="bentConnector3">
+            <a:avLst>
+              <a:gd name="adj1" fmla="val 50000"/>
+            </a:avLst>
+          </a:prstGeom>
+          <a:noFill/>
           <a:ln w="19050">
-            <a:solidFill>
-              <a:schemeClr val="accent3"/>
-            </a:solidFill>
-            <a:prstDash val="dash"/>
-            <a:headEnd type="none" w="med" len="med"/>
-            <a:tailEnd type="arrow" w="med" len="med"/>
+            <a:headEnd type="arrow"/>
           </a:ln>
           <a:effectLst/>
         </p:spPr>
         <p:style>
           <a:lnRef idx="1">
-            <a:schemeClr val="accent2"/>
-          </a:lnRef>
-          <a:fillRef idx="2">
-            <a:schemeClr val="accent2"/>
-          </a:fillRef>
-          <a:effectRef idx="1">
-            <a:schemeClr val="accent2"/>
+            <a:schemeClr val="accent5"/>
+          </a:lnRef>
+          <a:fillRef idx="2">
+            <a:schemeClr val="accent5"/>
+          </a:fillRef>
+          <a:effectRef idx="1">
+            <a:schemeClr val="accent5"/>
           </a:effectRef>
           <a:fontRef idx="minor">
             <a:schemeClr val="dk1"/>
@@ -5577,193 +6018,45 @@
       </p:cxnSp>
       <p:cxnSp>
         <p:nvCxnSpPr>
-          <p:cNvPr id="107" name="Straight Arrow Connector 106"/>
-          <p:cNvCxnSpPr/>
+          <p:cNvPr id="112" name="Elbow Connector 55">
+            <a:extLst>
+              <a:ext uri="{FF2B5EF4-FFF2-40B4-BE49-F238E27FC236}">
+                <a16:creationId xmlns:a16="http://schemas.microsoft.com/office/drawing/2014/main" id="{E3F52993-BBCD-4A46-83E4-2E246B296379}"/>
+              </a:ext>
+            </a:extLst>
+          </p:cNvPr>
+          <p:cNvCxnSpPr>
+            <a:cxnSpLocks/>
+            <a:stCxn id="59" idx="3"/>
+            <a:endCxn id="95" idx="3"/>
+          </p:cNvCxnSpPr>
           <p:nvPr/>
         </p:nvCxnSpPr>
         <p:spPr>
-          <a:xfrm flipV="1">
-            <a:off x="6842003" y="1199445"/>
-            <a:ext cx="0" cy="304800"/>
-          </a:xfrm>
-          <a:prstGeom prst="straightConnector1">
-            <a:avLst/>
-          </a:prstGeom>
+          <a:xfrm rot="10800000">
+            <a:off x="4322360" y="1849054"/>
+            <a:ext cx="402041" cy="568366"/>
+          </a:xfrm>
+          <a:prstGeom prst="bentConnector3">
+            <a:avLst>
+              <a:gd name="adj1" fmla="val 50000"/>
+            </a:avLst>
+          </a:prstGeom>
+          <a:noFill/>
           <a:ln w="19050">
-            <a:solidFill>
-              <a:schemeClr val="accent3"/>
-            </a:solidFill>
-            <a:prstDash val="dash"/>
-            <a:headEnd type="none" w="med" len="med"/>
-            <a:tailEnd type="arrow" w="med" len="med"/>
+            <a:headEnd type="arrow"/>
           </a:ln>
           <a:effectLst/>
         </p:spPr>
         <p:style>
           <a:lnRef idx="1">
-            <a:schemeClr val="accent2"/>
-          </a:lnRef>
-          <a:fillRef idx="2">
-            <a:schemeClr val="accent2"/>
-          </a:fillRef>
-          <a:effectRef idx="1">
-            <a:schemeClr val="accent2"/>
-          </a:effectRef>
-          <a:fontRef idx="minor">
-            <a:schemeClr val="dk1"/>
-          </a:fontRef>
-        </p:style>
-      </p:cxnSp>
-      <p:cxnSp>
-        <p:nvCxnSpPr>
-          <p:cNvPr id="108" name="Straight Arrow Connector 107"/>
-          <p:cNvCxnSpPr/>
-          <p:nvPr/>
-        </p:nvCxnSpPr>
-        <p:spPr>
-          <a:xfrm flipV="1">
-            <a:off x="6994403" y="1199445"/>
-            <a:ext cx="0" cy="304800"/>
-          </a:xfrm>
-          <a:prstGeom prst="straightConnector1">
-            <a:avLst/>
-          </a:prstGeom>
-          <a:ln w="19050">
-            <a:solidFill>
-              <a:schemeClr val="accent3"/>
-            </a:solidFill>
-            <a:prstDash val="dash"/>
-            <a:headEnd type="none" w="med" len="med"/>
-            <a:tailEnd type="arrow" w="med" len="med"/>
-          </a:ln>
-          <a:effectLst/>
-        </p:spPr>
-        <p:style>
-          <a:lnRef idx="1">
-            <a:schemeClr val="accent2"/>
-          </a:lnRef>
-          <a:fillRef idx="2">
-            <a:schemeClr val="accent2"/>
-          </a:fillRef>
-          <a:effectRef idx="1">
-            <a:schemeClr val="accent2"/>
-          </a:effectRef>
-          <a:fontRef idx="minor">
-            <a:schemeClr val="dk1"/>
-          </a:fontRef>
-        </p:style>
-      </p:cxnSp>
-      <p:cxnSp>
-        <p:nvCxnSpPr>
-          <p:cNvPr id="109" name="Straight Arrow Connector 108"/>
-          <p:cNvCxnSpPr/>
-          <p:nvPr/>
-        </p:nvCxnSpPr>
-        <p:spPr>
-          <a:xfrm flipV="1">
-            <a:off x="7864446" y="1199445"/>
-            <a:ext cx="0" cy="304800"/>
-          </a:xfrm>
-          <a:prstGeom prst="straightConnector1">
-            <a:avLst/>
-          </a:prstGeom>
-          <a:ln w="19050">
-            <a:solidFill>
-              <a:schemeClr val="accent3"/>
-            </a:solidFill>
-            <a:prstDash val="dash"/>
-            <a:headEnd type="none" w="med" len="med"/>
-            <a:tailEnd type="arrow" w="med" len="med"/>
-          </a:ln>
-          <a:effectLst/>
-        </p:spPr>
-        <p:style>
-          <a:lnRef idx="1">
-            <a:schemeClr val="accent2"/>
-          </a:lnRef>
-          <a:fillRef idx="2">
-            <a:schemeClr val="accent2"/>
-          </a:fillRef>
-          <a:effectRef idx="1">
-            <a:schemeClr val="accent2"/>
-          </a:effectRef>
-          <a:fontRef idx="minor">
-            <a:schemeClr val="dk1"/>
-          </a:fontRef>
-        </p:style>
-      </p:cxnSp>
-      <p:cxnSp>
-        <p:nvCxnSpPr>
-          <p:cNvPr id="110" name="Straight Arrow Connector 109"/>
-          <p:cNvCxnSpPr/>
-          <p:nvPr/>
-        </p:nvCxnSpPr>
-        <p:spPr>
-          <a:xfrm flipV="1">
-            <a:off x="8016846" y="1199445"/>
-            <a:ext cx="0" cy="304800"/>
-          </a:xfrm>
-          <a:prstGeom prst="straightConnector1">
-            <a:avLst/>
-          </a:prstGeom>
-          <a:ln w="19050">
-            <a:solidFill>
-              <a:schemeClr val="accent3"/>
-            </a:solidFill>
-            <a:prstDash val="dash"/>
-            <a:headEnd type="none" w="med" len="med"/>
-            <a:tailEnd type="arrow" w="med" len="med"/>
-          </a:ln>
-          <a:effectLst/>
-        </p:spPr>
-        <p:style>
-          <a:lnRef idx="1">
-            <a:schemeClr val="accent2"/>
-          </a:lnRef>
-          <a:fillRef idx="2">
-            <a:schemeClr val="accent2"/>
-          </a:fillRef>
-          <a:effectRef idx="1">
-            <a:schemeClr val="accent2"/>
-          </a:effectRef>
-          <a:fontRef idx="minor">
-            <a:schemeClr val="dk1"/>
-          </a:fontRef>
-        </p:style>
-      </p:cxnSp>
-      <p:cxnSp>
-        <p:nvCxnSpPr>
-          <p:cNvPr id="111" name="Straight Arrow Connector 110"/>
-          <p:cNvCxnSpPr/>
-          <p:nvPr/>
-        </p:nvCxnSpPr>
-        <p:spPr>
-          <a:xfrm flipV="1">
-            <a:off x="8169246" y="1199445"/>
-            <a:ext cx="0" cy="304800"/>
-          </a:xfrm>
-          <a:prstGeom prst="straightConnector1">
-            <a:avLst/>
-          </a:prstGeom>
-          <a:ln w="19050">
-            <a:solidFill>
-              <a:schemeClr val="accent3"/>
-            </a:solidFill>
-            <a:prstDash val="dash"/>
-            <a:headEnd type="none" w="med" len="med"/>
-            <a:tailEnd type="arrow" w="med" len="med"/>
-          </a:ln>
-          <a:effectLst/>
-        </p:spPr>
-        <p:style>
-          <a:lnRef idx="1">
-            <a:schemeClr val="accent2"/>
-          </a:lnRef>
-          <a:fillRef idx="2">
-            <a:schemeClr val="accent2"/>
-          </a:fillRef>
-          <a:effectRef idx="1">
-            <a:schemeClr val="accent2"/>
+            <a:schemeClr val="accent5"/>
+          </a:lnRef>
+          <a:fillRef idx="2">
+            <a:schemeClr val="accent5"/>
+          </a:fillRef>
+          <a:effectRef idx="1">
+            <a:schemeClr val="accent5"/>
           </a:effectRef>
           <a:fontRef idx="minor">
             <a:schemeClr val="dk1"/>
@@ -5837,7 +6130,7 @@
           <a:p>
             <a:pPr algn="ctr"/>
             <a:r>
-              <a:rPr lang="en-US" sz="1050" dirty="0" smtClean="0"/>
+              <a:rPr lang="en-US" sz="1050" dirty="0"/>
               <a:t>Address</a:t>
             </a:r>
             <a:endParaRPr lang="en-SG" sz="1050" dirty="0"/>
@@ -5881,7 +6174,7 @@
           <a:p>
             <a:pPr algn="ctr"/>
             <a:r>
-              <a:rPr lang="en-US" sz="1050" dirty="0" smtClean="0"/>
+              <a:rPr lang="en-US" sz="1050" dirty="0"/>
               <a:t>Unit</a:t>
             </a:r>
             <a:endParaRPr lang="en-SG" sz="1050" dirty="0"/>
@@ -6008,7 +6301,7 @@
           <a:p>
             <a:pPr algn="ctr"/>
             <a:r>
-              <a:rPr lang="en-US" sz="1050" dirty="0" smtClean="0"/>
+              <a:rPr lang="en-US" sz="1050" dirty="0"/>
               <a:t>Postal code</a:t>
             </a:r>
             <a:endParaRPr lang="en-SG" sz="1050" dirty="0"/>
@@ -6052,7 +6345,7 @@
           <a:p>
             <a:pPr algn="ctr"/>
             <a:r>
-              <a:rPr lang="en-US" sz="1050" dirty="0" smtClean="0"/>
+              <a:rPr lang="en-US" sz="1050" dirty="0"/>
               <a:t>Street</a:t>
             </a:r>
             <a:endParaRPr lang="en-SG" sz="1050" dirty="0"/>
@@ -6096,7 +6389,7 @@
           <a:p>
             <a:pPr algn="ctr"/>
             <a:r>
-              <a:rPr lang="en-US" sz="1050" dirty="0" smtClean="0"/>
+              <a:rPr lang="en-US" sz="1050" dirty="0"/>
               <a:t>Block</a:t>
             </a:r>
             <a:endParaRPr lang="en-SG" sz="1050" dirty="0"/>
@@ -6260,10 +6553,9 @@
           <a:p>
             <a:pPr algn="ctr"/>
             <a:r>
-              <a:rPr lang="en-SG" sz="1050" dirty="0" smtClean="0"/>
+              <a:rPr lang="en-SG" sz="1050" dirty="0"/>
               <a:t>Contact</a:t>
             </a:r>
-            <a:endParaRPr lang="en-SG" sz="1050" dirty="0"/>
           </a:p>
         </p:txBody>
       </p:sp>
@@ -6304,7 +6596,7 @@
           <a:p>
             <a:pPr algn="ctr"/>
             <a:r>
-              <a:rPr lang="en-US" sz="1050" dirty="0" smtClean="0"/>
+              <a:rPr lang="en-US" sz="1050" dirty="0"/>
               <a:t>Phone</a:t>
             </a:r>
             <a:endParaRPr lang="en-SG" sz="1050" dirty="0"/>
@@ -6348,7 +6640,7 @@
           <a:p>
             <a:pPr algn="ctr"/>
             <a:r>
-              <a:rPr lang="en-US" sz="1050" dirty="0" smtClean="0"/>
+              <a:rPr lang="en-US" sz="1050" dirty="0"/>
               <a:t>Email</a:t>
             </a:r>
             <a:endParaRPr lang="en-SG" sz="1050" dirty="0"/>
@@ -6392,7 +6684,7 @@
           <a:p>
             <a:pPr algn="ctr"/>
             <a:r>
-              <a:rPr lang="en-US" sz="1050" dirty="0" smtClean="0"/>
+              <a:rPr lang="en-US" sz="1050" dirty="0"/>
               <a:t>Address</a:t>
             </a:r>
             <a:endParaRPr lang="en-SG" sz="1050" dirty="0"/>
@@ -6581,10 +6873,9 @@
           <a:p>
             <a:pPr algn="ctr"/>
             <a:r>
-              <a:rPr lang="en-SG" sz="1050" dirty="0" smtClean="0"/>
+              <a:rPr lang="en-SG" sz="1050" dirty="0"/>
               <a:t>&lt;&lt;interface&gt;&gt; Printable</a:t>
             </a:r>
-            <a:endParaRPr lang="en-SG" sz="1050" dirty="0"/>
           </a:p>
         </p:txBody>
       </p:sp>
@@ -6625,7 +6916,7 @@
           <a:p>
             <a:pPr algn="ctr"/>
             <a:r>
-              <a:rPr lang="en-US" sz="1050" dirty="0" smtClean="0"/>
+              <a:rPr lang="en-US" sz="1050" dirty="0"/>
               <a:t>Phone</a:t>
             </a:r>
             <a:endParaRPr lang="en-SG" sz="1050" dirty="0"/>
@@ -6669,7 +6960,7 @@
           <a:p>
             <a:pPr algn="ctr"/>
             <a:r>
-              <a:rPr lang="en-US" sz="1050" dirty="0" smtClean="0"/>
+              <a:rPr lang="en-US" sz="1050" dirty="0"/>
               <a:t>Email</a:t>
             </a:r>
             <a:endParaRPr lang="en-SG" sz="1050" dirty="0"/>
@@ -6713,7 +7004,7 @@
           <a:p>
             <a:pPr algn="ctr"/>
             <a:r>
-              <a:rPr lang="en-US" sz="1050" dirty="0" smtClean="0"/>
+              <a:rPr lang="en-US" sz="1050" dirty="0"/>
               <a:t>Address</a:t>
             </a:r>
             <a:endParaRPr lang="en-SG" sz="1050" dirty="0"/>
@@ -6914,7 +7205,7 @@
           <a:p>
             <a:pPr algn="ctr"/>
             <a:r>
-              <a:rPr lang="en-US" sz="1050" dirty="0" smtClean="0"/>
+              <a:rPr lang="en-US" sz="1050" dirty="0"/>
               <a:t>Name</a:t>
             </a:r>
             <a:endParaRPr lang="en-SG" sz="1050" dirty="0"/>
@@ -7037,15 +7328,15 @@
           <a:p>
             <a:pPr algn="ctr"/>
             <a:r>
-              <a:rPr lang="en-US" sz="1050" dirty="0" smtClean="0"/>
+              <a:rPr lang="en-US" sz="1050" dirty="0"/>
               <a:t>+ </a:t>
             </a:r>
             <a:r>
-              <a:rPr lang="en-US" sz="1050" dirty="0" err="1" smtClean="0"/>
+              <a:rPr lang="en-US" sz="1050" dirty="0" err="1"/>
               <a:t>getPrintableString</a:t>
             </a:r>
             <a:r>
-              <a:rPr lang="en-US" sz="1050" dirty="0" smtClean="0"/>
+              <a:rPr lang="en-US" sz="1050" dirty="0"/>
               <a:t>(): String</a:t>
             </a:r>
             <a:endParaRPr lang="en-SG" sz="1050" dirty="0"/>
@@ -7133,14 +7424,14 @@
           <a:p>
             <a:pPr algn="ctr"/>
             <a:r>
-              <a:rPr lang="en-US" sz="1050" dirty="0" smtClean="0"/>
+              <a:rPr lang="en-US" sz="1050" dirty="0"/>
               <a:t>Unique</a:t>
             </a:r>
             <a:br>
-              <a:rPr lang="en-US" sz="1050" dirty="0" smtClean="0"/>
+              <a:rPr lang="en-US" sz="1050" dirty="0"/>
             </a:br>
             <a:r>
-              <a:rPr lang="en-US" sz="1050" dirty="0" err="1" smtClean="0"/>
+              <a:rPr lang="en-US" sz="1050" dirty="0" err="1"/>
               <a:t>TagList</a:t>
             </a:r>
             <a:endParaRPr lang="en-SG" sz="1050" dirty="0"/>
@@ -7184,14 +7475,14 @@
           <a:p>
             <a:pPr algn="ctr"/>
             <a:r>
-              <a:rPr lang="en-US" sz="1050" dirty="0" smtClean="0"/>
+              <a:rPr lang="en-US" sz="1050" dirty="0"/>
               <a:t>Unique</a:t>
             </a:r>
             <a:br>
-              <a:rPr lang="en-US" sz="1050" dirty="0" smtClean="0"/>
+              <a:rPr lang="en-US" sz="1050" dirty="0"/>
             </a:br>
             <a:r>
-              <a:rPr lang="en-US" sz="1050" dirty="0" err="1" smtClean="0"/>
+              <a:rPr lang="en-US" sz="1050" dirty="0" err="1"/>
               <a:t>PersonList</a:t>
             </a:r>
             <a:endParaRPr lang="en-SG" sz="1050" dirty="0"/>
@@ -7235,7 +7526,7 @@
           <a:p>
             <a:pPr algn="ctr"/>
             <a:r>
-              <a:rPr lang="en-US" sz="1050" dirty="0" smtClean="0"/>
+              <a:rPr lang="en-US" sz="1050" dirty="0"/>
               <a:t>Person</a:t>
             </a:r>
             <a:endParaRPr lang="en-SG" sz="1050" dirty="0"/>
@@ -7602,7 +7893,7 @@
           <a:p>
             <a:pPr algn="ctr"/>
             <a:r>
-              <a:rPr lang="en-US" sz="1050" dirty="0" smtClean="0"/>
+              <a:rPr lang="en-US" sz="1050" dirty="0"/>
               <a:t>Tagging</a:t>
             </a:r>
             <a:endParaRPr lang="en-SG" sz="1050" dirty="0"/>
@@ -7746,7 +8037,7 @@
           <a:lstStyle/>
           <a:p>
             <a:r>
-              <a:rPr lang="en-US" dirty="0" smtClean="0">
+              <a:rPr lang="en-US" dirty="0">
                 <a:solidFill>
                   <a:schemeClr val="accent6">
                     <a:lumMod val="75000"/>
@@ -7755,13 +8046,6 @@
               </a:rPr>
               <a:t>*</a:t>
             </a:r>
-            <a:endParaRPr lang="en-US" dirty="0">
-              <a:solidFill>
-                <a:schemeClr val="accent6">
-                  <a:lumMod val="75000"/>
-                </a:schemeClr>
-              </a:solidFill>
-            </a:endParaRPr>
           </a:p>
         </p:txBody>
       </p:sp>
@@ -7788,7 +8072,7 @@
           <a:lstStyle/>
           <a:p>
             <a:r>
-              <a:rPr lang="en-US" sz="1100" dirty="0" err="1" smtClean="0">
+              <a:rPr lang="en-US" sz="1100" dirty="0" err="1">
                 <a:solidFill>
                   <a:schemeClr val="accent6">
                     <a:lumMod val="75000"/>
@@ -7918,14 +8202,14 @@
           <a:p>
             <a:pPr algn="ctr"/>
             <a:r>
-              <a:rPr lang="en-US" sz="1050" dirty="0" smtClean="0"/>
+              <a:rPr lang="en-US" sz="1050" dirty="0"/>
               <a:t>Unique</a:t>
             </a:r>
             <a:br>
-              <a:rPr lang="en-US" sz="1050" dirty="0" smtClean="0"/>
+              <a:rPr lang="en-US" sz="1050" dirty="0"/>
             </a:br>
             <a:r>
-              <a:rPr lang="en-US" sz="1050" dirty="0" err="1" smtClean="0"/>
+              <a:rPr lang="en-US" sz="1050" dirty="0" err="1"/>
               <a:t>TagList</a:t>
             </a:r>
             <a:endParaRPr lang="en-SG" sz="1050" dirty="0"/>
@@ -7969,14 +8253,14 @@
           <a:p>
             <a:pPr algn="ctr"/>
             <a:r>
-              <a:rPr lang="en-US" sz="1050" dirty="0" smtClean="0"/>
+              <a:rPr lang="en-US" sz="1050" dirty="0"/>
               <a:t>Unique</a:t>
             </a:r>
             <a:br>
-              <a:rPr lang="en-US" sz="1050" dirty="0" smtClean="0"/>
+              <a:rPr lang="en-US" sz="1050" dirty="0"/>
             </a:br>
             <a:r>
-              <a:rPr lang="en-US" sz="1050" dirty="0" err="1" smtClean="0"/>
+              <a:rPr lang="en-US" sz="1050" dirty="0" err="1"/>
               <a:t>PersonList</a:t>
             </a:r>
             <a:endParaRPr lang="en-SG" sz="1050" dirty="0"/>
@@ -8020,7 +8304,7 @@
           <a:p>
             <a:pPr algn="ctr"/>
             <a:r>
-              <a:rPr lang="en-US" sz="1050" dirty="0" smtClean="0"/>
+              <a:rPr lang="en-US" sz="1050" dirty="0"/>
               <a:t>Person</a:t>
             </a:r>
             <a:endParaRPr lang="en-SG" sz="1050" dirty="0"/>
@@ -8387,7 +8671,7 @@
           <a:p>
             <a:pPr algn="ctr"/>
             <a:r>
-              <a:rPr lang="en-US" sz="1050" dirty="0" smtClean="0"/>
+              <a:rPr lang="en-US" sz="1050" dirty="0"/>
               <a:t>Tagging</a:t>
             </a:r>
             <a:endParaRPr lang="en-SG" sz="1050" dirty="0"/>
@@ -8493,7 +8777,7 @@
           <a:lstStyle/>
           <a:p>
             <a:r>
-              <a:rPr lang="en-US" dirty="0" smtClean="0">
+              <a:rPr lang="en-US" dirty="0">
                 <a:solidFill>
                   <a:schemeClr val="accent6">
                     <a:lumMod val="75000"/>
@@ -8502,13 +8786,6 @@
               </a:rPr>
               <a:t>*</a:t>
             </a:r>
-            <a:endParaRPr lang="en-US" dirty="0">
-              <a:solidFill>
-                <a:schemeClr val="accent6">
-                  <a:lumMod val="75000"/>
-                </a:schemeClr>
-              </a:solidFill>
-            </a:endParaRPr>
           </a:p>
         </p:txBody>
       </p:sp>
@@ -8617,7 +8894,7 @@
           <a:lstStyle/>
           <a:p>
             <a:r>
-              <a:rPr lang="en-US" sz="1100" dirty="0" err="1" smtClean="0">
+              <a:rPr lang="en-US" sz="1100" dirty="0" err="1">
                 <a:solidFill>
                   <a:schemeClr val="accent6">
                     <a:lumMod val="75000"/>

</xml_diff>

<commit_message>
* Added subclasses to Address
</commit_message>
<xml_diff>
--- a/doc/Diagrams.pptx
+++ b/doc/Diagrams.pptx
@@ -164,10 +164,9 @@
           <a:lstStyle/>
           <a:p>
             <a:r>
-              <a:rPr lang="en-US" smtClean="0"/>
+              <a:rPr lang="en-US"/>
               <a:t>Click to edit Master title style</a:t>
             </a:r>
-            <a:endParaRPr lang="en-US"/>
           </a:p>
         </p:txBody>
       </p:sp>
@@ -283,10 +282,9 @@
           </a:lstStyle>
           <a:p>
             <a:r>
-              <a:rPr lang="en-US" smtClean="0"/>
+              <a:rPr lang="en-US"/>
               <a:t>Click to edit Master subtitle style</a:t>
             </a:r>
-            <a:endParaRPr lang="en-US"/>
           </a:p>
         </p:txBody>
       </p:sp>
@@ -307,7 +305,7 @@
           <a:p>
             <a:fld id="{78C97017-6FC3-485B-9764-EAC9E56C1D49}" type="datetimeFigureOut">
               <a:rPr lang="en-US" smtClean="0"/>
-              <a:t>8/31/2017</a:t>
+              <a:t>2/7/2018</a:t>
             </a:fld>
             <a:endParaRPr lang="en-US"/>
           </a:p>
@@ -401,10 +399,9 @@
           <a:lstStyle/>
           <a:p>
             <a:r>
-              <a:rPr lang="en-US" smtClean="0"/>
+              <a:rPr lang="en-US"/>
               <a:t>Click to edit Master title style</a:t>
             </a:r>
-            <a:endParaRPr lang="en-US"/>
           </a:p>
         </p:txBody>
       </p:sp>
@@ -425,38 +422,37 @@
           <a:p>
             <a:pPr lvl="0"/>
             <a:r>
-              <a:rPr lang="en-US" smtClean="0"/>
+              <a:rPr lang="en-US"/>
               <a:t>Click to edit Master text styles</a:t>
             </a:r>
           </a:p>
           <a:p>
             <a:pPr lvl="1"/>
             <a:r>
-              <a:rPr lang="en-US" smtClean="0"/>
+              <a:rPr lang="en-US"/>
               <a:t>Second level</a:t>
             </a:r>
           </a:p>
           <a:p>
             <a:pPr lvl="2"/>
             <a:r>
-              <a:rPr lang="en-US" smtClean="0"/>
+              <a:rPr lang="en-US"/>
               <a:t>Third level</a:t>
             </a:r>
           </a:p>
           <a:p>
             <a:pPr lvl="3"/>
             <a:r>
-              <a:rPr lang="en-US" smtClean="0"/>
+              <a:rPr lang="en-US"/>
               <a:t>Fourth level</a:t>
             </a:r>
           </a:p>
           <a:p>
             <a:pPr lvl="4"/>
             <a:r>
-              <a:rPr lang="en-US" smtClean="0"/>
+              <a:rPr lang="en-US"/>
               <a:t>Fifth level</a:t>
             </a:r>
-            <a:endParaRPr lang="en-US"/>
           </a:p>
         </p:txBody>
       </p:sp>
@@ -477,7 +473,7 @@
           <a:p>
             <a:fld id="{78C97017-6FC3-485B-9764-EAC9E56C1D49}" type="datetimeFigureOut">
               <a:rPr lang="en-US" smtClean="0"/>
-              <a:t>8/31/2017</a:t>
+              <a:t>2/7/2018</a:t>
             </a:fld>
             <a:endParaRPr lang="en-US"/>
           </a:p>
@@ -576,10 +572,9 @@
           <a:lstStyle/>
           <a:p>
             <a:r>
-              <a:rPr lang="en-US" smtClean="0"/>
+              <a:rPr lang="en-US"/>
               <a:t>Click to edit Master title style</a:t>
             </a:r>
-            <a:endParaRPr lang="en-US"/>
           </a:p>
         </p:txBody>
       </p:sp>
@@ -605,38 +600,37 @@
           <a:p>
             <a:pPr lvl="0"/>
             <a:r>
-              <a:rPr lang="en-US" smtClean="0"/>
+              <a:rPr lang="en-US"/>
               <a:t>Click to edit Master text styles</a:t>
             </a:r>
           </a:p>
           <a:p>
             <a:pPr lvl="1"/>
             <a:r>
-              <a:rPr lang="en-US" smtClean="0"/>
+              <a:rPr lang="en-US"/>
               <a:t>Second level</a:t>
             </a:r>
           </a:p>
           <a:p>
             <a:pPr lvl="2"/>
             <a:r>
-              <a:rPr lang="en-US" smtClean="0"/>
+              <a:rPr lang="en-US"/>
               <a:t>Third level</a:t>
             </a:r>
           </a:p>
           <a:p>
             <a:pPr lvl="3"/>
             <a:r>
-              <a:rPr lang="en-US" smtClean="0"/>
+              <a:rPr lang="en-US"/>
               <a:t>Fourth level</a:t>
             </a:r>
           </a:p>
           <a:p>
             <a:pPr lvl="4"/>
             <a:r>
-              <a:rPr lang="en-US" smtClean="0"/>
+              <a:rPr lang="en-US"/>
               <a:t>Fifth level</a:t>
             </a:r>
-            <a:endParaRPr lang="en-US"/>
           </a:p>
         </p:txBody>
       </p:sp>
@@ -657,7 +651,7 @@
           <a:p>
             <a:fld id="{78C97017-6FC3-485B-9764-EAC9E56C1D49}" type="datetimeFigureOut">
               <a:rPr lang="en-US" smtClean="0"/>
-              <a:t>8/31/2017</a:t>
+              <a:t>2/7/2018</a:t>
             </a:fld>
             <a:endParaRPr lang="en-US"/>
           </a:p>
@@ -751,10 +745,9 @@
           <a:lstStyle/>
           <a:p>
             <a:r>
-              <a:rPr lang="en-US" smtClean="0"/>
+              <a:rPr lang="en-US"/>
               <a:t>Click to edit Master title style</a:t>
             </a:r>
-            <a:endParaRPr lang="en-US"/>
           </a:p>
         </p:txBody>
       </p:sp>
@@ -775,38 +768,37 @@
           <a:p>
             <a:pPr lvl="0"/>
             <a:r>
-              <a:rPr lang="en-US" smtClean="0"/>
+              <a:rPr lang="en-US"/>
               <a:t>Click to edit Master text styles</a:t>
             </a:r>
           </a:p>
           <a:p>
             <a:pPr lvl="1"/>
             <a:r>
-              <a:rPr lang="en-US" smtClean="0"/>
+              <a:rPr lang="en-US"/>
               <a:t>Second level</a:t>
             </a:r>
           </a:p>
           <a:p>
             <a:pPr lvl="2"/>
             <a:r>
-              <a:rPr lang="en-US" smtClean="0"/>
+              <a:rPr lang="en-US"/>
               <a:t>Third level</a:t>
             </a:r>
           </a:p>
           <a:p>
             <a:pPr lvl="3"/>
             <a:r>
-              <a:rPr lang="en-US" smtClean="0"/>
+              <a:rPr lang="en-US"/>
               <a:t>Fourth level</a:t>
             </a:r>
           </a:p>
           <a:p>
             <a:pPr lvl="4"/>
             <a:r>
-              <a:rPr lang="en-US" smtClean="0"/>
+              <a:rPr lang="en-US"/>
               <a:t>Fifth level</a:t>
             </a:r>
-            <a:endParaRPr lang="en-US"/>
           </a:p>
         </p:txBody>
       </p:sp>
@@ -827,7 +819,7 @@
           <a:p>
             <a:fld id="{78C97017-6FC3-485B-9764-EAC9E56C1D49}" type="datetimeFigureOut">
               <a:rPr lang="en-US" smtClean="0"/>
-              <a:t>8/31/2017</a:t>
+              <a:t>2/7/2018</a:t>
             </a:fld>
             <a:endParaRPr lang="en-US"/>
           </a:p>
@@ -930,10 +922,9 @@
           </a:lstStyle>
           <a:p>
             <a:r>
-              <a:rPr lang="en-US" smtClean="0"/>
+              <a:rPr lang="en-US"/>
               <a:t>Click to edit Master title style</a:t>
             </a:r>
-            <a:endParaRPr lang="en-US"/>
           </a:p>
         </p:txBody>
       </p:sp>
@@ -1050,7 +1041,7 @@
           <a:p>
             <a:pPr lvl="0"/>
             <a:r>
-              <a:rPr lang="en-US" smtClean="0"/>
+              <a:rPr lang="en-US"/>
               <a:t>Click to edit Master text styles</a:t>
             </a:r>
           </a:p>
@@ -1073,7 +1064,7 @@
           <a:p>
             <a:fld id="{78C97017-6FC3-485B-9764-EAC9E56C1D49}" type="datetimeFigureOut">
               <a:rPr lang="en-US" smtClean="0"/>
-              <a:t>8/31/2017</a:t>
+              <a:t>2/7/2018</a:t>
             </a:fld>
             <a:endParaRPr lang="en-US"/>
           </a:p>
@@ -1167,10 +1158,9 @@
           <a:lstStyle/>
           <a:p>
             <a:r>
-              <a:rPr lang="en-US" smtClean="0"/>
+              <a:rPr lang="en-US"/>
               <a:t>Click to edit Master title style</a:t>
             </a:r>
-            <a:endParaRPr lang="en-US"/>
           </a:p>
         </p:txBody>
       </p:sp>
@@ -1224,38 +1214,37 @@
           <a:p>
             <a:pPr lvl="0"/>
             <a:r>
-              <a:rPr lang="en-US" smtClean="0"/>
+              <a:rPr lang="en-US"/>
               <a:t>Click to edit Master text styles</a:t>
             </a:r>
           </a:p>
           <a:p>
             <a:pPr lvl="1"/>
             <a:r>
-              <a:rPr lang="en-US" smtClean="0"/>
+              <a:rPr lang="en-US"/>
               <a:t>Second level</a:t>
             </a:r>
           </a:p>
           <a:p>
             <a:pPr lvl="2"/>
             <a:r>
-              <a:rPr lang="en-US" smtClean="0"/>
+              <a:rPr lang="en-US"/>
               <a:t>Third level</a:t>
             </a:r>
           </a:p>
           <a:p>
             <a:pPr lvl="3"/>
             <a:r>
-              <a:rPr lang="en-US" smtClean="0"/>
+              <a:rPr lang="en-US"/>
               <a:t>Fourth level</a:t>
             </a:r>
           </a:p>
           <a:p>
             <a:pPr lvl="4"/>
             <a:r>
-              <a:rPr lang="en-US" smtClean="0"/>
+              <a:rPr lang="en-US"/>
               <a:t>Fifth level</a:t>
             </a:r>
-            <a:endParaRPr lang="en-US"/>
           </a:p>
         </p:txBody>
       </p:sp>
@@ -1309,38 +1298,37 @@
           <a:p>
             <a:pPr lvl="0"/>
             <a:r>
-              <a:rPr lang="en-US" smtClean="0"/>
+              <a:rPr lang="en-US"/>
               <a:t>Click to edit Master text styles</a:t>
             </a:r>
           </a:p>
           <a:p>
             <a:pPr lvl="1"/>
             <a:r>
-              <a:rPr lang="en-US" smtClean="0"/>
+              <a:rPr lang="en-US"/>
               <a:t>Second level</a:t>
             </a:r>
           </a:p>
           <a:p>
             <a:pPr lvl="2"/>
             <a:r>
-              <a:rPr lang="en-US" smtClean="0"/>
+              <a:rPr lang="en-US"/>
               <a:t>Third level</a:t>
             </a:r>
           </a:p>
           <a:p>
             <a:pPr lvl="3"/>
             <a:r>
-              <a:rPr lang="en-US" smtClean="0"/>
+              <a:rPr lang="en-US"/>
               <a:t>Fourth level</a:t>
             </a:r>
           </a:p>
           <a:p>
             <a:pPr lvl="4"/>
             <a:r>
-              <a:rPr lang="en-US" smtClean="0"/>
+              <a:rPr lang="en-US"/>
               <a:t>Fifth level</a:t>
             </a:r>
-            <a:endParaRPr lang="en-US"/>
           </a:p>
         </p:txBody>
       </p:sp>
@@ -1361,7 +1349,7 @@
           <a:p>
             <a:fld id="{78C97017-6FC3-485B-9764-EAC9E56C1D49}" type="datetimeFigureOut">
               <a:rPr lang="en-US" smtClean="0"/>
-              <a:t>8/31/2017</a:t>
+              <a:t>2/7/2018</a:t>
             </a:fld>
             <a:endParaRPr lang="en-US"/>
           </a:p>
@@ -1459,10 +1447,9 @@
           </a:lstStyle>
           <a:p>
             <a:r>
-              <a:rPr lang="en-US" smtClean="0"/>
+              <a:rPr lang="en-US"/>
               <a:t>Click to edit Master title style</a:t>
             </a:r>
-            <a:endParaRPr lang="en-US"/>
           </a:p>
         </p:txBody>
       </p:sp>
@@ -1525,7 +1512,7 @@
           <a:p>
             <a:pPr lvl="0"/>
             <a:r>
-              <a:rPr lang="en-US" smtClean="0"/>
+              <a:rPr lang="en-US"/>
               <a:t>Click to edit Master text styles</a:t>
             </a:r>
           </a:p>
@@ -1581,38 +1568,37 @@
           <a:p>
             <a:pPr lvl="0"/>
             <a:r>
-              <a:rPr lang="en-US" smtClean="0"/>
+              <a:rPr lang="en-US"/>
               <a:t>Click to edit Master text styles</a:t>
             </a:r>
           </a:p>
           <a:p>
             <a:pPr lvl="1"/>
             <a:r>
-              <a:rPr lang="en-US" smtClean="0"/>
+              <a:rPr lang="en-US"/>
               <a:t>Second level</a:t>
             </a:r>
           </a:p>
           <a:p>
             <a:pPr lvl="2"/>
             <a:r>
-              <a:rPr lang="en-US" smtClean="0"/>
+              <a:rPr lang="en-US"/>
               <a:t>Third level</a:t>
             </a:r>
           </a:p>
           <a:p>
             <a:pPr lvl="3"/>
             <a:r>
-              <a:rPr lang="en-US" smtClean="0"/>
+              <a:rPr lang="en-US"/>
               <a:t>Fourth level</a:t>
             </a:r>
           </a:p>
           <a:p>
             <a:pPr lvl="4"/>
             <a:r>
-              <a:rPr lang="en-US" smtClean="0"/>
+              <a:rPr lang="en-US"/>
               <a:t>Fifth level</a:t>
             </a:r>
-            <a:endParaRPr lang="en-US"/>
           </a:p>
         </p:txBody>
       </p:sp>
@@ -1675,7 +1661,7 @@
           <a:p>
             <a:pPr lvl="0"/>
             <a:r>
-              <a:rPr lang="en-US" smtClean="0"/>
+              <a:rPr lang="en-US"/>
               <a:t>Click to edit Master text styles</a:t>
             </a:r>
           </a:p>
@@ -1731,38 +1717,37 @@
           <a:p>
             <a:pPr lvl="0"/>
             <a:r>
-              <a:rPr lang="en-US" smtClean="0"/>
+              <a:rPr lang="en-US"/>
               <a:t>Click to edit Master text styles</a:t>
             </a:r>
           </a:p>
           <a:p>
             <a:pPr lvl="1"/>
             <a:r>
-              <a:rPr lang="en-US" smtClean="0"/>
+              <a:rPr lang="en-US"/>
               <a:t>Second level</a:t>
             </a:r>
           </a:p>
           <a:p>
             <a:pPr lvl="2"/>
             <a:r>
-              <a:rPr lang="en-US" smtClean="0"/>
+              <a:rPr lang="en-US"/>
               <a:t>Third level</a:t>
             </a:r>
           </a:p>
           <a:p>
             <a:pPr lvl="3"/>
             <a:r>
-              <a:rPr lang="en-US" smtClean="0"/>
+              <a:rPr lang="en-US"/>
               <a:t>Fourth level</a:t>
             </a:r>
           </a:p>
           <a:p>
             <a:pPr lvl="4"/>
             <a:r>
-              <a:rPr lang="en-US" smtClean="0"/>
+              <a:rPr lang="en-US"/>
               <a:t>Fifth level</a:t>
             </a:r>
-            <a:endParaRPr lang="en-US"/>
           </a:p>
         </p:txBody>
       </p:sp>
@@ -1783,7 +1768,7 @@
           <a:p>
             <a:fld id="{78C97017-6FC3-485B-9764-EAC9E56C1D49}" type="datetimeFigureOut">
               <a:rPr lang="en-US" smtClean="0"/>
-              <a:t>8/31/2017</a:t>
+              <a:t>2/7/2018</a:t>
             </a:fld>
             <a:endParaRPr lang="en-US"/>
           </a:p>
@@ -1877,10 +1862,9 @@
           <a:lstStyle/>
           <a:p>
             <a:r>
-              <a:rPr lang="en-US" smtClean="0"/>
+              <a:rPr lang="en-US"/>
               <a:t>Click to edit Master title style</a:t>
             </a:r>
-            <a:endParaRPr lang="en-US"/>
           </a:p>
         </p:txBody>
       </p:sp>
@@ -1901,7 +1885,7 @@
           <a:p>
             <a:fld id="{78C97017-6FC3-485B-9764-EAC9E56C1D49}" type="datetimeFigureOut">
               <a:rPr lang="en-US" smtClean="0"/>
-              <a:t>8/31/2017</a:t>
+              <a:t>2/7/2018</a:t>
             </a:fld>
             <a:endParaRPr lang="en-US"/>
           </a:p>
@@ -1996,7 +1980,7 @@
           <a:p>
             <a:fld id="{78C97017-6FC3-485B-9764-EAC9E56C1D49}" type="datetimeFigureOut">
               <a:rPr lang="en-US" smtClean="0"/>
-              <a:t>8/31/2017</a:t>
+              <a:t>2/7/2018</a:t>
             </a:fld>
             <a:endParaRPr lang="en-US"/>
           </a:p>
@@ -2099,10 +2083,9 @@
           </a:lstStyle>
           <a:p>
             <a:r>
-              <a:rPr lang="en-US" smtClean="0"/>
+              <a:rPr lang="en-US"/>
               <a:t>Click to edit Master title style</a:t>
             </a:r>
-            <a:endParaRPr lang="en-US"/>
           </a:p>
         </p:txBody>
       </p:sp>
@@ -2156,38 +2139,37 @@
           <a:p>
             <a:pPr lvl="0"/>
             <a:r>
-              <a:rPr lang="en-US" smtClean="0"/>
+              <a:rPr lang="en-US"/>
               <a:t>Click to edit Master text styles</a:t>
             </a:r>
           </a:p>
           <a:p>
             <a:pPr lvl="1"/>
             <a:r>
-              <a:rPr lang="en-US" smtClean="0"/>
+              <a:rPr lang="en-US"/>
               <a:t>Second level</a:t>
             </a:r>
           </a:p>
           <a:p>
             <a:pPr lvl="2"/>
             <a:r>
-              <a:rPr lang="en-US" smtClean="0"/>
+              <a:rPr lang="en-US"/>
               <a:t>Third level</a:t>
             </a:r>
           </a:p>
           <a:p>
             <a:pPr lvl="3"/>
             <a:r>
-              <a:rPr lang="en-US" smtClean="0"/>
+              <a:rPr lang="en-US"/>
               <a:t>Fourth level</a:t>
             </a:r>
           </a:p>
           <a:p>
             <a:pPr lvl="4"/>
             <a:r>
-              <a:rPr lang="en-US" smtClean="0"/>
+              <a:rPr lang="en-US"/>
               <a:t>Fifth level</a:t>
             </a:r>
-            <a:endParaRPr lang="en-US"/>
           </a:p>
         </p:txBody>
       </p:sp>
@@ -2250,7 +2232,7 @@
           <a:p>
             <a:pPr lvl="0"/>
             <a:r>
-              <a:rPr lang="en-US" smtClean="0"/>
+              <a:rPr lang="en-US"/>
               <a:t>Click to edit Master text styles</a:t>
             </a:r>
           </a:p>
@@ -2273,7 +2255,7 @@
           <a:p>
             <a:fld id="{78C97017-6FC3-485B-9764-EAC9E56C1D49}" type="datetimeFigureOut">
               <a:rPr lang="en-US" smtClean="0"/>
-              <a:t>8/31/2017</a:t>
+              <a:t>2/7/2018</a:t>
             </a:fld>
             <a:endParaRPr lang="en-US"/>
           </a:p>
@@ -2376,10 +2358,9 @@
           </a:lstStyle>
           <a:p>
             <a:r>
-              <a:rPr lang="en-US" smtClean="0"/>
+              <a:rPr lang="en-US"/>
               <a:t>Click to edit Master title style</a:t>
             </a:r>
-            <a:endParaRPr lang="en-US"/>
           </a:p>
         </p:txBody>
       </p:sp>
@@ -2503,7 +2484,7 @@
           <a:p>
             <a:pPr lvl="0"/>
             <a:r>
-              <a:rPr lang="en-US" smtClean="0"/>
+              <a:rPr lang="en-US"/>
               <a:t>Click to edit Master text styles</a:t>
             </a:r>
           </a:p>
@@ -2526,7 +2507,7 @@
           <a:p>
             <a:fld id="{78C97017-6FC3-485B-9764-EAC9E56C1D49}" type="datetimeFigureOut">
               <a:rPr lang="en-US" smtClean="0"/>
-              <a:t>8/31/2017</a:t>
+              <a:t>2/7/2018</a:t>
             </a:fld>
             <a:endParaRPr lang="en-US"/>
           </a:p>
@@ -2635,10 +2616,9 @@
           <a:lstStyle/>
           <a:p>
             <a:r>
-              <a:rPr lang="en-US" smtClean="0"/>
+              <a:rPr lang="en-US"/>
               <a:t>Click to edit Master title style</a:t>
             </a:r>
-            <a:endParaRPr lang="en-US"/>
           </a:p>
         </p:txBody>
       </p:sp>
@@ -2669,38 +2649,37 @@
           <a:p>
             <a:pPr lvl="0"/>
             <a:r>
-              <a:rPr lang="en-US" smtClean="0"/>
+              <a:rPr lang="en-US"/>
               <a:t>Click to edit Master text styles</a:t>
             </a:r>
           </a:p>
           <a:p>
             <a:pPr lvl="1"/>
             <a:r>
-              <a:rPr lang="en-US" smtClean="0"/>
+              <a:rPr lang="en-US"/>
               <a:t>Second level</a:t>
             </a:r>
           </a:p>
           <a:p>
             <a:pPr lvl="2"/>
             <a:r>
-              <a:rPr lang="en-US" smtClean="0"/>
+              <a:rPr lang="en-US"/>
               <a:t>Third level</a:t>
             </a:r>
           </a:p>
           <a:p>
             <a:pPr lvl="3"/>
             <a:r>
-              <a:rPr lang="en-US" smtClean="0"/>
+              <a:rPr lang="en-US"/>
               <a:t>Fourth level</a:t>
             </a:r>
           </a:p>
           <a:p>
             <a:pPr lvl="4"/>
             <a:r>
-              <a:rPr lang="en-US" smtClean="0"/>
+              <a:rPr lang="en-US"/>
               <a:t>Fifth level</a:t>
             </a:r>
-            <a:endParaRPr lang="en-US"/>
           </a:p>
         </p:txBody>
       </p:sp>
@@ -2739,7 +2718,7 @@
           <a:p>
             <a:fld id="{78C97017-6FC3-485B-9764-EAC9E56C1D49}" type="datetimeFigureOut">
               <a:rPr lang="en-US" smtClean="0"/>
-              <a:t>8/31/2017</a:t>
+              <a:t>2/7/2018</a:t>
             </a:fld>
             <a:endParaRPr lang="en-US"/>
           </a:p>
@@ -3130,14 +3109,13 @@
           <a:lstStyle/>
           <a:p>
             <a:r>
-              <a:rPr lang="en-US" dirty="0" err="1" smtClean="0"/>
+              <a:rPr lang="en-US" dirty="0" err="1"/>
               <a:t>AddressBook</a:t>
             </a:r>
             <a:r>
-              <a:rPr lang="en-US" dirty="0" smtClean="0"/>
+              <a:rPr lang="en-US" dirty="0"/>
               <a:t> – Level 2</a:t>
             </a:r>
-            <a:endParaRPr lang="en-US" dirty="0"/>
           </a:p>
         </p:txBody>
       </p:sp>
@@ -3157,10 +3135,9 @@
           <a:lstStyle/>
           <a:p>
             <a:r>
-              <a:rPr lang="en-US" dirty="0" smtClean="0"/>
+              <a:rPr lang="en-US" dirty="0"/>
               <a:t>Diagrams</a:t>
             </a:r>
-            <a:endParaRPr lang="en-US" dirty="0"/>
           </a:p>
         </p:txBody>
       </p:sp>
@@ -3231,7 +3208,7 @@
           <a:p>
             <a:pPr algn="ctr"/>
             <a:r>
-              <a:rPr lang="en-US" sz="1050" dirty="0" err="1" smtClean="0"/>
+              <a:rPr lang="en-US" sz="1050" dirty="0" err="1"/>
               <a:t>TextUi</a:t>
             </a:r>
             <a:endParaRPr lang="en-SG" sz="1050" dirty="0"/>
@@ -3282,7 +3259,7 @@
           <a:p>
             <a:pPr algn="ctr"/>
             <a:r>
-              <a:rPr lang="en-US" sz="1050" dirty="0" smtClean="0">
+              <a:rPr lang="en-US" sz="1050" dirty="0">
                 <a:solidFill>
                   <a:schemeClr val="bg1"/>
                 </a:solidFill>
@@ -3378,7 +3355,7 @@
           <a:p>
             <a:pPr algn="ctr"/>
             <a:r>
-              <a:rPr lang="en-US" sz="1050" dirty="0" smtClean="0"/>
+              <a:rPr lang="en-US" sz="1050" dirty="0"/>
               <a:t>Parser</a:t>
             </a:r>
             <a:endParaRPr lang="en-SG" sz="1050" dirty="0"/>
@@ -3422,14 +3399,14 @@
           <a:p>
             <a:pPr algn="ctr"/>
             <a:r>
-              <a:rPr lang="en-US" sz="1050" dirty="0" smtClean="0"/>
+              <a:rPr lang="en-US" sz="1050" dirty="0"/>
               <a:t>Unique</a:t>
             </a:r>
             <a:br>
-              <a:rPr lang="en-US" sz="1050" dirty="0" smtClean="0"/>
+              <a:rPr lang="en-US" sz="1050" dirty="0"/>
             </a:br>
             <a:r>
-              <a:rPr lang="en-US" sz="1050" dirty="0" err="1" smtClean="0"/>
+              <a:rPr lang="en-US" sz="1050" dirty="0" err="1"/>
               <a:t>TagList</a:t>
             </a:r>
             <a:endParaRPr lang="en-SG" sz="1050" dirty="0"/>
@@ -3473,14 +3450,14 @@
           <a:p>
             <a:pPr algn="ctr"/>
             <a:r>
-              <a:rPr lang="en-US" sz="1050" dirty="0" smtClean="0"/>
+              <a:rPr lang="en-US" sz="1050" dirty="0"/>
               <a:t>Unique</a:t>
             </a:r>
             <a:br>
-              <a:rPr lang="en-US" sz="1050" dirty="0" smtClean="0"/>
+              <a:rPr lang="en-US" sz="1050" dirty="0"/>
             </a:br>
             <a:r>
-              <a:rPr lang="en-US" sz="1050" dirty="0" err="1" smtClean="0"/>
+              <a:rPr lang="en-US" sz="1050" dirty="0" err="1"/>
               <a:t>PersonList</a:t>
             </a:r>
             <a:endParaRPr lang="en-SG" sz="1050" dirty="0"/>
@@ -3524,7 +3501,7 @@
           <a:p>
             <a:pPr algn="ctr"/>
             <a:r>
-              <a:rPr lang="en-US" sz="1050" dirty="0" smtClean="0"/>
+              <a:rPr lang="en-US" sz="1050" dirty="0"/>
               <a:t>Person</a:t>
             </a:r>
             <a:endParaRPr lang="en-SG" sz="1050" dirty="0"/>
@@ -3568,7 +3545,7 @@
           <a:p>
             <a:pPr algn="ctr"/>
             <a:r>
-              <a:rPr lang="en-US" sz="1050" dirty="0" smtClean="0"/>
+              <a:rPr lang="en-US" sz="1050" dirty="0"/>
               <a:t>Phone</a:t>
             </a:r>
             <a:endParaRPr lang="en-SG" sz="1050" dirty="0"/>
@@ -3612,7 +3589,7 @@
           <a:p>
             <a:pPr algn="ctr"/>
             <a:r>
-              <a:rPr lang="en-US" sz="1050" dirty="0" smtClean="0"/>
+              <a:rPr lang="en-US" sz="1050" dirty="0"/>
               <a:t>Email</a:t>
             </a:r>
             <a:endParaRPr lang="en-SG" sz="1050" dirty="0"/>
@@ -3656,7 +3633,7 @@
           <a:p>
             <a:pPr algn="ctr"/>
             <a:r>
-              <a:rPr lang="en-US" sz="1050" dirty="0" smtClean="0"/>
+              <a:rPr lang="en-US" sz="1050" dirty="0"/>
               <a:t>Address</a:t>
             </a:r>
             <a:endParaRPr lang="en-SG" sz="1050" dirty="0"/>
@@ -3700,7 +3677,7 @@
           <a:p>
             <a:pPr algn="ctr"/>
             <a:r>
-              <a:rPr lang="en-US" sz="1050" dirty="0" err="1" smtClean="0"/>
+              <a:rPr lang="en-US" sz="1050" dirty="0" err="1"/>
               <a:t>StorageFile</a:t>
             </a:r>
             <a:endParaRPr lang="en-SG" sz="1050" dirty="0"/>
@@ -4435,14 +4412,14 @@
           <a:p>
             <a:pPr algn="ctr"/>
             <a:r>
-              <a:rPr lang="en-US" sz="1050" dirty="0" smtClean="0"/>
+              <a:rPr lang="en-US" sz="1050" dirty="0"/>
               <a:t>&lt;&lt;interface&gt;&gt;</a:t>
             </a:r>
           </a:p>
           <a:p>
             <a:pPr algn="ctr"/>
             <a:r>
-              <a:rPr lang="en-US" sz="1050" dirty="0" err="1" smtClean="0"/>
+              <a:rPr lang="en-US" sz="1050" dirty="0" err="1"/>
               <a:t>ReadOnlyPerson</a:t>
             </a:r>
             <a:endParaRPr lang="en-SG" sz="1050" dirty="0"/>
@@ -4609,7 +4586,7 @@
           <a:p>
             <a:pPr algn="ctr"/>
             <a:r>
-              <a:rPr lang="en-US" sz="1050" dirty="0" smtClean="0"/>
+              <a:rPr lang="en-US" sz="1050" dirty="0"/>
               <a:t>Command</a:t>
             </a:r>
             <a:endParaRPr lang="en-SG" sz="1050" dirty="0"/>
@@ -4939,7 +4916,7 @@
           <a:p>
             <a:pPr algn="ctr"/>
             <a:r>
-              <a:rPr lang="en-US" sz="1050" dirty="0" smtClean="0"/>
+              <a:rPr lang="en-US" sz="1050" dirty="0"/>
               <a:t>…Command</a:t>
             </a:r>
             <a:endParaRPr lang="en-SG" sz="1050" dirty="0"/>
@@ -5353,7 +5330,7 @@
           <a:p>
             <a:pPr algn="ctr"/>
             <a:r>
-              <a:rPr lang="en-US" sz="1050" dirty="0" smtClean="0"/>
+              <a:rPr lang="en-US" sz="1050" dirty="0"/>
               <a:t>Messages</a:t>
             </a:r>
             <a:endParaRPr lang="en-SG" sz="1050" dirty="0"/>
@@ -5397,7 +5374,7 @@
           <a:p>
             <a:pPr algn="ctr"/>
             <a:r>
-              <a:rPr lang="en-US" sz="1050" dirty="0" err="1" smtClean="0"/>
+              <a:rPr lang="en-US" sz="1050" dirty="0" err="1"/>
               <a:t>Utils</a:t>
             </a:r>
             <a:endParaRPr lang="en-SG" sz="1050" dirty="0"/>
@@ -5485,7 +5462,7 @@
           <a:p>
             <a:pPr algn="ctr"/>
             <a:r>
-              <a:rPr lang="en-US" sz="1050" dirty="0" smtClean="0"/>
+              <a:rPr lang="en-US" sz="1050" dirty="0"/>
               <a:t>Adapted…</a:t>
             </a:r>
             <a:endParaRPr lang="en-SG" sz="1050" dirty="0"/>
@@ -5767,6 +5744,413 @@
           </a:effectRef>
           <a:fontRef idx="minor">
             <a:schemeClr val="dk1"/>
+          </a:fontRef>
+        </p:style>
+      </p:cxnSp>
+      <p:sp>
+        <p:nvSpPr>
+          <p:cNvPr id="2" name="Flowchart: Decision 1">
+            <a:extLst>
+              <a:ext uri="{FF2B5EF4-FFF2-40B4-BE49-F238E27FC236}">
+                <a16:creationId xmlns:a16="http://schemas.microsoft.com/office/drawing/2014/main" id="{20683D89-6E67-42AC-9957-81B035E12FDD}"/>
+              </a:ext>
+            </a:extLst>
+          </p:cNvPr>
+          <p:cNvSpPr/>
+          <p:nvPr/>
+        </p:nvSpPr>
+        <p:spPr>
+          <a:xfrm>
+            <a:off x="7725750" y="5019700"/>
+            <a:ext cx="291074" cy="195020"/>
+          </a:xfrm>
+          <a:prstGeom prst="flowChartDecision">
+            <a:avLst/>
+          </a:prstGeom>
+        </p:spPr>
+        <p:style>
+          <a:lnRef idx="1">
+            <a:schemeClr val="accent4"/>
+          </a:lnRef>
+          <a:fillRef idx="2">
+            <a:schemeClr val="accent4"/>
+          </a:fillRef>
+          <a:effectRef idx="1">
+            <a:schemeClr val="accent4"/>
+          </a:effectRef>
+          <a:fontRef idx="minor">
+            <a:schemeClr val="dk1"/>
+          </a:fontRef>
+        </p:style>
+        <p:txBody>
+          <a:bodyPr rtlCol="0" anchor="ctr"/>
+          <a:lstStyle/>
+          <a:p>
+            <a:pPr algn="ctr"/>
+            <a:endParaRPr lang="en-SG"/>
+          </a:p>
+        </p:txBody>
+      </p:sp>
+      <p:cxnSp>
+        <p:nvCxnSpPr>
+          <p:cNvPr id="4" name="Connector: Elbow 3">
+            <a:extLst>
+              <a:ext uri="{FF2B5EF4-FFF2-40B4-BE49-F238E27FC236}">
+                <a16:creationId xmlns:a16="http://schemas.microsoft.com/office/drawing/2014/main" id="{97C29D31-31B1-45BA-8FDD-C27A0A0A8686}"/>
+              </a:ext>
+            </a:extLst>
+          </p:cNvPr>
+          <p:cNvCxnSpPr>
+            <a:stCxn id="2" idx="3"/>
+          </p:cNvCxnSpPr>
+          <p:nvPr/>
+        </p:nvCxnSpPr>
+        <p:spPr>
+          <a:xfrm>
+            <a:off x="8016824" y="5117210"/>
+            <a:ext cx="504992" cy="866648"/>
+          </a:xfrm>
+          <a:prstGeom prst="bentConnector2">
+            <a:avLst/>
+          </a:prstGeom>
+          <a:ln>
+            <a:tailEnd type="triangle"/>
+          </a:ln>
+        </p:spPr>
+        <p:style>
+          <a:lnRef idx="1">
+            <a:schemeClr val="accent4"/>
+          </a:lnRef>
+          <a:fillRef idx="0">
+            <a:schemeClr val="accent4"/>
+          </a:fillRef>
+          <a:effectRef idx="0">
+            <a:schemeClr val="accent4"/>
+          </a:effectRef>
+          <a:fontRef idx="minor">
+            <a:schemeClr val="tx1"/>
+          </a:fontRef>
+        </p:style>
+      </p:cxnSp>
+      <p:sp>
+        <p:nvSpPr>
+          <p:cNvPr id="66" name="Rectangle 65">
+            <a:extLst>
+              <a:ext uri="{FF2B5EF4-FFF2-40B4-BE49-F238E27FC236}">
+                <a16:creationId xmlns:a16="http://schemas.microsoft.com/office/drawing/2014/main" id="{923277F0-A62F-446F-BF55-C65A570FC32A}"/>
+              </a:ext>
+            </a:extLst>
+          </p:cNvPr>
+          <p:cNvSpPr/>
+          <p:nvPr/>
+        </p:nvSpPr>
+        <p:spPr>
+          <a:xfrm>
+            <a:off x="8056237" y="5983858"/>
+            <a:ext cx="929296" cy="346760"/>
+          </a:xfrm>
+          <a:prstGeom prst="rect">
+            <a:avLst/>
+          </a:prstGeom>
+          <a:ln/>
+        </p:spPr>
+        <p:style>
+          <a:lnRef idx="1">
+            <a:schemeClr val="accent3"/>
+          </a:lnRef>
+          <a:fillRef idx="2">
+            <a:schemeClr val="accent3"/>
+          </a:fillRef>
+          <a:effectRef idx="1">
+            <a:schemeClr val="accent3"/>
+          </a:effectRef>
+          <a:fontRef idx="minor">
+            <a:schemeClr val="dk1"/>
+          </a:fontRef>
+        </p:style>
+        <p:txBody>
+          <a:bodyPr rtlCol="0" anchor="ctr"/>
+          <a:lstStyle/>
+          <a:p>
+            <a:pPr algn="ctr"/>
+            <a:r>
+              <a:rPr lang="en-US" sz="1050" dirty="0"/>
+              <a:t>Block</a:t>
+            </a:r>
+            <a:endParaRPr lang="en-SG" sz="1050" dirty="0"/>
+          </a:p>
+        </p:txBody>
+      </p:sp>
+      <p:sp>
+        <p:nvSpPr>
+          <p:cNvPr id="75" name="Rectangle 74">
+            <a:extLst>
+              <a:ext uri="{FF2B5EF4-FFF2-40B4-BE49-F238E27FC236}">
+                <a16:creationId xmlns:a16="http://schemas.microsoft.com/office/drawing/2014/main" id="{1D38DC06-DB00-4535-9829-0DD225D8002C}"/>
+              </a:ext>
+            </a:extLst>
+          </p:cNvPr>
+          <p:cNvSpPr/>
+          <p:nvPr/>
+        </p:nvSpPr>
+        <p:spPr>
+          <a:xfrm>
+            <a:off x="6972435" y="5983858"/>
+            <a:ext cx="929296" cy="346760"/>
+          </a:xfrm>
+          <a:prstGeom prst="rect">
+            <a:avLst/>
+          </a:prstGeom>
+          <a:ln/>
+        </p:spPr>
+        <p:style>
+          <a:lnRef idx="1">
+            <a:schemeClr val="accent3"/>
+          </a:lnRef>
+          <a:fillRef idx="2">
+            <a:schemeClr val="accent3"/>
+          </a:fillRef>
+          <a:effectRef idx="1">
+            <a:schemeClr val="accent3"/>
+          </a:effectRef>
+          <a:fontRef idx="minor">
+            <a:schemeClr val="dk1"/>
+          </a:fontRef>
+        </p:style>
+        <p:txBody>
+          <a:bodyPr rtlCol="0" anchor="ctr"/>
+          <a:lstStyle/>
+          <a:p>
+            <a:pPr algn="ctr"/>
+            <a:r>
+              <a:rPr lang="en-US" sz="1050" dirty="0"/>
+              <a:t>Street</a:t>
+            </a:r>
+            <a:endParaRPr lang="en-SG" sz="1050" dirty="0"/>
+          </a:p>
+        </p:txBody>
+      </p:sp>
+      <p:sp>
+        <p:nvSpPr>
+          <p:cNvPr id="76" name="Rectangle 75">
+            <a:extLst>
+              <a:ext uri="{FF2B5EF4-FFF2-40B4-BE49-F238E27FC236}">
+                <a16:creationId xmlns:a16="http://schemas.microsoft.com/office/drawing/2014/main" id="{EBC1D47A-7FFB-4CF2-B1C4-02F9EDC1736F}"/>
+              </a:ext>
+            </a:extLst>
+          </p:cNvPr>
+          <p:cNvSpPr/>
+          <p:nvPr/>
+        </p:nvSpPr>
+        <p:spPr>
+          <a:xfrm>
+            <a:off x="5852504" y="5990996"/>
+            <a:ext cx="929296" cy="346760"/>
+          </a:xfrm>
+          <a:prstGeom prst="rect">
+            <a:avLst/>
+          </a:prstGeom>
+          <a:ln/>
+        </p:spPr>
+        <p:style>
+          <a:lnRef idx="1">
+            <a:schemeClr val="accent3"/>
+          </a:lnRef>
+          <a:fillRef idx="2">
+            <a:schemeClr val="accent3"/>
+          </a:fillRef>
+          <a:effectRef idx="1">
+            <a:schemeClr val="accent3"/>
+          </a:effectRef>
+          <a:fontRef idx="minor">
+            <a:schemeClr val="dk1"/>
+          </a:fontRef>
+        </p:style>
+        <p:txBody>
+          <a:bodyPr rtlCol="0" anchor="ctr"/>
+          <a:lstStyle/>
+          <a:p>
+            <a:pPr algn="ctr"/>
+            <a:r>
+              <a:rPr lang="en-US" sz="1050" dirty="0"/>
+              <a:t>Unit</a:t>
+            </a:r>
+            <a:endParaRPr lang="en-SG" sz="1050" dirty="0"/>
+          </a:p>
+        </p:txBody>
+      </p:sp>
+      <p:sp>
+        <p:nvSpPr>
+          <p:cNvPr id="77" name="Rectangle 76">
+            <a:extLst>
+              <a:ext uri="{FF2B5EF4-FFF2-40B4-BE49-F238E27FC236}">
+                <a16:creationId xmlns:a16="http://schemas.microsoft.com/office/drawing/2014/main" id="{09544D4C-94AB-4E22-939D-FE54FC32CA6A}"/>
+              </a:ext>
+            </a:extLst>
+          </p:cNvPr>
+          <p:cNvSpPr/>
+          <p:nvPr/>
+        </p:nvSpPr>
+        <p:spPr>
+          <a:xfrm>
+            <a:off x="4691965" y="5983858"/>
+            <a:ext cx="929296" cy="346760"/>
+          </a:xfrm>
+          <a:prstGeom prst="rect">
+            <a:avLst/>
+          </a:prstGeom>
+          <a:ln/>
+        </p:spPr>
+        <p:style>
+          <a:lnRef idx="1">
+            <a:schemeClr val="accent3"/>
+          </a:lnRef>
+          <a:fillRef idx="2">
+            <a:schemeClr val="accent3"/>
+          </a:fillRef>
+          <a:effectRef idx="1">
+            <a:schemeClr val="accent3"/>
+          </a:effectRef>
+          <a:fontRef idx="minor">
+            <a:schemeClr val="dk1"/>
+          </a:fontRef>
+        </p:style>
+        <p:txBody>
+          <a:bodyPr rtlCol="0" anchor="ctr"/>
+          <a:lstStyle/>
+          <a:p>
+            <a:pPr algn="ctr"/>
+            <a:r>
+              <a:rPr lang="en-US" sz="1050" dirty="0"/>
+              <a:t>Postal Code</a:t>
+            </a:r>
+            <a:endParaRPr lang="en-SG" sz="1050" dirty="0"/>
+          </a:p>
+        </p:txBody>
+      </p:sp>
+      <p:cxnSp>
+        <p:nvCxnSpPr>
+          <p:cNvPr id="78" name="Connector: Elbow 77">
+            <a:extLst>
+              <a:ext uri="{FF2B5EF4-FFF2-40B4-BE49-F238E27FC236}">
+                <a16:creationId xmlns:a16="http://schemas.microsoft.com/office/drawing/2014/main" id="{2D6516AA-990E-40BD-8D80-098A1B806092}"/>
+              </a:ext>
+            </a:extLst>
+          </p:cNvPr>
+          <p:cNvCxnSpPr>
+            <a:cxnSpLocks/>
+            <a:endCxn id="75" idx="0"/>
+          </p:cNvCxnSpPr>
+          <p:nvPr/>
+        </p:nvCxnSpPr>
+        <p:spPr>
+          <a:xfrm rot="10800000" flipV="1">
+            <a:off x="7437084" y="5449040"/>
+            <a:ext cx="1083803" cy="534818"/>
+          </a:xfrm>
+          <a:prstGeom prst="bentConnector2">
+            <a:avLst/>
+          </a:prstGeom>
+          <a:ln>
+            <a:tailEnd type="triangle"/>
+          </a:ln>
+        </p:spPr>
+        <p:style>
+          <a:lnRef idx="1">
+            <a:schemeClr val="accent4"/>
+          </a:lnRef>
+          <a:fillRef idx="0">
+            <a:schemeClr val="accent4"/>
+          </a:fillRef>
+          <a:effectRef idx="0">
+            <a:schemeClr val="accent4"/>
+          </a:effectRef>
+          <a:fontRef idx="minor">
+            <a:schemeClr val="tx1"/>
+          </a:fontRef>
+        </p:style>
+      </p:cxnSp>
+      <p:cxnSp>
+        <p:nvCxnSpPr>
+          <p:cNvPr id="83" name="Connector: Elbow 82">
+            <a:extLst>
+              <a:ext uri="{FF2B5EF4-FFF2-40B4-BE49-F238E27FC236}">
+                <a16:creationId xmlns:a16="http://schemas.microsoft.com/office/drawing/2014/main" id="{6ED49344-5999-4F82-9826-FE1B12BFEDFC}"/>
+              </a:ext>
+            </a:extLst>
+          </p:cNvPr>
+          <p:cNvCxnSpPr>
+            <a:cxnSpLocks/>
+            <a:endCxn id="76" idx="0"/>
+          </p:cNvCxnSpPr>
+          <p:nvPr/>
+        </p:nvCxnSpPr>
+        <p:spPr>
+          <a:xfrm rot="10800000" flipV="1">
+            <a:off x="6317153" y="5449038"/>
+            <a:ext cx="2203735" cy="541958"/>
+          </a:xfrm>
+          <a:prstGeom prst="bentConnector2">
+            <a:avLst/>
+          </a:prstGeom>
+          <a:ln>
+            <a:tailEnd type="triangle"/>
+          </a:ln>
+        </p:spPr>
+        <p:style>
+          <a:lnRef idx="1">
+            <a:schemeClr val="accent4"/>
+          </a:lnRef>
+          <a:fillRef idx="0">
+            <a:schemeClr val="accent4"/>
+          </a:fillRef>
+          <a:effectRef idx="0">
+            <a:schemeClr val="accent4"/>
+          </a:effectRef>
+          <a:fontRef idx="minor">
+            <a:schemeClr val="tx1"/>
+          </a:fontRef>
+        </p:style>
+      </p:cxnSp>
+      <p:cxnSp>
+        <p:nvCxnSpPr>
+          <p:cNvPr id="85" name="Connector: Elbow 84">
+            <a:extLst>
+              <a:ext uri="{FF2B5EF4-FFF2-40B4-BE49-F238E27FC236}">
+                <a16:creationId xmlns:a16="http://schemas.microsoft.com/office/drawing/2014/main" id="{71509A54-1ACA-4524-B3F0-775010207FE8}"/>
+              </a:ext>
+            </a:extLst>
+          </p:cNvPr>
+          <p:cNvCxnSpPr>
+            <a:cxnSpLocks/>
+            <a:endCxn id="77" idx="0"/>
+          </p:cNvCxnSpPr>
+          <p:nvPr/>
+        </p:nvCxnSpPr>
+        <p:spPr>
+          <a:xfrm rot="10800000" flipV="1">
+            <a:off x="5156613" y="5452160"/>
+            <a:ext cx="3364274" cy="531698"/>
+          </a:xfrm>
+          <a:prstGeom prst="bentConnector2">
+            <a:avLst/>
+          </a:prstGeom>
+          <a:ln>
+            <a:tailEnd type="triangle"/>
+          </a:ln>
+        </p:spPr>
+        <p:style>
+          <a:lnRef idx="1">
+            <a:schemeClr val="accent4"/>
+          </a:lnRef>
+          <a:fillRef idx="0">
+            <a:schemeClr val="accent4"/>
+          </a:fillRef>
+          <a:effectRef idx="0">
+            <a:schemeClr val="accent4"/>
+          </a:effectRef>
+          <a:fontRef idx="minor">
+            <a:schemeClr val="tx1"/>
           </a:fontRef>
         </p:style>
       </p:cxnSp>
@@ -5837,7 +6221,7 @@
           <a:p>
             <a:pPr algn="ctr"/>
             <a:r>
-              <a:rPr lang="en-US" sz="1050" dirty="0" smtClean="0"/>
+              <a:rPr lang="en-US" sz="1050" dirty="0"/>
               <a:t>Address</a:t>
             </a:r>
             <a:endParaRPr lang="en-SG" sz="1050" dirty="0"/>
@@ -5881,7 +6265,7 @@
           <a:p>
             <a:pPr algn="ctr"/>
             <a:r>
-              <a:rPr lang="en-US" sz="1050" dirty="0" smtClean="0"/>
+              <a:rPr lang="en-US" sz="1050" dirty="0"/>
               <a:t>Unit</a:t>
             </a:r>
             <a:endParaRPr lang="en-SG" sz="1050" dirty="0"/>
@@ -6008,7 +6392,7 @@
           <a:p>
             <a:pPr algn="ctr"/>
             <a:r>
-              <a:rPr lang="en-US" sz="1050" dirty="0" smtClean="0"/>
+              <a:rPr lang="en-US" sz="1050" dirty="0"/>
               <a:t>Postal code</a:t>
             </a:r>
             <a:endParaRPr lang="en-SG" sz="1050" dirty="0"/>
@@ -6052,7 +6436,7 @@
           <a:p>
             <a:pPr algn="ctr"/>
             <a:r>
-              <a:rPr lang="en-US" sz="1050" dirty="0" smtClean="0"/>
+              <a:rPr lang="en-US" sz="1050" dirty="0"/>
               <a:t>Street</a:t>
             </a:r>
             <a:endParaRPr lang="en-SG" sz="1050" dirty="0"/>
@@ -6096,7 +6480,7 @@
           <a:p>
             <a:pPr algn="ctr"/>
             <a:r>
-              <a:rPr lang="en-US" sz="1050" dirty="0" smtClean="0"/>
+              <a:rPr lang="en-US" sz="1050" dirty="0"/>
               <a:t>Block</a:t>
             </a:r>
             <a:endParaRPr lang="en-SG" sz="1050" dirty="0"/>
@@ -6260,10 +6644,9 @@
           <a:p>
             <a:pPr algn="ctr"/>
             <a:r>
-              <a:rPr lang="en-SG" sz="1050" dirty="0" smtClean="0"/>
+              <a:rPr lang="en-SG" sz="1050" dirty="0"/>
               <a:t>Contact</a:t>
             </a:r>
-            <a:endParaRPr lang="en-SG" sz="1050" dirty="0"/>
           </a:p>
         </p:txBody>
       </p:sp>
@@ -6304,7 +6687,7 @@
           <a:p>
             <a:pPr algn="ctr"/>
             <a:r>
-              <a:rPr lang="en-US" sz="1050" dirty="0" smtClean="0"/>
+              <a:rPr lang="en-US" sz="1050" dirty="0"/>
               <a:t>Phone</a:t>
             </a:r>
             <a:endParaRPr lang="en-SG" sz="1050" dirty="0"/>
@@ -6348,7 +6731,7 @@
           <a:p>
             <a:pPr algn="ctr"/>
             <a:r>
-              <a:rPr lang="en-US" sz="1050" dirty="0" smtClean="0"/>
+              <a:rPr lang="en-US" sz="1050" dirty="0"/>
               <a:t>Email</a:t>
             </a:r>
             <a:endParaRPr lang="en-SG" sz="1050" dirty="0"/>
@@ -6392,7 +6775,7 @@
           <a:p>
             <a:pPr algn="ctr"/>
             <a:r>
-              <a:rPr lang="en-US" sz="1050" dirty="0" smtClean="0"/>
+              <a:rPr lang="en-US" sz="1050" dirty="0"/>
               <a:t>Address</a:t>
             </a:r>
             <a:endParaRPr lang="en-SG" sz="1050" dirty="0"/>
@@ -6581,10 +6964,9 @@
           <a:p>
             <a:pPr algn="ctr"/>
             <a:r>
-              <a:rPr lang="en-SG" sz="1050" dirty="0" smtClean="0"/>
+              <a:rPr lang="en-SG" sz="1050" dirty="0"/>
               <a:t>&lt;&lt;interface&gt;&gt; Printable</a:t>
             </a:r>
-            <a:endParaRPr lang="en-SG" sz="1050" dirty="0"/>
           </a:p>
         </p:txBody>
       </p:sp>
@@ -6625,7 +7007,7 @@
           <a:p>
             <a:pPr algn="ctr"/>
             <a:r>
-              <a:rPr lang="en-US" sz="1050" dirty="0" smtClean="0"/>
+              <a:rPr lang="en-US" sz="1050" dirty="0"/>
               <a:t>Phone</a:t>
             </a:r>
             <a:endParaRPr lang="en-SG" sz="1050" dirty="0"/>
@@ -6669,7 +7051,7 @@
           <a:p>
             <a:pPr algn="ctr"/>
             <a:r>
-              <a:rPr lang="en-US" sz="1050" dirty="0" smtClean="0"/>
+              <a:rPr lang="en-US" sz="1050" dirty="0"/>
               <a:t>Email</a:t>
             </a:r>
             <a:endParaRPr lang="en-SG" sz="1050" dirty="0"/>
@@ -6713,7 +7095,7 @@
           <a:p>
             <a:pPr algn="ctr"/>
             <a:r>
-              <a:rPr lang="en-US" sz="1050" dirty="0" smtClean="0"/>
+              <a:rPr lang="en-US" sz="1050" dirty="0"/>
               <a:t>Address</a:t>
             </a:r>
             <a:endParaRPr lang="en-SG" sz="1050" dirty="0"/>
@@ -6914,7 +7296,7 @@
           <a:p>
             <a:pPr algn="ctr"/>
             <a:r>
-              <a:rPr lang="en-US" sz="1050" dirty="0" smtClean="0"/>
+              <a:rPr lang="en-US" sz="1050" dirty="0"/>
               <a:t>Name</a:t>
             </a:r>
             <a:endParaRPr lang="en-SG" sz="1050" dirty="0"/>
@@ -7037,15 +7419,15 @@
           <a:p>
             <a:pPr algn="ctr"/>
             <a:r>
-              <a:rPr lang="en-US" sz="1050" dirty="0" smtClean="0"/>
+              <a:rPr lang="en-US" sz="1050" dirty="0"/>
               <a:t>+ </a:t>
             </a:r>
             <a:r>
-              <a:rPr lang="en-US" sz="1050" dirty="0" err="1" smtClean="0"/>
+              <a:rPr lang="en-US" sz="1050" dirty="0" err="1"/>
               <a:t>getPrintableString</a:t>
             </a:r>
             <a:r>
-              <a:rPr lang="en-US" sz="1050" dirty="0" smtClean="0"/>
+              <a:rPr lang="en-US" sz="1050" dirty="0"/>
               <a:t>(): String</a:t>
             </a:r>
             <a:endParaRPr lang="en-SG" sz="1050" dirty="0"/>
@@ -7133,14 +7515,14 @@
           <a:p>
             <a:pPr algn="ctr"/>
             <a:r>
-              <a:rPr lang="en-US" sz="1050" dirty="0" smtClean="0"/>
+              <a:rPr lang="en-US" sz="1050" dirty="0"/>
               <a:t>Unique</a:t>
             </a:r>
             <a:br>
-              <a:rPr lang="en-US" sz="1050" dirty="0" smtClean="0"/>
+              <a:rPr lang="en-US" sz="1050" dirty="0"/>
             </a:br>
             <a:r>
-              <a:rPr lang="en-US" sz="1050" dirty="0" err="1" smtClean="0"/>
+              <a:rPr lang="en-US" sz="1050" dirty="0" err="1"/>
               <a:t>TagList</a:t>
             </a:r>
             <a:endParaRPr lang="en-SG" sz="1050" dirty="0"/>
@@ -7184,14 +7566,14 @@
           <a:p>
             <a:pPr algn="ctr"/>
             <a:r>
-              <a:rPr lang="en-US" sz="1050" dirty="0" smtClean="0"/>
+              <a:rPr lang="en-US" sz="1050" dirty="0"/>
               <a:t>Unique</a:t>
             </a:r>
             <a:br>
-              <a:rPr lang="en-US" sz="1050" dirty="0" smtClean="0"/>
+              <a:rPr lang="en-US" sz="1050" dirty="0"/>
             </a:br>
             <a:r>
-              <a:rPr lang="en-US" sz="1050" dirty="0" err="1" smtClean="0"/>
+              <a:rPr lang="en-US" sz="1050" dirty="0" err="1"/>
               <a:t>PersonList</a:t>
             </a:r>
             <a:endParaRPr lang="en-SG" sz="1050" dirty="0"/>
@@ -7235,7 +7617,7 @@
           <a:p>
             <a:pPr algn="ctr"/>
             <a:r>
-              <a:rPr lang="en-US" sz="1050" dirty="0" smtClean="0"/>
+              <a:rPr lang="en-US" sz="1050" dirty="0"/>
               <a:t>Person</a:t>
             </a:r>
             <a:endParaRPr lang="en-SG" sz="1050" dirty="0"/>
@@ -7602,7 +7984,7 @@
           <a:p>
             <a:pPr algn="ctr"/>
             <a:r>
-              <a:rPr lang="en-US" sz="1050" dirty="0" smtClean="0"/>
+              <a:rPr lang="en-US" sz="1050" dirty="0"/>
               <a:t>Tagging</a:t>
             </a:r>
             <a:endParaRPr lang="en-SG" sz="1050" dirty="0"/>
@@ -7746,7 +8128,7 @@
           <a:lstStyle/>
           <a:p>
             <a:r>
-              <a:rPr lang="en-US" dirty="0" smtClean="0">
+              <a:rPr lang="en-US" dirty="0">
                 <a:solidFill>
                   <a:schemeClr val="accent6">
                     <a:lumMod val="75000"/>
@@ -7755,13 +8137,6 @@
               </a:rPr>
               <a:t>*</a:t>
             </a:r>
-            <a:endParaRPr lang="en-US" dirty="0">
-              <a:solidFill>
-                <a:schemeClr val="accent6">
-                  <a:lumMod val="75000"/>
-                </a:schemeClr>
-              </a:solidFill>
-            </a:endParaRPr>
           </a:p>
         </p:txBody>
       </p:sp>
@@ -7788,7 +8163,7 @@
           <a:lstStyle/>
           <a:p>
             <a:r>
-              <a:rPr lang="en-US" sz="1100" dirty="0" err="1" smtClean="0">
+              <a:rPr lang="en-US" sz="1100" dirty="0" err="1">
                 <a:solidFill>
                   <a:schemeClr val="accent6">
                     <a:lumMod val="75000"/>
@@ -7918,14 +8293,14 @@
           <a:p>
             <a:pPr algn="ctr"/>
             <a:r>
-              <a:rPr lang="en-US" sz="1050" dirty="0" smtClean="0"/>
+              <a:rPr lang="en-US" sz="1050" dirty="0"/>
               <a:t>Unique</a:t>
             </a:r>
             <a:br>
-              <a:rPr lang="en-US" sz="1050" dirty="0" smtClean="0"/>
+              <a:rPr lang="en-US" sz="1050" dirty="0"/>
             </a:br>
             <a:r>
-              <a:rPr lang="en-US" sz="1050" dirty="0" err="1" smtClean="0"/>
+              <a:rPr lang="en-US" sz="1050" dirty="0" err="1"/>
               <a:t>TagList</a:t>
             </a:r>
             <a:endParaRPr lang="en-SG" sz="1050" dirty="0"/>
@@ -7969,14 +8344,14 @@
           <a:p>
             <a:pPr algn="ctr"/>
             <a:r>
-              <a:rPr lang="en-US" sz="1050" dirty="0" smtClean="0"/>
+              <a:rPr lang="en-US" sz="1050" dirty="0"/>
               <a:t>Unique</a:t>
             </a:r>
             <a:br>
-              <a:rPr lang="en-US" sz="1050" dirty="0" smtClean="0"/>
+              <a:rPr lang="en-US" sz="1050" dirty="0"/>
             </a:br>
             <a:r>
-              <a:rPr lang="en-US" sz="1050" dirty="0" err="1" smtClean="0"/>
+              <a:rPr lang="en-US" sz="1050" dirty="0" err="1"/>
               <a:t>PersonList</a:t>
             </a:r>
             <a:endParaRPr lang="en-SG" sz="1050" dirty="0"/>
@@ -8020,7 +8395,7 @@
           <a:p>
             <a:pPr algn="ctr"/>
             <a:r>
-              <a:rPr lang="en-US" sz="1050" dirty="0" smtClean="0"/>
+              <a:rPr lang="en-US" sz="1050" dirty="0"/>
               <a:t>Person</a:t>
             </a:r>
             <a:endParaRPr lang="en-SG" sz="1050" dirty="0"/>
@@ -8387,7 +8762,7 @@
           <a:p>
             <a:pPr algn="ctr"/>
             <a:r>
-              <a:rPr lang="en-US" sz="1050" dirty="0" smtClean="0"/>
+              <a:rPr lang="en-US" sz="1050" dirty="0"/>
               <a:t>Tagging</a:t>
             </a:r>
             <a:endParaRPr lang="en-SG" sz="1050" dirty="0"/>
@@ -8493,7 +8868,7 @@
           <a:lstStyle/>
           <a:p>
             <a:r>
-              <a:rPr lang="en-US" dirty="0" smtClean="0">
+              <a:rPr lang="en-US" dirty="0">
                 <a:solidFill>
                   <a:schemeClr val="accent6">
                     <a:lumMod val="75000"/>
@@ -8502,13 +8877,6 @@
               </a:rPr>
               <a:t>*</a:t>
             </a:r>
-            <a:endParaRPr lang="en-US" dirty="0">
-              <a:solidFill>
-                <a:schemeClr val="accent6">
-                  <a:lumMod val="75000"/>
-                </a:schemeClr>
-              </a:solidFill>
-            </a:endParaRPr>
           </a:p>
         </p:txBody>
       </p:sp>
@@ -8617,7 +8985,7 @@
           <a:lstStyle/>
           <a:p>
             <a:r>
-              <a:rPr lang="en-US" sz="1100" dirty="0" err="1" smtClean="0">
+              <a:rPr lang="en-US" sz="1100" dirty="0" err="1">
                 <a:solidFill>
                   <a:schemeClr val="accent6">
                     <a:lumMod val="75000"/>

</xml_diff>